<commit_message>
crear partidas filtrar por partidacambio de powerpoin y excel
</commit_message>
<xml_diff>
--- a/TableroConecta.pptx
+++ b/TableroConecta.pptx
@@ -611,7 +611,7 @@
           <a:p>
             <a:fld id="{72345051-2045-45DA-935E-2E3CA1A69ADC}" type="datetimeFigureOut">
               <a:rPr lang="en-US" smtClean="0"/>
-              <a:t>3/26/2024</a:t>
+              <a:t>4/1/2024</a:t>
             </a:fld>
             <a:endParaRPr lang="en-US" dirty="0"/>
           </a:p>
@@ -809,7 +809,7 @@
           <a:p>
             <a:fld id="{72345051-2045-45DA-935E-2E3CA1A69ADC}" type="datetimeFigureOut">
               <a:rPr lang="en-US" smtClean="0"/>
-              <a:t>3/26/2024</a:t>
+              <a:t>4/1/2024</a:t>
             </a:fld>
             <a:endParaRPr lang="en-US"/>
           </a:p>
@@ -1017,7 +1017,7 @@
           <a:p>
             <a:fld id="{72345051-2045-45DA-935E-2E3CA1A69ADC}" type="datetimeFigureOut">
               <a:rPr lang="en-US" smtClean="0"/>
-              <a:t>3/26/2024</a:t>
+              <a:t>4/1/2024</a:t>
             </a:fld>
             <a:endParaRPr lang="en-US"/>
           </a:p>
@@ -1239,7 +1239,7 @@
           <a:p>
             <a:fld id="{72345051-2045-45DA-935E-2E3CA1A69ADC}" type="datetimeFigureOut">
               <a:rPr lang="en-US" smtClean="0"/>
-              <a:t>3/26/2024</a:t>
+              <a:t>4/1/2024</a:t>
             </a:fld>
             <a:endParaRPr lang="en-US"/>
           </a:p>
@@ -2150,7 +2150,7 @@
           <a:p>
             <a:fld id="{72345051-2045-45DA-935E-2E3CA1A69ADC}" type="datetimeFigureOut">
               <a:rPr lang="en-US" smtClean="0"/>
-              <a:t>3/26/2024</a:t>
+              <a:t>4/1/2024</a:t>
             </a:fld>
             <a:endParaRPr lang="en-US"/>
           </a:p>
@@ -2753,7 +2753,7 @@
           <a:p>
             <a:fld id="{72345051-2045-45DA-935E-2E3CA1A69ADC}" type="datetimeFigureOut">
               <a:rPr lang="en-US" smtClean="0"/>
-              <a:t>3/26/2024</a:t>
+              <a:t>4/1/2024</a:t>
             </a:fld>
             <a:endParaRPr lang="en-US"/>
           </a:p>
@@ -3801,7 +3801,7 @@
           <a:p>
             <a:fld id="{72345051-2045-45DA-935E-2E3CA1A69ADC}" type="datetimeFigureOut">
               <a:rPr lang="en-US" smtClean="0"/>
-              <a:t>3/26/2024</a:t>
+              <a:t>4/1/2024</a:t>
             </a:fld>
             <a:endParaRPr lang="en-US"/>
           </a:p>
@@ -4585,7 +4585,7 @@
           <a:p>
             <a:fld id="{72345051-2045-45DA-935E-2E3CA1A69ADC}" type="datetimeFigureOut">
               <a:rPr lang="en-US" smtClean="0"/>
-              <a:t>3/26/2024</a:t>
+              <a:t>4/1/2024</a:t>
             </a:fld>
             <a:endParaRPr lang="en-US"/>
           </a:p>
@@ -5034,7 +5034,7 @@
           <a:p>
             <a:fld id="{72345051-2045-45DA-935E-2E3CA1A69ADC}" type="datetimeFigureOut">
               <a:rPr lang="en-US" smtClean="0"/>
-              <a:t>3/26/2024</a:t>
+              <a:t>4/1/2024</a:t>
             </a:fld>
             <a:endParaRPr lang="en-US"/>
           </a:p>
@@ -5351,7 +5351,7 @@
           <a:p>
             <a:fld id="{72345051-2045-45DA-935E-2E3CA1A69ADC}" type="datetimeFigureOut">
               <a:rPr lang="en-US" smtClean="0"/>
-              <a:t>3/26/2024</a:t>
+              <a:t>4/1/2024</a:t>
             </a:fld>
             <a:endParaRPr lang="en-US"/>
           </a:p>
@@ -5979,7 +5979,7 @@
           <a:p>
             <a:fld id="{72345051-2045-45DA-935E-2E3CA1A69ADC}" type="datetimeFigureOut">
               <a:rPr lang="en-US" smtClean="0"/>
-              <a:t>3/26/2024</a:t>
+              <a:t>4/1/2024</a:t>
             </a:fld>
             <a:endParaRPr lang="en-US"/>
           </a:p>
@@ -6552,7 +6552,7 @@
           <a:p>
             <a:fld id="{72345051-2045-45DA-935E-2E3CA1A69ADC}" type="datetimeFigureOut">
               <a:rPr lang="en-US" smtClean="0"/>
-              <a:t>3/26/2024</a:t>
+              <a:t>4/1/2024</a:t>
             </a:fld>
             <a:endParaRPr lang="en-US" dirty="0"/>
           </a:p>
@@ -7425,41 +7425,12 @@
           <a:chExt cx="0" cy="0"/>
         </a:xfrm>
       </p:grpSpPr>
-      <p:pic>
-        <p:nvPicPr>
-          <p:cNvPr id="33" name="Picture 32" descr="Movimiento de jaque mate en un tablero de ajedrez">
+      <p:sp useBgFill="1">
+        <p:nvSpPr>
+          <p:cNvPr id="63" name="Rectangle 58">
             <a:extLst>
               <a:ext uri="{FF2B5EF4-FFF2-40B4-BE49-F238E27FC236}">
-                <a16:creationId xmlns:a16="http://schemas.microsoft.com/office/drawing/2014/main" id="{7C19B8B7-51A6-4095-DDE1-232B5CF6115B}"/>
-              </a:ext>
-            </a:extLst>
-          </p:cNvPr>
-          <p:cNvPicPr>
-            <a:picLocks noChangeAspect="1"/>
-          </p:cNvPicPr>
-          <p:nvPr/>
-        </p:nvPicPr>
-        <p:blipFill rotWithShape="1">
-          <a:blip r:embed="rId2"/>
-          <a:srcRect t="15414"/>
-          <a:stretch/>
-        </p:blipFill>
-        <p:spPr>
-          <a:xfrm>
-            <a:off x="-3047" y="10"/>
-            <a:ext cx="12191999" cy="6857990"/>
-          </a:xfrm>
-          <a:prstGeom prst="rect">
-            <a:avLst/>
-          </a:prstGeom>
-        </p:spPr>
-      </p:pic>
-      <p:sp>
-        <p:nvSpPr>
-          <p:cNvPr id="37" name="Rectangle 36">
-            <a:extLst>
-              <a:ext uri="{FF2B5EF4-FFF2-40B4-BE49-F238E27FC236}">
-                <a16:creationId xmlns:a16="http://schemas.microsoft.com/office/drawing/2014/main" id="{007891EC-4501-44ED-A8C8-B11B6DB767AB}"/>
+                <a16:creationId xmlns:a16="http://schemas.microsoft.com/office/drawing/2014/main" id="{665DBBEF-238B-476B-96AB-8AAC3224ECEA}"/>
               </a:ext>
               <a:ext uri="{C183D7F6-B498-43B3-948B-1728B52AA6E4}">
                 <adec:decorative xmlns:adec="http://schemas.microsoft.com/office/drawing/2017/decorative" val="1"/>
@@ -7479,33 +7450,12 @@
         </p:nvSpPr>
         <p:spPr>
           <a:xfrm>
-            <a:off x="0" y="2207602"/>
-            <a:ext cx="12191999" cy="3162146"/>
+            <a:off x="0" y="0"/>
+            <a:ext cx="12192000" cy="6858000"/>
           </a:xfrm>
           <a:prstGeom prst="rect">
             <a:avLst/>
           </a:prstGeom>
-          <a:gradFill flip="none" rotWithShape="1">
-            <a:gsLst>
-              <a:gs pos="0">
-                <a:schemeClr val="tx1">
-                  <a:alpha val="0"/>
-                </a:schemeClr>
-              </a:gs>
-              <a:gs pos="50000">
-                <a:schemeClr val="tx1">
-                  <a:alpha val="35000"/>
-                </a:schemeClr>
-              </a:gs>
-              <a:gs pos="100000">
-                <a:schemeClr val="tx1">
-                  <a:alpha val="0"/>
-                </a:schemeClr>
-              </a:gs>
-            </a:gsLst>
-            <a:lin ang="16200000" scaled="1"/>
-            <a:tileRect/>
-          </a:gradFill>
           <a:ln>
             <a:noFill/>
           </a:ln>
@@ -7553,16 +7503,9 @@
         </p:nvSpPr>
         <p:spPr>
           <a:xfrm>
-            <a:off x="643466" y="1322616"/>
-            <a:ext cx="10905059" cy="2651204"/>
+            <a:off x="638882" y="639193"/>
+            <a:ext cx="3571810" cy="3573516"/>
           </a:xfrm>
-          <a:effectLst>
-            <a:outerShdw blurRad="50800" dist="38100" dir="2700000" algn="tl" rotWithShape="0">
-              <a:prstClr val="black">
-                <a:alpha val="40000"/>
-              </a:prstClr>
-            </a:outerShdw>
-          </a:effectLst>
         </p:spPr>
         <p:txBody>
           <a:bodyPr>
@@ -7570,91 +7513,28 @@
           </a:bodyPr>
           <a:lstStyle/>
           <a:p>
-            <a:pPr algn="ctr"/>
             <a:r>
-              <a:rPr lang="es-ES" sz="5400" dirty="0">
-                <a:hlinkClick r:id="rId3"/>
-              </a:rPr>
+              <a:rPr lang="es-ES" sz="5400"/>
               <a:t>WIREFLOW</a:t>
             </a:r>
-            <a:endParaRPr lang="es-ES" sz="5400" dirty="0">
-              <a:solidFill>
-                <a:schemeClr val="bg1"/>
-              </a:solidFill>
-            </a:endParaRPr>
           </a:p>
         </p:txBody>
       </p:sp>
       <p:sp>
         <p:nvSpPr>
-          <p:cNvPr id="3" name="Subtítulo 2">
+          <p:cNvPr id="64" name="Rectangle 6">
             <a:extLst>
               <a:ext uri="{FF2B5EF4-FFF2-40B4-BE49-F238E27FC236}">
-                <a16:creationId xmlns:a16="http://schemas.microsoft.com/office/drawing/2014/main" id="{1EF54023-698A-0BC0-4A50-611877A68745}"/>
+                <a16:creationId xmlns:a16="http://schemas.microsoft.com/office/drawing/2014/main" id="{3FCFB1DE-0B7E-48CC-BA90-B2AB0889F9D6}"/>
+              </a:ext>
+              <a:ext uri="{C183D7F6-B498-43B3-948B-1728B52AA6E4}">
+                <adec:decorative xmlns:adec="http://schemas.microsoft.com/office/drawing/2017/decorative" val="1"/>
               </a:ext>
             </a:extLst>
           </p:cNvPr>
           <p:cNvSpPr>
-            <a:spLocks noGrp="1"/>
+            <a:spLocks noGrp="1" noRot="1" noChangeAspect="1" noMove="1" noResize="1" noEditPoints="1" noAdjustHandles="1" noChangeArrowheads="1" noChangeShapeType="1" noTextEdit="1"/>
           </p:cNvSpPr>
-          <p:nvPr>
-            <p:ph type="subTitle" idx="1"/>
-          </p:nvPr>
-        </p:nvSpPr>
-        <p:spPr>
-          <a:xfrm>
-            <a:off x="643466" y="4133135"/>
-            <a:ext cx="10902016" cy="1008767"/>
-          </a:xfrm>
-          <a:effectLst>
-            <a:outerShdw blurRad="50800" dist="38100" dir="2700000" algn="tl" rotWithShape="0">
-              <a:prstClr val="black">
-                <a:alpha val="40000"/>
-              </a:prstClr>
-            </a:outerShdw>
-          </a:effectLst>
-        </p:spPr>
-        <p:txBody>
-          <a:bodyPr>
-            <a:normAutofit/>
-          </a:bodyPr>
-          <a:lstStyle/>
-          <a:p>
-            <a:pPr algn="ctr"/>
-            <a:endParaRPr lang="es-ES" sz="1800" b="1">
-              <a:solidFill>
-                <a:schemeClr val="bg1"/>
-              </a:solidFill>
-            </a:endParaRPr>
-          </a:p>
-          <a:p>
-            <a:pPr algn="ctr"/>
-            <a:r>
-              <a:rPr lang="es-ES" sz="1800" b="1">
-                <a:solidFill>
-                  <a:schemeClr val="bg1"/>
-                </a:solidFill>
-              </a:rPr>
-              <a:t>Mario Villegas</a:t>
-            </a:r>
-          </a:p>
-        </p:txBody>
-      </p:sp>
-      <p:cxnSp>
-        <p:nvCxnSpPr>
-          <p:cNvPr id="39" name="Straight Connector 38">
-            <a:extLst>
-              <a:ext uri="{FF2B5EF4-FFF2-40B4-BE49-F238E27FC236}">
-                <a16:creationId xmlns:a16="http://schemas.microsoft.com/office/drawing/2014/main" id="{34E5597F-CE67-4085-9548-E6A8036DA3BB}"/>
-              </a:ext>
-              <a:ext uri="{C183D7F6-B498-43B3-948B-1728B52AA6E4}">
-                <adec:decorative xmlns:adec="http://schemas.microsoft.com/office/drawing/2017/decorative" val="1"/>
-              </a:ext>
-            </a:extLst>
-          </p:cNvPr>
-          <p:cNvCxnSpPr>
-            <a:cxnSpLocks noGrp="1" noRot="1" noChangeAspect="1" noMove="1" noResize="1" noEditPoints="1" noAdjustHandles="1" noChangeArrowheads="1" noChangeShapeType="1"/>
-          </p:cNvCxnSpPr>
           <p:nvPr>
             <p:extLst>
               <p:ext uri="{386F3935-93C4-4BCD-93E2-E3B085C9AB24}">
@@ -7662,43 +7542,286 @@
               </p:ext>
             </p:extLst>
           </p:nvPr>
-        </p:nvCxnSpPr>
+        </p:nvSpPr>
         <p:spPr>
           <a:xfrm>
-            <a:off x="3393881" y="4035362"/>
-            <a:ext cx="5404237" cy="0"/>
+            <a:off x="643278" y="4409267"/>
+            <a:ext cx="3255095" cy="27432"/>
           </a:xfrm>
-          <a:prstGeom prst="line">
+          <a:custGeom>
             <a:avLst/>
-          </a:prstGeom>
-          <a:ln>
+            <a:gdLst>
+              <a:gd name="connsiteX0" fmla="*/ 0 w 3255095"/>
+              <a:gd name="connsiteY0" fmla="*/ 0 h 27432"/>
+              <a:gd name="connsiteX1" fmla="*/ 618468 w 3255095"/>
+              <a:gd name="connsiteY1" fmla="*/ 0 h 27432"/>
+              <a:gd name="connsiteX2" fmla="*/ 1269487 w 3255095"/>
+              <a:gd name="connsiteY2" fmla="*/ 0 h 27432"/>
+              <a:gd name="connsiteX3" fmla="*/ 1953057 w 3255095"/>
+              <a:gd name="connsiteY3" fmla="*/ 0 h 27432"/>
+              <a:gd name="connsiteX4" fmla="*/ 2636627 w 3255095"/>
+              <a:gd name="connsiteY4" fmla="*/ 0 h 27432"/>
+              <a:gd name="connsiteX5" fmla="*/ 3255095 w 3255095"/>
+              <a:gd name="connsiteY5" fmla="*/ 0 h 27432"/>
+              <a:gd name="connsiteX6" fmla="*/ 3255095 w 3255095"/>
+              <a:gd name="connsiteY6" fmla="*/ 27432 h 27432"/>
+              <a:gd name="connsiteX7" fmla="*/ 2538974 w 3255095"/>
+              <a:gd name="connsiteY7" fmla="*/ 27432 h 27432"/>
+              <a:gd name="connsiteX8" fmla="*/ 1822853 w 3255095"/>
+              <a:gd name="connsiteY8" fmla="*/ 27432 h 27432"/>
+              <a:gd name="connsiteX9" fmla="*/ 1171834 w 3255095"/>
+              <a:gd name="connsiteY9" fmla="*/ 27432 h 27432"/>
+              <a:gd name="connsiteX10" fmla="*/ 0 w 3255095"/>
+              <a:gd name="connsiteY10" fmla="*/ 27432 h 27432"/>
+              <a:gd name="connsiteX11" fmla="*/ 0 w 3255095"/>
+              <a:gd name="connsiteY11" fmla="*/ 0 h 27432"/>
+            </a:gdLst>
+            <a:ahLst/>
+            <a:cxnLst>
+              <a:cxn ang="0">
+                <a:pos x="connsiteX0" y="connsiteY0"/>
+              </a:cxn>
+              <a:cxn ang="0">
+                <a:pos x="connsiteX1" y="connsiteY1"/>
+              </a:cxn>
+              <a:cxn ang="0">
+                <a:pos x="connsiteX2" y="connsiteY2"/>
+              </a:cxn>
+              <a:cxn ang="0">
+                <a:pos x="connsiteX3" y="connsiteY3"/>
+              </a:cxn>
+              <a:cxn ang="0">
+                <a:pos x="connsiteX4" y="connsiteY4"/>
+              </a:cxn>
+              <a:cxn ang="0">
+                <a:pos x="connsiteX5" y="connsiteY5"/>
+              </a:cxn>
+              <a:cxn ang="0">
+                <a:pos x="connsiteX6" y="connsiteY6"/>
+              </a:cxn>
+              <a:cxn ang="0">
+                <a:pos x="connsiteX7" y="connsiteY7"/>
+              </a:cxn>
+              <a:cxn ang="0">
+                <a:pos x="connsiteX8" y="connsiteY8"/>
+              </a:cxn>
+              <a:cxn ang="0">
+                <a:pos x="connsiteX9" y="connsiteY9"/>
+              </a:cxn>
+              <a:cxn ang="0">
+                <a:pos x="connsiteX10" y="connsiteY10"/>
+              </a:cxn>
+              <a:cxn ang="0">
+                <a:pos x="connsiteX11" y="connsiteY11"/>
+              </a:cxn>
+            </a:cxnLst>
+            <a:rect l="l" t="t" r="r" b="b"/>
+            <a:pathLst>
+              <a:path w="3255095" h="27432" fill="none" extrusionOk="0">
+                <a:moveTo>
+                  <a:pt x="0" y="0"/>
+                </a:moveTo>
+                <a:cubicBezTo>
+                  <a:pt x="240201" y="-22123"/>
+                  <a:pt x="462021" y="-19623"/>
+                  <a:pt x="618468" y="0"/>
+                </a:cubicBezTo>
+                <a:cubicBezTo>
+                  <a:pt x="774915" y="19623"/>
+                  <a:pt x="974734" y="2035"/>
+                  <a:pt x="1269487" y="0"/>
+                </a:cubicBezTo>
+                <a:cubicBezTo>
+                  <a:pt x="1564240" y="-2035"/>
+                  <a:pt x="1733579" y="10639"/>
+                  <a:pt x="1953057" y="0"/>
+                </a:cubicBezTo>
+                <a:cubicBezTo>
+                  <a:pt x="2172535" y="-10639"/>
+                  <a:pt x="2453962" y="14018"/>
+                  <a:pt x="2636627" y="0"/>
+                </a:cubicBezTo>
+                <a:cubicBezTo>
+                  <a:pt x="2819292" y="-14018"/>
+                  <a:pt x="3121375" y="5399"/>
+                  <a:pt x="3255095" y="0"/>
+                </a:cubicBezTo>
+                <a:cubicBezTo>
+                  <a:pt x="3253929" y="7395"/>
+                  <a:pt x="3255140" y="21864"/>
+                  <a:pt x="3255095" y="27432"/>
+                </a:cubicBezTo>
+                <a:cubicBezTo>
+                  <a:pt x="3088545" y="32347"/>
+                  <a:pt x="2687475" y="16563"/>
+                  <a:pt x="2538974" y="27432"/>
+                </a:cubicBezTo>
+                <a:cubicBezTo>
+                  <a:pt x="2390473" y="38301"/>
+                  <a:pt x="2137381" y="185"/>
+                  <a:pt x="1822853" y="27432"/>
+                </a:cubicBezTo>
+                <a:cubicBezTo>
+                  <a:pt x="1508325" y="54679"/>
+                  <a:pt x="1466437" y="29529"/>
+                  <a:pt x="1171834" y="27432"/>
+                </a:cubicBezTo>
+                <a:cubicBezTo>
+                  <a:pt x="877231" y="25335"/>
+                  <a:pt x="561097" y="46787"/>
+                  <a:pt x="0" y="27432"/>
+                </a:cubicBezTo>
+                <a:cubicBezTo>
+                  <a:pt x="-503" y="20663"/>
+                  <a:pt x="1168" y="5855"/>
+                  <a:pt x="0" y="0"/>
+                </a:cubicBezTo>
+                <a:close/>
+              </a:path>
+              <a:path w="3255095" h="27432" stroke="0" extrusionOk="0">
+                <a:moveTo>
+                  <a:pt x="0" y="0"/>
+                </a:moveTo>
+                <a:cubicBezTo>
+                  <a:pt x="291965" y="19429"/>
+                  <a:pt x="363155" y="8568"/>
+                  <a:pt x="618468" y="0"/>
+                </a:cubicBezTo>
+                <a:cubicBezTo>
+                  <a:pt x="873781" y="-8568"/>
+                  <a:pt x="904459" y="-19505"/>
+                  <a:pt x="1171834" y="0"/>
+                </a:cubicBezTo>
+                <a:cubicBezTo>
+                  <a:pt x="1439209" y="19505"/>
+                  <a:pt x="1744369" y="9790"/>
+                  <a:pt x="1887955" y="0"/>
+                </a:cubicBezTo>
+                <a:cubicBezTo>
+                  <a:pt x="2031541" y="-9790"/>
+                  <a:pt x="2346378" y="21240"/>
+                  <a:pt x="2506423" y="0"/>
+                </a:cubicBezTo>
+                <a:cubicBezTo>
+                  <a:pt x="2666468" y="-21240"/>
+                  <a:pt x="2990257" y="30414"/>
+                  <a:pt x="3255095" y="0"/>
+                </a:cubicBezTo>
+                <a:cubicBezTo>
+                  <a:pt x="3255288" y="12649"/>
+                  <a:pt x="3254107" y="17989"/>
+                  <a:pt x="3255095" y="27432"/>
+                </a:cubicBezTo>
+                <a:cubicBezTo>
+                  <a:pt x="3120743" y="25834"/>
+                  <a:pt x="2759628" y="51606"/>
+                  <a:pt x="2604076" y="27432"/>
+                </a:cubicBezTo>
+                <a:cubicBezTo>
+                  <a:pt x="2448524" y="3258"/>
+                  <a:pt x="2184336" y="28743"/>
+                  <a:pt x="1887955" y="27432"/>
+                </a:cubicBezTo>
+                <a:cubicBezTo>
+                  <a:pt x="1591574" y="26121"/>
+                  <a:pt x="1548845" y="16014"/>
+                  <a:pt x="1334589" y="27432"/>
+                </a:cubicBezTo>
+                <a:cubicBezTo>
+                  <a:pt x="1120333" y="38850"/>
+                  <a:pt x="996014" y="18806"/>
+                  <a:pt x="683570" y="27432"/>
+                </a:cubicBezTo>
+                <a:cubicBezTo>
+                  <a:pt x="371126" y="36058"/>
+                  <a:pt x="198687" y="25311"/>
+                  <a:pt x="0" y="27432"/>
+                </a:cubicBezTo>
+                <a:cubicBezTo>
+                  <a:pt x="1300" y="19678"/>
+                  <a:pt x="-86" y="12044"/>
+                  <a:pt x="0" y="0"/>
+                </a:cubicBezTo>
+                <a:close/>
+              </a:path>
+            </a:pathLst>
+          </a:custGeom>
+          <a:solidFill>
+            <a:srgbClr val="E72950"/>
+          </a:solidFill>
+          <a:ln w="38100" cap="rnd">
             <a:solidFill>
-              <a:schemeClr val="bg1"/>
+              <a:srgbClr val="E72950"/>
             </a:solidFill>
+            <a:round/>
+            <a:extLst>
+              <a:ext uri="{C807C97D-BFC1-408E-A445-0C87EB9F89A2}">
+                <ask:lineSketchStyleProps xmlns:ask="http://schemas.microsoft.com/office/drawing/2018/sketchyshapes" sd="1219033472">
+                  <a:prstGeom prst="rect">
+                    <a:avLst/>
+                  </a:prstGeom>
+                  <ask:type>
+                    <ask:lineSketchFreehand/>
+                  </ask:type>
+                </ask:lineSketchStyleProps>
+              </a:ext>
+            </a:extLst>
           </a:ln>
-          <a:effectLst>
-            <a:outerShdw blurRad="50800" dist="38100" dir="2700000" algn="tl" rotWithShape="0">
-              <a:prstClr val="black">
-                <a:alpha val="40000"/>
-              </a:prstClr>
-            </a:outerShdw>
-          </a:effectLst>
         </p:spPr>
         <p:style>
-          <a:lnRef idx="1">
-            <a:schemeClr val="accent1"/>
+          <a:lnRef idx="2">
+            <a:schemeClr val="accent1">
+              <a:shade val="50000"/>
+            </a:schemeClr>
           </a:lnRef>
-          <a:fillRef idx="0">
+          <a:fillRef idx="1">
             <a:schemeClr val="accent1"/>
           </a:fillRef>
           <a:effectRef idx="0">
             <a:schemeClr val="accent1"/>
           </a:effectRef>
           <a:fontRef idx="minor">
-            <a:schemeClr val="tx1"/>
+            <a:schemeClr val="lt1"/>
           </a:fontRef>
         </p:style>
-      </p:cxnSp>
+        <p:txBody>
+          <a:bodyPr rtlCol="0" anchor="ctr"/>
+          <a:lstStyle/>
+          <a:p>
+            <a:pPr algn="ctr"/>
+            <a:endParaRPr lang="en-US"/>
+          </a:p>
+        </p:txBody>
+      </p:sp>
+      <p:pic>
+        <p:nvPicPr>
+          <p:cNvPr id="7" name="Imagen 6">
+            <a:extLst>
+              <a:ext uri="{FF2B5EF4-FFF2-40B4-BE49-F238E27FC236}">
+                <a16:creationId xmlns:a16="http://schemas.microsoft.com/office/drawing/2014/main" id="{FC6073CE-57D8-B603-637E-7A051D6FEC9A}"/>
+              </a:ext>
+            </a:extLst>
+          </p:cNvPr>
+          <p:cNvPicPr>
+            <a:picLocks noChangeAspect="1"/>
+          </p:cNvPicPr>
+          <p:nvPr/>
+        </p:nvPicPr>
+        <p:blipFill rotWithShape="1">
+          <a:blip r:embed="rId2"/>
+          <a:srcRect l="213" t="403" r="92" b="472"/>
+          <a:stretch/>
+        </p:blipFill>
+        <p:spPr>
+          <a:xfrm>
+            <a:off x="4654296" y="1612976"/>
+            <a:ext cx="7214616" cy="3604616"/>
+          </a:xfrm>
+          <a:prstGeom prst="rect">
+            <a:avLst/>
+          </a:prstGeom>
+        </p:spPr>
+      </p:pic>
     </p:spTree>
     <p:extLst>
       <p:ext uri="{BB962C8B-B14F-4D97-AF65-F5344CB8AC3E}">
@@ -7770,52 +7893,6 @@
                                   </p:childTnLst>
                                 </p:cTn>
                               </p:par>
-                              <p:par>
-                                <p:cTn id="8" presetID="10" presetClass="entr" presetSubtype="0" fill="hold" grpId="0" nodeType="withEffect">
-                                  <p:stCondLst>
-                                    <p:cond delay="2000"/>
-                                  </p:stCondLst>
-                                  <p:iterate type="lt">
-                                    <p:tmPct val="10000"/>
-                                  </p:iterate>
-                                  <p:childTnLst>
-                                    <p:set>
-                                      <p:cBhvr>
-                                        <p:cTn id="9" dur="1" fill="hold">
-                                          <p:stCondLst>
-                                            <p:cond delay="0"/>
-                                          </p:stCondLst>
-                                        </p:cTn>
-                                        <p:tgtEl>
-                                          <p:spTgt spid="3">
-                                            <p:txEl>
-                                              <p:pRg st="1" end="1"/>
-                                            </p:txEl>
-                                          </p:spTgt>
-                                        </p:tgtEl>
-                                        <p:attrNameLst>
-                                          <p:attrName>style.visibility</p:attrName>
-                                        </p:attrNameLst>
-                                      </p:cBhvr>
-                                      <p:to>
-                                        <p:strVal val="visible"/>
-                                      </p:to>
-                                    </p:set>
-                                    <p:animEffect transition="in" filter="fade">
-                                      <p:cBhvr>
-                                        <p:cTn id="10" dur="400"/>
-                                        <p:tgtEl>
-                                          <p:spTgt spid="3">
-                                            <p:txEl>
-                                              <p:pRg st="1" end="1"/>
-                                            </p:txEl>
-                                          </p:spTgt>
-                                        </p:tgtEl>
-                                      </p:cBhvr>
-                                    </p:animEffect>
-                                  </p:childTnLst>
-                                </p:cTn>
-                              </p:par>
                             </p:childTnLst>
                           </p:cTn>
                         </p:par>
@@ -7845,7 +7922,6 @@
     </p:tnLst>
     <p:bldLst>
       <p:bldP spid="2" grpId="0"/>
-      <p:bldP spid="3" grpId="0" build="p"/>
     </p:bldLst>
   </p:timing>
 </p:sld>
@@ -9283,10 +9359,10 @@
       </p:sp>
       <p:pic>
         <p:nvPicPr>
-          <p:cNvPr id="8" name="Imagen 7" descr="Interfaz de usuario gráfica, Diagrama&#10;&#10;Descripción generada automáticamente">
+          <p:cNvPr id="3" name="Imagen 2">
             <a:extLst>
               <a:ext uri="{FF2B5EF4-FFF2-40B4-BE49-F238E27FC236}">
-                <a16:creationId xmlns:a16="http://schemas.microsoft.com/office/drawing/2014/main" id="{9146AED0-C3A9-0A5A-B1D3-0DF2FE8F5F81}"/>
+                <a16:creationId xmlns:a16="http://schemas.microsoft.com/office/drawing/2014/main" id="{38E9BDB6-15CB-79EC-E2E2-F252EDDE8CAD}"/>
               </a:ext>
             </a:extLst>
           </p:cNvPr>
@@ -9296,21 +9372,15 @@
           <p:nvPr/>
         </p:nvPicPr>
         <p:blipFill>
-          <a:blip r:embed="rId3">
-            <a:extLst>
-              <a:ext uri="{28A0092B-C50C-407E-A947-70E740481C1C}">
-                <a14:useLocalDpi xmlns:a14="http://schemas.microsoft.com/office/drawing/2010/main" val="0"/>
-              </a:ext>
-            </a:extLst>
-          </a:blip>
+          <a:blip r:embed="rId3"/>
           <a:stretch>
             <a:fillRect/>
           </a:stretch>
         </p:blipFill>
         <p:spPr>
           <a:xfrm>
-            <a:off x="3558010" y="164780"/>
-            <a:ext cx="4881198" cy="3678847"/>
+            <a:off x="3718143" y="190560"/>
+            <a:ext cx="4520982" cy="3800415"/>
           </a:xfrm>
           <a:prstGeom prst="rect">
             <a:avLst/>
@@ -9540,15 +9610,6 @@
 </file>
 
 <file path=customXml/item2.xml><?xml version="1.0" encoding="utf-8"?>
-<?mso-contentType ?>
-<FormTemplates xmlns="http://schemas.microsoft.com/sharepoint/v3/contenttype/forms">
-  <Display>DocumentLibraryForm</Display>
-  <Edit>DocumentLibraryForm</Edit>
-  <New>DocumentLibraryForm</New>
-</FormTemplates>
-</file>
-
-<file path=customXml/item3.xml><?xml version="1.0" encoding="utf-8"?>
 <ct:contentTypeSchema xmlns:ct="http://schemas.microsoft.com/office/2006/metadata/contentType" xmlns:ma="http://schemas.microsoft.com/office/2006/metadata/properties/metaAttributes" ct:_="" ma:_="" ma:contentTypeName="Documento" ma:contentTypeID="0x0101001CF815299FD08446828E528E2628D888" ma:contentTypeVersion="18" ma:contentTypeDescription="Crear nuevo documento." ma:contentTypeScope="" ma:versionID="eda16f0b0df14eff352f61fdd29391dd">
   <xsd:schema xmlns:xsd="http://www.w3.org/2001/XMLSchema" xmlns:xs="http://www.w3.org/2001/XMLSchema" xmlns:p="http://schemas.microsoft.com/office/2006/metadata/properties" xmlns:ns3="f2ea13ae-bb87-41e3-80ee-445ef9952b1b" xmlns:ns4="7e6392ed-20ae-4cf8-a2eb-b9a38b6c7442" targetNamespace="http://schemas.microsoft.com/office/2006/metadata/properties" ma:root="true" ma:fieldsID="39a5156d44086f184d4900c1f32878c2" ns3:_="" ns4:_="">
     <xsd:import namespace="f2ea13ae-bb87-41e3-80ee-445ef9952b1b"/>
@@ -9801,6 +9862,15 @@
 </ct:contentTypeSchema>
 </file>
 
+<file path=customXml/item3.xml><?xml version="1.0" encoding="utf-8"?>
+<?mso-contentType ?>
+<FormTemplates xmlns="http://schemas.microsoft.com/sharepoint/v3/contenttype/forms">
+  <Display>DocumentLibraryForm</Display>
+  <Edit>DocumentLibraryForm</Edit>
+  <New>DocumentLibraryForm</New>
+</FormTemplates>
+</file>
+
 <file path=customXml/itemProps1.xml><?xml version="1.0" encoding="utf-8"?>
 <ds:datastoreItem xmlns:ds="http://schemas.openxmlformats.org/officeDocument/2006/customXml" ds:itemID="{84F78817-FC4B-4DE8-91A2-DA4F6B7B016A}">
   <ds:schemaRefs>
@@ -9819,14 +9889,6 @@
 </file>
 
 <file path=customXml/itemProps2.xml><?xml version="1.0" encoding="utf-8"?>
-<ds:datastoreItem xmlns:ds="http://schemas.openxmlformats.org/officeDocument/2006/customXml" ds:itemID="{BDCF1FC9-F5C2-44A8-9472-8472B5853B3F}">
-  <ds:schemaRefs>
-    <ds:schemaRef ds:uri="http://schemas.microsoft.com/sharepoint/v3/contenttype/forms"/>
-  </ds:schemaRefs>
-</ds:datastoreItem>
-</file>
-
-<file path=customXml/itemProps3.xml><?xml version="1.0" encoding="utf-8"?>
 <ds:datastoreItem xmlns:ds="http://schemas.openxmlformats.org/officeDocument/2006/customXml" ds:itemID="{4616929A-81C1-416A-98D6-A4FC31BDA4E2}">
   <ds:schemaRefs>
     <ds:schemaRef ds:uri="http://schemas.microsoft.com/office/2006/metadata/contentType"/>
@@ -9843,4 +9905,12 @@
     <ds:schemaRef ds:uri="http://schemas.microsoft.com/internal/obd"/>
   </ds:schemaRefs>
 </ds:datastoreItem>
+</file>
+
+<file path=customXml/itemProps3.xml><?xml version="1.0" encoding="utf-8"?>
+<ds:datastoreItem xmlns:ds="http://schemas.openxmlformats.org/officeDocument/2006/customXml" ds:itemID="{BDCF1FC9-F5C2-44A8-9472-8472B5853B3F}">
+  <ds:schemaRefs>
+    <ds:schemaRef ds:uri="http://schemas.microsoft.com/sharepoint/v3/contenttype/forms"/>
+  </ds:schemaRefs>
+</ds:datastoreItem>
 </file>
</xml_diff>

<commit_message>
estilos powerpoint y excel modificados
</commit_message>
<xml_diff>
--- a/TableroConecta.pptx
+++ b/TableroConecta.pptx
@@ -6,9 +6,9 @@
   </p:sldMasterIdLst>
   <p:sldIdLst>
     <p:sldId id="256" r:id="rId5"/>
-    <p:sldId id="264" r:id="rId6"/>
-    <p:sldId id="262" r:id="rId7"/>
-    <p:sldId id="265" r:id="rId8"/>
+    <p:sldId id="265" r:id="rId6"/>
+    <p:sldId id="264" r:id="rId7"/>
+    <p:sldId id="266" r:id="rId8"/>
   </p:sldIdLst>
   <p:sldSz cx="12192000" cy="6858000"/>
   <p:notesSz cx="6858000" cy="9144000"/>
@@ -611,7 +611,7 @@
           <a:p>
             <a:fld id="{72345051-2045-45DA-935E-2E3CA1A69ADC}" type="datetimeFigureOut">
               <a:rPr lang="en-US" smtClean="0"/>
-              <a:t>4/1/2024</a:t>
+              <a:t>4/2/2024</a:t>
             </a:fld>
             <a:endParaRPr lang="en-US" dirty="0"/>
           </a:p>
@@ -809,7 +809,7 @@
           <a:p>
             <a:fld id="{72345051-2045-45DA-935E-2E3CA1A69ADC}" type="datetimeFigureOut">
               <a:rPr lang="en-US" smtClean="0"/>
-              <a:t>4/1/2024</a:t>
+              <a:t>4/2/2024</a:t>
             </a:fld>
             <a:endParaRPr lang="en-US"/>
           </a:p>
@@ -1017,7 +1017,7 @@
           <a:p>
             <a:fld id="{72345051-2045-45DA-935E-2E3CA1A69ADC}" type="datetimeFigureOut">
               <a:rPr lang="en-US" smtClean="0"/>
-              <a:t>4/1/2024</a:t>
+              <a:t>4/2/2024</a:t>
             </a:fld>
             <a:endParaRPr lang="en-US"/>
           </a:p>
@@ -1239,7 +1239,7 @@
           <a:p>
             <a:fld id="{72345051-2045-45DA-935E-2E3CA1A69ADC}" type="datetimeFigureOut">
               <a:rPr lang="en-US" smtClean="0"/>
-              <a:t>4/1/2024</a:t>
+              <a:t>4/2/2024</a:t>
             </a:fld>
             <a:endParaRPr lang="en-US"/>
           </a:p>
@@ -2150,7 +2150,7 @@
           <a:p>
             <a:fld id="{72345051-2045-45DA-935E-2E3CA1A69ADC}" type="datetimeFigureOut">
               <a:rPr lang="en-US" smtClean="0"/>
-              <a:t>4/1/2024</a:t>
+              <a:t>4/2/2024</a:t>
             </a:fld>
             <a:endParaRPr lang="en-US"/>
           </a:p>
@@ -2753,7 +2753,7 @@
           <a:p>
             <a:fld id="{72345051-2045-45DA-935E-2E3CA1A69ADC}" type="datetimeFigureOut">
               <a:rPr lang="en-US" smtClean="0"/>
-              <a:t>4/1/2024</a:t>
+              <a:t>4/2/2024</a:t>
             </a:fld>
             <a:endParaRPr lang="en-US"/>
           </a:p>
@@ -3801,7 +3801,7 @@
           <a:p>
             <a:fld id="{72345051-2045-45DA-935E-2E3CA1A69ADC}" type="datetimeFigureOut">
               <a:rPr lang="en-US" smtClean="0"/>
-              <a:t>4/1/2024</a:t>
+              <a:t>4/2/2024</a:t>
             </a:fld>
             <a:endParaRPr lang="en-US"/>
           </a:p>
@@ -4585,7 +4585,7 @@
           <a:p>
             <a:fld id="{72345051-2045-45DA-935E-2E3CA1A69ADC}" type="datetimeFigureOut">
               <a:rPr lang="en-US" smtClean="0"/>
-              <a:t>4/1/2024</a:t>
+              <a:t>4/2/2024</a:t>
             </a:fld>
             <a:endParaRPr lang="en-US"/>
           </a:p>
@@ -5034,7 +5034,7 @@
           <a:p>
             <a:fld id="{72345051-2045-45DA-935E-2E3CA1A69ADC}" type="datetimeFigureOut">
               <a:rPr lang="en-US" smtClean="0"/>
-              <a:t>4/1/2024</a:t>
+              <a:t>4/2/2024</a:t>
             </a:fld>
             <a:endParaRPr lang="en-US"/>
           </a:p>
@@ -5351,7 +5351,7 @@
           <a:p>
             <a:fld id="{72345051-2045-45DA-935E-2E3CA1A69ADC}" type="datetimeFigureOut">
               <a:rPr lang="en-US" smtClean="0"/>
-              <a:t>4/1/2024</a:t>
+              <a:t>4/2/2024</a:t>
             </a:fld>
             <a:endParaRPr lang="en-US"/>
           </a:p>
@@ -5979,7 +5979,7 @@
           <a:p>
             <a:fld id="{72345051-2045-45DA-935E-2E3CA1A69ADC}" type="datetimeFigureOut">
               <a:rPr lang="en-US" smtClean="0"/>
-              <a:t>4/1/2024</a:t>
+              <a:t>4/2/2024</a:t>
             </a:fld>
             <a:endParaRPr lang="en-US"/>
           </a:p>
@@ -6552,7 +6552,7 @@
           <a:p>
             <a:fld id="{72345051-2045-45DA-935E-2E3CA1A69ADC}" type="datetimeFigureOut">
               <a:rPr lang="en-US" smtClean="0"/>
-              <a:t>4/1/2024</a:t>
+              <a:t>4/2/2024</a:t>
             </a:fld>
             <a:endParaRPr lang="en-US" dirty="0"/>
           </a:p>
@@ -7124,13 +7124,18 @@
           <a:p>
             <a:pPr algn="ctr"/>
             <a:r>
-              <a:rPr lang="es-ES" sz="5400" dirty="0">
+              <a:rPr lang="es-ES" sz="5400" dirty="0" err="1">
                 <a:solidFill>
                   <a:schemeClr val="bg1"/>
                 </a:solidFill>
               </a:rPr>
-              <a:t>Ajedrez</a:t>
+              <a:t>TableroConecta</a:t>
             </a:r>
+            <a:endParaRPr lang="es-ES" sz="5400" dirty="0">
+              <a:solidFill>
+                <a:schemeClr val="bg1"/>
+              </a:solidFill>
+            </a:endParaRPr>
           </a:p>
         </p:txBody>
       </p:sp>
@@ -7425,6 +7430,303 @@
           <a:chExt cx="0" cy="0"/>
         </a:xfrm>
       </p:grpSpPr>
+      <p:pic>
+        <p:nvPicPr>
+          <p:cNvPr id="33" name="Picture 32" descr="Movimiento de jaque mate en un tablero de ajedrez">
+            <a:extLst>
+              <a:ext uri="{FF2B5EF4-FFF2-40B4-BE49-F238E27FC236}">
+                <a16:creationId xmlns:a16="http://schemas.microsoft.com/office/drawing/2014/main" id="{7C19B8B7-51A6-4095-DDE1-232B5CF6115B}"/>
+              </a:ext>
+            </a:extLst>
+          </p:cNvPr>
+          <p:cNvPicPr>
+            <a:picLocks noChangeAspect="1"/>
+          </p:cNvPicPr>
+          <p:nvPr/>
+        </p:nvPicPr>
+        <p:blipFill rotWithShape="1">
+          <a:blip r:embed="rId2"/>
+          <a:srcRect t="15414"/>
+          <a:stretch/>
+        </p:blipFill>
+        <p:spPr>
+          <a:xfrm>
+            <a:off x="-3047" y="10"/>
+            <a:ext cx="12191999" cy="6857990"/>
+          </a:xfrm>
+          <a:prstGeom prst="rect">
+            <a:avLst/>
+          </a:prstGeom>
+        </p:spPr>
+      </p:pic>
+      <p:sp>
+        <p:nvSpPr>
+          <p:cNvPr id="37" name="Rectangle 36">
+            <a:extLst>
+              <a:ext uri="{FF2B5EF4-FFF2-40B4-BE49-F238E27FC236}">
+                <a16:creationId xmlns:a16="http://schemas.microsoft.com/office/drawing/2014/main" id="{007891EC-4501-44ED-A8C8-B11B6DB767AB}"/>
+              </a:ext>
+              <a:ext uri="{C183D7F6-B498-43B3-948B-1728B52AA6E4}">
+                <adec:decorative xmlns:adec="http://schemas.microsoft.com/office/drawing/2017/decorative" val="1"/>
+              </a:ext>
+            </a:extLst>
+          </p:cNvPr>
+          <p:cNvSpPr>
+            <a:spLocks noGrp="1" noRot="1" noChangeAspect="1" noMove="1" noResize="1" noEditPoints="1" noAdjustHandles="1" noChangeArrowheads="1" noChangeShapeType="1" noTextEdit="1"/>
+          </p:cNvSpPr>
+          <p:nvPr>
+            <p:extLst>
+              <p:ext uri="{386F3935-93C4-4BCD-93E2-E3B085C9AB24}">
+                <p16:designElem xmlns:p16="http://schemas.microsoft.com/office/powerpoint/2015/main" val="1"/>
+              </p:ext>
+            </p:extLst>
+          </p:nvPr>
+        </p:nvSpPr>
+        <p:spPr>
+          <a:xfrm>
+            <a:off x="0" y="2207602"/>
+            <a:ext cx="12191999" cy="3162146"/>
+          </a:xfrm>
+          <a:prstGeom prst="rect">
+            <a:avLst/>
+          </a:prstGeom>
+          <a:gradFill flip="none" rotWithShape="1">
+            <a:gsLst>
+              <a:gs pos="0">
+                <a:schemeClr val="tx1">
+                  <a:alpha val="0"/>
+                </a:schemeClr>
+              </a:gs>
+              <a:gs pos="50000">
+                <a:schemeClr val="tx1">
+                  <a:alpha val="35000"/>
+                </a:schemeClr>
+              </a:gs>
+              <a:gs pos="100000">
+                <a:schemeClr val="tx1">
+                  <a:alpha val="0"/>
+                </a:schemeClr>
+              </a:gs>
+            </a:gsLst>
+            <a:lin ang="16200000" scaled="1"/>
+            <a:tileRect/>
+          </a:gradFill>
+          <a:ln>
+            <a:noFill/>
+          </a:ln>
+        </p:spPr>
+        <p:style>
+          <a:lnRef idx="2">
+            <a:schemeClr val="accent1">
+              <a:shade val="50000"/>
+            </a:schemeClr>
+          </a:lnRef>
+          <a:fillRef idx="1">
+            <a:schemeClr val="accent1"/>
+          </a:fillRef>
+          <a:effectRef idx="0">
+            <a:schemeClr val="accent1"/>
+          </a:effectRef>
+          <a:fontRef idx="minor">
+            <a:schemeClr val="lt1"/>
+          </a:fontRef>
+        </p:style>
+        <p:txBody>
+          <a:bodyPr rtlCol="0" anchor="ctr"/>
+          <a:lstStyle/>
+          <a:p>
+            <a:pPr algn="ctr"/>
+            <a:endParaRPr lang="en-US"/>
+          </a:p>
+        </p:txBody>
+      </p:sp>
+      <p:cxnSp>
+        <p:nvCxnSpPr>
+          <p:cNvPr id="39" name="Straight Connector 38">
+            <a:extLst>
+              <a:ext uri="{FF2B5EF4-FFF2-40B4-BE49-F238E27FC236}">
+                <a16:creationId xmlns:a16="http://schemas.microsoft.com/office/drawing/2014/main" id="{34E5597F-CE67-4085-9548-E6A8036DA3BB}"/>
+              </a:ext>
+              <a:ext uri="{C183D7F6-B498-43B3-948B-1728B52AA6E4}">
+                <adec:decorative xmlns:adec="http://schemas.microsoft.com/office/drawing/2017/decorative" val="1"/>
+              </a:ext>
+            </a:extLst>
+          </p:cNvPr>
+          <p:cNvCxnSpPr>
+            <a:cxnSpLocks noGrp="1" noRot="1" noChangeAspect="1" noMove="1" noResize="1" noEditPoints="1" noAdjustHandles="1" noChangeArrowheads="1" noChangeShapeType="1"/>
+          </p:cNvCxnSpPr>
+          <p:nvPr>
+            <p:extLst>
+              <p:ext uri="{386F3935-93C4-4BCD-93E2-E3B085C9AB24}">
+                <p16:designElem xmlns:p16="http://schemas.microsoft.com/office/powerpoint/2015/main" val="1"/>
+              </p:ext>
+            </p:extLst>
+          </p:nvPr>
+        </p:nvCxnSpPr>
+        <p:spPr>
+          <a:xfrm>
+            <a:off x="3393881" y="4035362"/>
+            <a:ext cx="5404237" cy="0"/>
+          </a:xfrm>
+          <a:prstGeom prst="line">
+            <a:avLst/>
+          </a:prstGeom>
+          <a:ln>
+            <a:solidFill>
+              <a:schemeClr val="bg1"/>
+            </a:solidFill>
+          </a:ln>
+          <a:effectLst>
+            <a:outerShdw blurRad="50800" dist="38100" dir="2700000" algn="tl" rotWithShape="0">
+              <a:prstClr val="black">
+                <a:alpha val="40000"/>
+              </a:prstClr>
+            </a:outerShdw>
+          </a:effectLst>
+        </p:spPr>
+        <p:style>
+          <a:lnRef idx="1">
+            <a:schemeClr val="accent1"/>
+          </a:lnRef>
+          <a:fillRef idx="0">
+            <a:schemeClr val="accent1"/>
+          </a:fillRef>
+          <a:effectRef idx="0">
+            <a:schemeClr val="accent1"/>
+          </a:effectRef>
+          <a:fontRef idx="minor">
+            <a:schemeClr val="tx1"/>
+          </a:fontRef>
+        </p:style>
+      </p:cxnSp>
+      <p:sp>
+        <p:nvSpPr>
+          <p:cNvPr id="4" name="Título 1">
+            <a:extLst>
+              <a:ext uri="{FF2B5EF4-FFF2-40B4-BE49-F238E27FC236}">
+                <a16:creationId xmlns:a16="http://schemas.microsoft.com/office/drawing/2014/main" id="{96C72C34-9C2E-9EC8-A064-F624AA0C9A60}"/>
+              </a:ext>
+            </a:extLst>
+          </p:cNvPr>
+          <p:cNvSpPr txBox="1">
+            <a:spLocks/>
+          </p:cNvSpPr>
+          <p:nvPr/>
+        </p:nvSpPr>
+        <p:spPr>
+          <a:xfrm>
+            <a:off x="1522465" y="4516482"/>
+            <a:ext cx="9650360" cy="1323601"/>
+          </a:xfrm>
+          <a:prstGeom prst="rect">
+            <a:avLst/>
+          </a:prstGeom>
+        </p:spPr>
+        <p:txBody>
+          <a:bodyPr vert="horz" lIns="91440" tIns="45720" rIns="91440" bIns="45720" rtlCol="0" anchor="b">
+            <a:noAutofit/>
+          </a:bodyPr>
+          <a:lstStyle>
+            <a:lvl1pPr algn="l" defTabSz="914400" rtl="0" eaLnBrk="1" latinLnBrk="0" hangingPunct="1">
+              <a:lnSpc>
+                <a:spcPct val="100000"/>
+              </a:lnSpc>
+              <a:spcBef>
+                <a:spcPct val="0"/>
+              </a:spcBef>
+              <a:buNone/>
+              <a:defRPr sz="9600" kern="1200">
+                <a:solidFill>
+                  <a:schemeClr val="tx1"/>
+                </a:solidFill>
+                <a:latin typeface="+mj-lt"/>
+                <a:ea typeface="+mj-ea"/>
+                <a:cs typeface="+mj-cs"/>
+              </a:defRPr>
+            </a:lvl1pPr>
+          </a:lstStyle>
+          <a:p>
+            <a:pPr algn="ctr"/>
+            <a:r>
+              <a:rPr lang="es-ES" sz="7200" dirty="0">
+                <a:solidFill>
+                  <a:schemeClr val="bg1"/>
+                </a:solidFill>
+              </a:rPr>
+              <a:t>ENTIDAD-RELACION</a:t>
+            </a:r>
+            <a:endParaRPr lang="es-ES" sz="7200" dirty="0"/>
+          </a:p>
+        </p:txBody>
+      </p:sp>
+      <p:pic>
+        <p:nvPicPr>
+          <p:cNvPr id="3" name="Imagen 2">
+            <a:extLst>
+              <a:ext uri="{FF2B5EF4-FFF2-40B4-BE49-F238E27FC236}">
+                <a16:creationId xmlns:a16="http://schemas.microsoft.com/office/drawing/2014/main" id="{38E9BDB6-15CB-79EC-E2E2-F252EDDE8CAD}"/>
+              </a:ext>
+            </a:extLst>
+          </p:cNvPr>
+          <p:cNvPicPr>
+            <a:picLocks noChangeAspect="1"/>
+          </p:cNvPicPr>
+          <p:nvPr/>
+        </p:nvPicPr>
+        <p:blipFill>
+          <a:blip r:embed="rId3"/>
+          <a:stretch>
+            <a:fillRect/>
+          </a:stretch>
+        </p:blipFill>
+        <p:spPr>
+          <a:xfrm>
+            <a:off x="3718143" y="190560"/>
+            <a:ext cx="4520982" cy="3800415"/>
+          </a:xfrm>
+          <a:prstGeom prst="rect">
+            <a:avLst/>
+          </a:prstGeom>
+        </p:spPr>
+      </p:pic>
+    </p:spTree>
+    <p:extLst>
+      <p:ext uri="{BB962C8B-B14F-4D97-AF65-F5344CB8AC3E}">
+        <p14:creationId xmlns:p14="http://schemas.microsoft.com/office/powerpoint/2010/main" val="3713276915"/>
+      </p:ext>
+    </p:extLst>
+  </p:cSld>
+  <p:clrMapOvr>
+    <a:masterClrMapping/>
+  </p:clrMapOvr>
+</p:sld>
+</file>
+
+<file path=ppt/slides/slide3.xml><?xml version="1.0" encoding="utf-8"?>
+<p:sld xmlns:a="http://schemas.openxmlformats.org/drawingml/2006/main" xmlns:r="http://schemas.openxmlformats.org/officeDocument/2006/relationships" xmlns:p="http://schemas.openxmlformats.org/presentationml/2006/main">
+  <p:cSld>
+    <p:bg>
+      <p:bgPr>
+        <a:solidFill>
+          <a:schemeClr val="bg1"/>
+        </a:solidFill>
+        <a:effectLst/>
+      </p:bgPr>
+    </p:bg>
+    <p:spTree>
+      <p:nvGrpSpPr>
+        <p:cNvPr id="1" name=""/>
+        <p:cNvGrpSpPr/>
+        <p:nvPr/>
+      </p:nvGrpSpPr>
+      <p:grpSpPr>
+        <a:xfrm>
+          <a:off x="0" y="0"/>
+          <a:ext cx="0" cy="0"/>
+          <a:chOff x="0" y="0"/>
+          <a:chExt cx="0" cy="0"/>
+        </a:xfrm>
+      </p:grpSpPr>
       <p:sp useBgFill="1">
         <p:nvSpPr>
           <p:cNvPr id="63" name="Rectangle 58">
@@ -7503,7 +7805,7 @@
         </p:nvSpPr>
         <p:spPr>
           <a:xfrm>
-            <a:off x="638882" y="639193"/>
+            <a:off x="484920" y="954938"/>
             <a:ext cx="3571810" cy="3573516"/>
           </a:xfrm>
         </p:spPr>
@@ -7514,7 +7816,7 @@
           <a:lstStyle/>
           <a:p>
             <a:r>
-              <a:rPr lang="es-ES" sz="5400"/>
+              <a:rPr lang="es-ES" sz="5400" dirty="0"/>
               <a:t>WIREFLOW</a:t>
             </a:r>
           </a:p>
@@ -7814,8 +8116,8 @@
         </p:blipFill>
         <p:spPr>
           <a:xfrm>
-            <a:off x="4654296" y="1612976"/>
-            <a:ext cx="7214616" cy="3604616"/>
+            <a:off x="3898374" y="1307192"/>
+            <a:ext cx="8083550" cy="4188751"/>
           </a:xfrm>
           <a:prstGeom prst="rect">
             <a:avLst/>
@@ -7927,1182 +8229,6 @@
 </p:sld>
 </file>
 
-<file path=ppt/slides/slide3.xml><?xml version="1.0" encoding="utf-8"?>
-<p:sld xmlns:a="http://schemas.openxmlformats.org/drawingml/2006/main" xmlns:r="http://schemas.openxmlformats.org/officeDocument/2006/relationships" xmlns:p="http://schemas.openxmlformats.org/presentationml/2006/main">
-  <p:cSld>
-    <p:bg>
-      <p:bgPr>
-        <a:solidFill>
-          <a:schemeClr val="bg1"/>
-        </a:solidFill>
-        <a:effectLst/>
-      </p:bgPr>
-    </p:bg>
-    <p:spTree>
-      <p:nvGrpSpPr>
-        <p:cNvPr id="1" name="">
-          <a:extLst>
-            <a:ext uri="{FF2B5EF4-FFF2-40B4-BE49-F238E27FC236}">
-              <a16:creationId xmlns:a16="http://schemas.microsoft.com/office/drawing/2014/main" id="{0AD6C506-1D6D-50EB-0547-58A7D4C835C0}"/>
-            </a:ext>
-          </a:extLst>
-        </p:cNvPr>
-        <p:cNvGrpSpPr/>
-        <p:nvPr/>
-      </p:nvGrpSpPr>
-      <p:grpSpPr>
-        <a:xfrm>
-          <a:off x="0" y="0"/>
-          <a:ext cx="0" cy="0"/>
-          <a:chOff x="0" y="0"/>
-          <a:chExt cx="0" cy="0"/>
-        </a:xfrm>
-      </p:grpSpPr>
-      <p:sp useBgFill="1">
-        <p:nvSpPr>
-          <p:cNvPr id="34" name="Rectangle 33">
-            <a:extLst>
-              <a:ext uri="{FF2B5EF4-FFF2-40B4-BE49-F238E27FC236}">
-                <a16:creationId xmlns:a16="http://schemas.microsoft.com/office/drawing/2014/main" id="{584EA28C-303C-7B5C-CA4C-08BD9851FC5C}"/>
-              </a:ext>
-              <a:ext uri="{C183D7F6-B498-43B3-948B-1728B52AA6E4}">
-                <adec:decorative xmlns:adec="http://schemas.microsoft.com/office/drawing/2017/decorative" val="1"/>
-              </a:ext>
-            </a:extLst>
-          </p:cNvPr>
-          <p:cNvSpPr>
-            <a:spLocks noGrp="1" noRot="1" noChangeAspect="1" noMove="1" noResize="1" noEditPoints="1" noAdjustHandles="1" noChangeArrowheads="1" noChangeShapeType="1" noTextEdit="1"/>
-          </p:cNvSpPr>
-          <p:nvPr>
-            <p:extLst>
-              <p:ext uri="{386F3935-93C4-4BCD-93E2-E3B085C9AB24}">
-                <p16:designElem xmlns:p16="http://schemas.microsoft.com/office/powerpoint/2015/main" val="1"/>
-              </p:ext>
-            </p:extLst>
-          </p:nvPr>
-        </p:nvSpPr>
-        <p:spPr>
-          <a:xfrm>
-            <a:off x="0" y="0"/>
-            <a:ext cx="12188952" cy="6858000"/>
-          </a:xfrm>
-          <a:prstGeom prst="rect">
-            <a:avLst/>
-          </a:prstGeom>
-          <a:ln>
-            <a:noFill/>
-          </a:ln>
-        </p:spPr>
-        <p:style>
-          <a:lnRef idx="2">
-            <a:schemeClr val="accent1">
-              <a:shade val="50000"/>
-            </a:schemeClr>
-          </a:lnRef>
-          <a:fillRef idx="1">
-            <a:schemeClr val="accent1"/>
-          </a:fillRef>
-          <a:effectRef idx="0">
-            <a:schemeClr val="accent1"/>
-          </a:effectRef>
-          <a:fontRef idx="minor">
-            <a:schemeClr val="lt1"/>
-          </a:fontRef>
-        </p:style>
-        <p:txBody>
-          <a:bodyPr rtlCol="0" anchor="ctr"/>
-          <a:lstStyle/>
-          <a:p>
-            <a:pPr algn="ctr"/>
-            <a:endParaRPr lang="en-US"/>
-          </a:p>
-        </p:txBody>
-      </p:sp>
-      <p:pic>
-        <p:nvPicPr>
-          <p:cNvPr id="4" name="Picture 3" descr="Arte de círculo 3D de neón">
-            <a:extLst>
-              <a:ext uri="{FF2B5EF4-FFF2-40B4-BE49-F238E27FC236}">
-                <a16:creationId xmlns:a16="http://schemas.microsoft.com/office/drawing/2014/main" id="{A44C0233-9D35-B8EA-877F-BFD31DFDF18F}"/>
-              </a:ext>
-            </a:extLst>
-          </p:cNvPr>
-          <p:cNvPicPr>
-            <a:picLocks noChangeAspect="1"/>
-          </p:cNvPicPr>
-          <p:nvPr/>
-        </p:nvPicPr>
-        <p:blipFill rotWithShape="1">
-          <a:blip r:embed="rId2">
-            <a:alphaModFix amt="50000"/>
-          </a:blip>
-          <a:srcRect t="21309" r="-1" b="-1"/>
-          <a:stretch/>
-        </p:blipFill>
-        <p:spPr>
-          <a:xfrm>
-            <a:off x="0" y="0"/>
-            <a:ext cx="12188931" cy="6857990"/>
-          </a:xfrm>
-          <a:prstGeom prst="rect">
-            <a:avLst/>
-          </a:prstGeom>
-        </p:spPr>
-      </p:pic>
-      <p:sp>
-        <p:nvSpPr>
-          <p:cNvPr id="2" name="Título 1">
-            <a:extLst>
-              <a:ext uri="{FF2B5EF4-FFF2-40B4-BE49-F238E27FC236}">
-                <a16:creationId xmlns:a16="http://schemas.microsoft.com/office/drawing/2014/main" id="{74B88030-88EB-69BA-43E6-61A24F1BAD28}"/>
-              </a:ext>
-            </a:extLst>
-          </p:cNvPr>
-          <p:cNvSpPr>
-            <a:spLocks noGrp="1"/>
-          </p:cNvSpPr>
-          <p:nvPr>
-            <p:ph type="ctrTitle"/>
-          </p:nvPr>
-        </p:nvSpPr>
-        <p:spPr>
-          <a:xfrm>
-            <a:off x="1522465" y="4516482"/>
-            <a:ext cx="9144000" cy="1719594"/>
-          </a:xfrm>
-        </p:spPr>
-        <p:txBody>
-          <a:bodyPr>
-            <a:normAutofit/>
-          </a:bodyPr>
-          <a:lstStyle/>
-          <a:p>
-            <a:pPr algn="ctr"/>
-            <a:r>
-              <a:rPr lang="es-ES" dirty="0"/>
-              <a:t>GUÍA ESTILO</a:t>
-            </a:r>
-          </a:p>
-        </p:txBody>
-      </p:sp>
-      <p:sp>
-        <p:nvSpPr>
-          <p:cNvPr id="3" name="Subtítulo 2">
-            <a:extLst>
-              <a:ext uri="{FF2B5EF4-FFF2-40B4-BE49-F238E27FC236}">
-                <a16:creationId xmlns:a16="http://schemas.microsoft.com/office/drawing/2014/main" id="{15829599-8E88-B5A0-1EAE-D3FF0A5AB792}"/>
-              </a:ext>
-            </a:extLst>
-          </p:cNvPr>
-          <p:cNvSpPr>
-            <a:spLocks noGrp="1"/>
-          </p:cNvSpPr>
-          <p:nvPr>
-            <p:ph type="subTitle" idx="1"/>
-          </p:nvPr>
-        </p:nvSpPr>
-        <p:spPr>
-          <a:xfrm>
-            <a:off x="1315431" y="1153524"/>
-            <a:ext cx="9219426" cy="1416664"/>
-          </a:xfrm>
-        </p:spPr>
-        <p:txBody>
-          <a:bodyPr anchor="ctr">
-            <a:normAutofit/>
-          </a:bodyPr>
-          <a:lstStyle/>
-          <a:p>
-            <a:pPr algn="ctr">
-              <a:lnSpc>
-                <a:spcPct val="100000"/>
-              </a:lnSpc>
-            </a:pPr>
-            <a:r>
-              <a:rPr lang="es-ES" sz="3600" b="1" dirty="0"/>
-              <a:t>Se emplean colores oscuros en su mayoría el azul y verde, aunque también se emplea el morado en los logos y tarjetas de la página. Todos con tonalidades neón </a:t>
-            </a:r>
-          </a:p>
-        </p:txBody>
-      </p:sp>
-      <p:sp>
-        <p:nvSpPr>
-          <p:cNvPr id="36" name="Rectangle 6">
-            <a:extLst>
-              <a:ext uri="{FF2B5EF4-FFF2-40B4-BE49-F238E27FC236}">
-                <a16:creationId xmlns:a16="http://schemas.microsoft.com/office/drawing/2014/main" id="{2972B127-5927-3384-AB69-CC4706D4EEF6}"/>
-              </a:ext>
-              <a:ext uri="{C183D7F6-B498-43B3-948B-1728B52AA6E4}">
-                <adec:decorative xmlns:adec="http://schemas.microsoft.com/office/drawing/2017/decorative" val="1"/>
-              </a:ext>
-            </a:extLst>
-          </p:cNvPr>
-          <p:cNvSpPr>
-            <a:spLocks noGrp="1" noRot="1" noChangeAspect="1" noMove="1" noResize="1" noEditPoints="1" noAdjustHandles="1" noChangeArrowheads="1" noChangeShapeType="1" noTextEdit="1"/>
-          </p:cNvSpPr>
-          <p:nvPr>
-            <p:extLst>
-              <p:ext uri="{386F3935-93C4-4BCD-93E2-E3B085C9AB24}">
-                <p16:designElem xmlns:p16="http://schemas.microsoft.com/office/powerpoint/2015/main" val="1"/>
-              </p:ext>
-            </p:extLst>
-          </p:nvPr>
-        </p:nvSpPr>
-        <p:spPr>
-          <a:xfrm>
-            <a:off x="3974206" y="4419423"/>
-            <a:ext cx="4243589" cy="27432"/>
-          </a:xfrm>
-          <a:custGeom>
-            <a:avLst/>
-            <a:gdLst>
-              <a:gd name="connsiteX0" fmla="*/ 0 w 4243589"/>
-              <a:gd name="connsiteY0" fmla="*/ 0 h 27432"/>
-              <a:gd name="connsiteX1" fmla="*/ 563791 w 4243589"/>
-              <a:gd name="connsiteY1" fmla="*/ 0 h 27432"/>
-              <a:gd name="connsiteX2" fmla="*/ 1042710 w 4243589"/>
-              <a:gd name="connsiteY2" fmla="*/ 0 h 27432"/>
-              <a:gd name="connsiteX3" fmla="*/ 1564066 w 4243589"/>
-              <a:gd name="connsiteY3" fmla="*/ 0 h 27432"/>
-              <a:gd name="connsiteX4" fmla="*/ 2212729 w 4243589"/>
-              <a:gd name="connsiteY4" fmla="*/ 0 h 27432"/>
-              <a:gd name="connsiteX5" fmla="*/ 2776520 w 4243589"/>
-              <a:gd name="connsiteY5" fmla="*/ 0 h 27432"/>
-              <a:gd name="connsiteX6" fmla="*/ 3297875 w 4243589"/>
-              <a:gd name="connsiteY6" fmla="*/ 0 h 27432"/>
-              <a:gd name="connsiteX7" fmla="*/ 4243589 w 4243589"/>
-              <a:gd name="connsiteY7" fmla="*/ 0 h 27432"/>
-              <a:gd name="connsiteX8" fmla="*/ 4243589 w 4243589"/>
-              <a:gd name="connsiteY8" fmla="*/ 27432 h 27432"/>
-              <a:gd name="connsiteX9" fmla="*/ 3637362 w 4243589"/>
-              <a:gd name="connsiteY9" fmla="*/ 27432 h 27432"/>
-              <a:gd name="connsiteX10" fmla="*/ 3116007 w 4243589"/>
-              <a:gd name="connsiteY10" fmla="*/ 27432 h 27432"/>
-              <a:gd name="connsiteX11" fmla="*/ 2424908 w 4243589"/>
-              <a:gd name="connsiteY11" fmla="*/ 27432 h 27432"/>
-              <a:gd name="connsiteX12" fmla="*/ 1861117 w 4243589"/>
-              <a:gd name="connsiteY12" fmla="*/ 27432 h 27432"/>
-              <a:gd name="connsiteX13" fmla="*/ 1382198 w 4243589"/>
-              <a:gd name="connsiteY13" fmla="*/ 27432 h 27432"/>
-              <a:gd name="connsiteX14" fmla="*/ 733535 w 4243589"/>
-              <a:gd name="connsiteY14" fmla="*/ 27432 h 27432"/>
-              <a:gd name="connsiteX15" fmla="*/ 0 w 4243589"/>
-              <a:gd name="connsiteY15" fmla="*/ 27432 h 27432"/>
-              <a:gd name="connsiteX16" fmla="*/ 0 w 4243589"/>
-              <a:gd name="connsiteY16" fmla="*/ 0 h 27432"/>
-            </a:gdLst>
-            <a:ahLst/>
-            <a:cxnLst>
-              <a:cxn ang="0">
-                <a:pos x="connsiteX0" y="connsiteY0"/>
-              </a:cxn>
-              <a:cxn ang="0">
-                <a:pos x="connsiteX1" y="connsiteY1"/>
-              </a:cxn>
-              <a:cxn ang="0">
-                <a:pos x="connsiteX2" y="connsiteY2"/>
-              </a:cxn>
-              <a:cxn ang="0">
-                <a:pos x="connsiteX3" y="connsiteY3"/>
-              </a:cxn>
-              <a:cxn ang="0">
-                <a:pos x="connsiteX4" y="connsiteY4"/>
-              </a:cxn>
-              <a:cxn ang="0">
-                <a:pos x="connsiteX5" y="connsiteY5"/>
-              </a:cxn>
-              <a:cxn ang="0">
-                <a:pos x="connsiteX6" y="connsiteY6"/>
-              </a:cxn>
-              <a:cxn ang="0">
-                <a:pos x="connsiteX7" y="connsiteY7"/>
-              </a:cxn>
-              <a:cxn ang="0">
-                <a:pos x="connsiteX8" y="connsiteY8"/>
-              </a:cxn>
-              <a:cxn ang="0">
-                <a:pos x="connsiteX9" y="connsiteY9"/>
-              </a:cxn>
-              <a:cxn ang="0">
-                <a:pos x="connsiteX10" y="connsiteY10"/>
-              </a:cxn>
-              <a:cxn ang="0">
-                <a:pos x="connsiteX11" y="connsiteY11"/>
-              </a:cxn>
-              <a:cxn ang="0">
-                <a:pos x="connsiteX12" y="connsiteY12"/>
-              </a:cxn>
-              <a:cxn ang="0">
-                <a:pos x="connsiteX13" y="connsiteY13"/>
-              </a:cxn>
-              <a:cxn ang="0">
-                <a:pos x="connsiteX14" y="connsiteY14"/>
-              </a:cxn>
-              <a:cxn ang="0">
-                <a:pos x="connsiteX15" y="connsiteY15"/>
-              </a:cxn>
-              <a:cxn ang="0">
-                <a:pos x="connsiteX16" y="connsiteY16"/>
-              </a:cxn>
-            </a:cxnLst>
-            <a:rect l="l" t="t" r="r" b="b"/>
-            <a:pathLst>
-              <a:path w="4243589" h="27432" fill="none" extrusionOk="0">
-                <a:moveTo>
-                  <a:pt x="0" y="0"/>
-                </a:moveTo>
-                <a:cubicBezTo>
-                  <a:pt x="157351" y="-15653"/>
-                  <a:pt x="378877" y="-5828"/>
-                  <a:pt x="563791" y="0"/>
-                </a:cubicBezTo>
-                <a:cubicBezTo>
-                  <a:pt x="748705" y="5828"/>
-                  <a:pt x="905659" y="-5525"/>
-                  <a:pt x="1042710" y="0"/>
-                </a:cubicBezTo>
-                <a:cubicBezTo>
-                  <a:pt x="1179761" y="5525"/>
-                  <a:pt x="1356845" y="-21288"/>
-                  <a:pt x="1564066" y="0"/>
-                </a:cubicBezTo>
-                <a:cubicBezTo>
-                  <a:pt x="1771287" y="21288"/>
-                  <a:pt x="1912099" y="25135"/>
-                  <a:pt x="2212729" y="0"/>
-                </a:cubicBezTo>
-                <a:cubicBezTo>
-                  <a:pt x="2513359" y="-25135"/>
-                  <a:pt x="2514918" y="-27119"/>
-                  <a:pt x="2776520" y="0"/>
-                </a:cubicBezTo>
-                <a:cubicBezTo>
-                  <a:pt x="3038122" y="27119"/>
-                  <a:pt x="3178771" y="18116"/>
-                  <a:pt x="3297875" y="0"/>
-                </a:cubicBezTo>
-                <a:cubicBezTo>
-                  <a:pt x="3416980" y="-18116"/>
-                  <a:pt x="4012240" y="-40869"/>
-                  <a:pt x="4243589" y="0"/>
-                </a:cubicBezTo>
-                <a:cubicBezTo>
-                  <a:pt x="4242616" y="8304"/>
-                  <a:pt x="4243111" y="21512"/>
-                  <a:pt x="4243589" y="27432"/>
-                </a:cubicBezTo>
-                <a:cubicBezTo>
-                  <a:pt x="4112949" y="6289"/>
-                  <a:pt x="3928037" y="10975"/>
-                  <a:pt x="3637362" y="27432"/>
-                </a:cubicBezTo>
-                <a:cubicBezTo>
-                  <a:pt x="3346687" y="43889"/>
-                  <a:pt x="3254446" y="35813"/>
-                  <a:pt x="3116007" y="27432"/>
-                </a:cubicBezTo>
-                <a:cubicBezTo>
-                  <a:pt x="2977569" y="19051"/>
-                  <a:pt x="2620228" y="38017"/>
-                  <a:pt x="2424908" y="27432"/>
-                </a:cubicBezTo>
-                <a:cubicBezTo>
-                  <a:pt x="2229588" y="16847"/>
-                  <a:pt x="2088287" y="5290"/>
-                  <a:pt x="1861117" y="27432"/>
-                </a:cubicBezTo>
-                <a:cubicBezTo>
-                  <a:pt x="1633947" y="49574"/>
-                  <a:pt x="1502447" y="8273"/>
-                  <a:pt x="1382198" y="27432"/>
-                </a:cubicBezTo>
-                <a:cubicBezTo>
-                  <a:pt x="1261949" y="46591"/>
-                  <a:pt x="1045440" y="37497"/>
-                  <a:pt x="733535" y="27432"/>
-                </a:cubicBezTo>
-                <a:cubicBezTo>
-                  <a:pt x="421630" y="17367"/>
-                  <a:pt x="341257" y="-9215"/>
-                  <a:pt x="0" y="27432"/>
-                </a:cubicBezTo>
-                <a:cubicBezTo>
-                  <a:pt x="-1048" y="14992"/>
-                  <a:pt x="-1120" y="7447"/>
-                  <a:pt x="0" y="0"/>
-                </a:cubicBezTo>
-                <a:close/>
-              </a:path>
-              <a:path w="4243589" h="27432" stroke="0" extrusionOk="0">
-                <a:moveTo>
-                  <a:pt x="0" y="0"/>
-                </a:moveTo>
-                <a:cubicBezTo>
-                  <a:pt x="128164" y="17204"/>
-                  <a:pt x="312653" y="1129"/>
-                  <a:pt x="563791" y="0"/>
-                </a:cubicBezTo>
-                <a:cubicBezTo>
-                  <a:pt x="814929" y="-1129"/>
-                  <a:pt x="837271" y="8503"/>
-                  <a:pt x="1042710" y="0"/>
-                </a:cubicBezTo>
-                <a:cubicBezTo>
-                  <a:pt x="1248149" y="-8503"/>
-                  <a:pt x="1588432" y="-28862"/>
-                  <a:pt x="1733809" y="0"/>
-                </a:cubicBezTo>
-                <a:cubicBezTo>
-                  <a:pt x="1879186" y="28862"/>
-                  <a:pt x="2052815" y="5974"/>
-                  <a:pt x="2297600" y="0"/>
-                </a:cubicBezTo>
-                <a:cubicBezTo>
-                  <a:pt x="2542385" y="-5974"/>
-                  <a:pt x="2699960" y="-23550"/>
-                  <a:pt x="2861391" y="0"/>
-                </a:cubicBezTo>
-                <a:cubicBezTo>
-                  <a:pt x="3022822" y="23550"/>
-                  <a:pt x="3390411" y="25272"/>
-                  <a:pt x="3552490" y="0"/>
-                </a:cubicBezTo>
-                <a:cubicBezTo>
-                  <a:pt x="3714569" y="-25272"/>
-                  <a:pt x="3950585" y="-31327"/>
-                  <a:pt x="4243589" y="0"/>
-                </a:cubicBezTo>
-                <a:cubicBezTo>
-                  <a:pt x="4244074" y="9333"/>
-                  <a:pt x="4244867" y="19699"/>
-                  <a:pt x="4243589" y="27432"/>
-                </a:cubicBezTo>
-                <a:cubicBezTo>
-                  <a:pt x="4130424" y="7904"/>
-                  <a:pt x="3932803" y="51393"/>
-                  <a:pt x="3722234" y="27432"/>
-                </a:cubicBezTo>
-                <a:cubicBezTo>
-                  <a:pt x="3511665" y="3471"/>
-                  <a:pt x="3269903" y="55138"/>
-                  <a:pt x="3116007" y="27432"/>
-                </a:cubicBezTo>
-                <a:cubicBezTo>
-                  <a:pt x="2962111" y="-274"/>
-                  <a:pt x="2744280" y="32368"/>
-                  <a:pt x="2509780" y="27432"/>
-                </a:cubicBezTo>
-                <a:cubicBezTo>
-                  <a:pt x="2275280" y="22496"/>
-                  <a:pt x="2066059" y="52808"/>
-                  <a:pt x="1945989" y="27432"/>
-                </a:cubicBezTo>
-                <a:cubicBezTo>
-                  <a:pt x="1825919" y="2056"/>
-                  <a:pt x="1407329" y="21760"/>
-                  <a:pt x="1254890" y="27432"/>
-                </a:cubicBezTo>
-                <a:cubicBezTo>
-                  <a:pt x="1102451" y="33104"/>
-                  <a:pt x="837950" y="40817"/>
-                  <a:pt x="563791" y="27432"/>
-                </a:cubicBezTo>
-                <a:cubicBezTo>
-                  <a:pt x="289632" y="14047"/>
-                  <a:pt x="132768" y="16249"/>
-                  <a:pt x="0" y="27432"/>
-                </a:cubicBezTo>
-                <a:cubicBezTo>
-                  <a:pt x="211" y="18145"/>
-                  <a:pt x="120" y="6480"/>
-                  <a:pt x="0" y="0"/>
-                </a:cubicBezTo>
-                <a:close/>
-              </a:path>
-            </a:pathLst>
-          </a:custGeom>
-          <a:solidFill>
-            <a:schemeClr val="tx1"/>
-          </a:solidFill>
-          <a:ln w="38100" cap="rnd">
-            <a:solidFill>
-              <a:schemeClr val="tx1"/>
-            </a:solidFill>
-            <a:round/>
-            <a:extLst>
-              <a:ext uri="{C807C97D-BFC1-408E-A445-0C87EB9F89A2}">
-                <ask:lineSketchStyleProps xmlns:ask="http://schemas.microsoft.com/office/drawing/2018/sketchyshapes" sd="1219033472">
-                  <a:prstGeom prst="rect">
-                    <a:avLst/>
-                  </a:prstGeom>
-                  <ask:type>
-                    <ask:lineSketchFreehand/>
-                  </ask:type>
-                </ask:lineSketchStyleProps>
-              </a:ext>
-            </a:extLst>
-          </a:ln>
-        </p:spPr>
-        <p:style>
-          <a:lnRef idx="2">
-            <a:schemeClr val="accent1">
-              <a:shade val="50000"/>
-            </a:schemeClr>
-          </a:lnRef>
-          <a:fillRef idx="1">
-            <a:schemeClr val="accent1"/>
-          </a:fillRef>
-          <a:effectRef idx="0">
-            <a:schemeClr val="accent1"/>
-          </a:effectRef>
-          <a:fontRef idx="minor">
-            <a:schemeClr val="lt1"/>
-          </a:fontRef>
-        </p:style>
-        <p:txBody>
-          <a:bodyPr rtlCol="0" anchor="ctr"/>
-          <a:lstStyle/>
-          <a:p>
-            <a:pPr algn="ctr"/>
-            <a:endParaRPr lang="en-US"/>
-          </a:p>
-        </p:txBody>
-      </p:sp>
-      <p:sp>
-        <p:nvSpPr>
-          <p:cNvPr id="38" name="Rectangle 6">
-            <a:extLst>
-              <a:ext uri="{FF2B5EF4-FFF2-40B4-BE49-F238E27FC236}">
-                <a16:creationId xmlns:a16="http://schemas.microsoft.com/office/drawing/2014/main" id="{6910D339-ABCA-2253-BDD9-F780BBF1B2D1}"/>
-              </a:ext>
-              <a:ext uri="{C183D7F6-B498-43B3-948B-1728B52AA6E4}">
-                <adec:decorative xmlns:adec="http://schemas.microsoft.com/office/drawing/2017/decorative" val="1"/>
-              </a:ext>
-            </a:extLst>
-          </p:cNvPr>
-          <p:cNvSpPr>
-            <a:spLocks noGrp="1" noRot="1" noChangeAspect="1" noMove="1" noResize="1" noEditPoints="1" noAdjustHandles="1" noChangeArrowheads="1" noChangeShapeType="1" noTextEdit="1"/>
-          </p:cNvSpPr>
-          <p:nvPr>
-            <p:extLst>
-              <p:ext uri="{386F3935-93C4-4BCD-93E2-E3B085C9AB24}">
-                <p16:designElem xmlns:p16="http://schemas.microsoft.com/office/powerpoint/2015/main" val="1"/>
-              </p:ext>
-            </p:extLst>
-          </p:nvPr>
-        </p:nvSpPr>
-        <p:spPr>
-          <a:xfrm flipV="1">
-            <a:off x="838200" y="720953"/>
-            <a:ext cx="10515600" cy="5416094"/>
-          </a:xfrm>
-          <a:custGeom>
-            <a:avLst/>
-            <a:gdLst>
-              <a:gd name="connsiteX0" fmla="*/ 0 w 10515600"/>
-              <a:gd name="connsiteY0" fmla="*/ 902700 h 5416094"/>
-              <a:gd name="connsiteX1" fmla="*/ 902700 w 10515600"/>
-              <a:gd name="connsiteY1" fmla="*/ 0 h 5416094"/>
-              <a:gd name="connsiteX2" fmla="*/ 1746919 w 10515600"/>
-              <a:gd name="connsiteY2" fmla="*/ 0 h 5416094"/>
-              <a:gd name="connsiteX3" fmla="*/ 2329833 w 10515600"/>
-              <a:gd name="connsiteY3" fmla="*/ 0 h 5416094"/>
-              <a:gd name="connsiteX4" fmla="*/ 2825644 w 10515600"/>
-              <a:gd name="connsiteY4" fmla="*/ 0 h 5416094"/>
-              <a:gd name="connsiteX5" fmla="*/ 3582762 w 10515600"/>
-              <a:gd name="connsiteY5" fmla="*/ 0 h 5416094"/>
-              <a:gd name="connsiteX6" fmla="*/ 4165675 w 10515600"/>
-              <a:gd name="connsiteY6" fmla="*/ 0 h 5416094"/>
-              <a:gd name="connsiteX7" fmla="*/ 5009894 w 10515600"/>
-              <a:gd name="connsiteY7" fmla="*/ 0 h 5416094"/>
-              <a:gd name="connsiteX8" fmla="*/ 5505706 w 10515600"/>
-              <a:gd name="connsiteY8" fmla="*/ 0 h 5416094"/>
-              <a:gd name="connsiteX9" fmla="*/ 6349925 w 10515600"/>
-              <a:gd name="connsiteY9" fmla="*/ 0 h 5416094"/>
-              <a:gd name="connsiteX10" fmla="*/ 6758634 w 10515600"/>
-              <a:gd name="connsiteY10" fmla="*/ 0 h 5416094"/>
-              <a:gd name="connsiteX11" fmla="*/ 7428650 w 10515600"/>
-              <a:gd name="connsiteY11" fmla="*/ 0 h 5416094"/>
-              <a:gd name="connsiteX12" fmla="*/ 8098665 w 10515600"/>
-              <a:gd name="connsiteY12" fmla="*/ 0 h 5416094"/>
-              <a:gd name="connsiteX13" fmla="*/ 8681579 w 10515600"/>
-              <a:gd name="connsiteY13" fmla="*/ 0 h 5416094"/>
-              <a:gd name="connsiteX14" fmla="*/ 9612900 w 10515600"/>
-              <a:gd name="connsiteY14" fmla="*/ 0 h 5416094"/>
-              <a:gd name="connsiteX15" fmla="*/ 10515600 w 10515600"/>
-              <a:gd name="connsiteY15" fmla="*/ 902700 h 5416094"/>
-              <a:gd name="connsiteX16" fmla="*/ 10515600 w 10515600"/>
-              <a:gd name="connsiteY16" fmla="*/ 1504482 h 5416094"/>
-              <a:gd name="connsiteX17" fmla="*/ 10515600 w 10515600"/>
-              <a:gd name="connsiteY17" fmla="*/ 2178479 h 5416094"/>
-              <a:gd name="connsiteX18" fmla="*/ 10515600 w 10515600"/>
-              <a:gd name="connsiteY18" fmla="*/ 2780261 h 5416094"/>
-              <a:gd name="connsiteX19" fmla="*/ 10515600 w 10515600"/>
-              <a:gd name="connsiteY19" fmla="*/ 3273722 h 5416094"/>
-              <a:gd name="connsiteX20" fmla="*/ 10515600 w 10515600"/>
-              <a:gd name="connsiteY20" fmla="*/ 3803291 h 5416094"/>
-              <a:gd name="connsiteX21" fmla="*/ 10515600 w 10515600"/>
-              <a:gd name="connsiteY21" fmla="*/ 4513394 h 5416094"/>
-              <a:gd name="connsiteX22" fmla="*/ 9612900 w 10515600"/>
-              <a:gd name="connsiteY22" fmla="*/ 5416094 h 5416094"/>
-              <a:gd name="connsiteX23" fmla="*/ 9117089 w 10515600"/>
-              <a:gd name="connsiteY23" fmla="*/ 5416094 h 5416094"/>
-              <a:gd name="connsiteX24" fmla="*/ 8708379 w 10515600"/>
-              <a:gd name="connsiteY24" fmla="*/ 5416094 h 5416094"/>
-              <a:gd name="connsiteX25" fmla="*/ 8299670 w 10515600"/>
-              <a:gd name="connsiteY25" fmla="*/ 5416094 h 5416094"/>
-              <a:gd name="connsiteX26" fmla="*/ 7629654 w 10515600"/>
-              <a:gd name="connsiteY26" fmla="*/ 5416094 h 5416094"/>
-              <a:gd name="connsiteX27" fmla="*/ 7133843 w 10515600"/>
-              <a:gd name="connsiteY27" fmla="*/ 5416094 h 5416094"/>
-              <a:gd name="connsiteX28" fmla="*/ 6376726 w 10515600"/>
-              <a:gd name="connsiteY28" fmla="*/ 5416094 h 5416094"/>
-              <a:gd name="connsiteX29" fmla="*/ 5880914 w 10515600"/>
-              <a:gd name="connsiteY29" fmla="*/ 5416094 h 5416094"/>
-              <a:gd name="connsiteX30" fmla="*/ 5123797 w 10515600"/>
-              <a:gd name="connsiteY30" fmla="*/ 5416094 h 5416094"/>
-              <a:gd name="connsiteX31" fmla="*/ 4715088 w 10515600"/>
-              <a:gd name="connsiteY31" fmla="*/ 5416094 h 5416094"/>
-              <a:gd name="connsiteX32" fmla="*/ 3957970 w 10515600"/>
-              <a:gd name="connsiteY32" fmla="*/ 5416094 h 5416094"/>
-              <a:gd name="connsiteX33" fmla="*/ 3462159 w 10515600"/>
-              <a:gd name="connsiteY33" fmla="*/ 5416094 h 5416094"/>
-              <a:gd name="connsiteX34" fmla="*/ 3053449 w 10515600"/>
-              <a:gd name="connsiteY34" fmla="*/ 5416094 h 5416094"/>
-              <a:gd name="connsiteX35" fmla="*/ 2557638 w 10515600"/>
-              <a:gd name="connsiteY35" fmla="*/ 5416094 h 5416094"/>
-              <a:gd name="connsiteX36" fmla="*/ 1800521 w 10515600"/>
-              <a:gd name="connsiteY36" fmla="*/ 5416094 h 5416094"/>
-              <a:gd name="connsiteX37" fmla="*/ 902700 w 10515600"/>
-              <a:gd name="connsiteY37" fmla="*/ 5416094 h 5416094"/>
-              <a:gd name="connsiteX38" fmla="*/ 0 w 10515600"/>
-              <a:gd name="connsiteY38" fmla="*/ 4513394 h 5416094"/>
-              <a:gd name="connsiteX39" fmla="*/ 0 w 10515600"/>
-              <a:gd name="connsiteY39" fmla="*/ 3911612 h 5416094"/>
-              <a:gd name="connsiteX40" fmla="*/ 0 w 10515600"/>
-              <a:gd name="connsiteY40" fmla="*/ 3309829 h 5416094"/>
-              <a:gd name="connsiteX41" fmla="*/ 0 w 10515600"/>
-              <a:gd name="connsiteY41" fmla="*/ 2780261 h 5416094"/>
-              <a:gd name="connsiteX42" fmla="*/ 0 w 10515600"/>
-              <a:gd name="connsiteY42" fmla="*/ 2106265 h 5416094"/>
-              <a:gd name="connsiteX43" fmla="*/ 0 w 10515600"/>
-              <a:gd name="connsiteY43" fmla="*/ 1504482 h 5416094"/>
-              <a:gd name="connsiteX44" fmla="*/ 0 w 10515600"/>
-              <a:gd name="connsiteY44" fmla="*/ 902700 h 5416094"/>
-            </a:gdLst>
-            <a:ahLst/>
-            <a:cxnLst>
-              <a:cxn ang="0">
-                <a:pos x="connsiteX0" y="connsiteY0"/>
-              </a:cxn>
-              <a:cxn ang="0">
-                <a:pos x="connsiteX1" y="connsiteY1"/>
-              </a:cxn>
-              <a:cxn ang="0">
-                <a:pos x="connsiteX2" y="connsiteY2"/>
-              </a:cxn>
-              <a:cxn ang="0">
-                <a:pos x="connsiteX3" y="connsiteY3"/>
-              </a:cxn>
-              <a:cxn ang="0">
-                <a:pos x="connsiteX4" y="connsiteY4"/>
-              </a:cxn>
-              <a:cxn ang="0">
-                <a:pos x="connsiteX5" y="connsiteY5"/>
-              </a:cxn>
-              <a:cxn ang="0">
-                <a:pos x="connsiteX6" y="connsiteY6"/>
-              </a:cxn>
-              <a:cxn ang="0">
-                <a:pos x="connsiteX7" y="connsiteY7"/>
-              </a:cxn>
-              <a:cxn ang="0">
-                <a:pos x="connsiteX8" y="connsiteY8"/>
-              </a:cxn>
-              <a:cxn ang="0">
-                <a:pos x="connsiteX9" y="connsiteY9"/>
-              </a:cxn>
-              <a:cxn ang="0">
-                <a:pos x="connsiteX10" y="connsiteY10"/>
-              </a:cxn>
-              <a:cxn ang="0">
-                <a:pos x="connsiteX11" y="connsiteY11"/>
-              </a:cxn>
-              <a:cxn ang="0">
-                <a:pos x="connsiteX12" y="connsiteY12"/>
-              </a:cxn>
-              <a:cxn ang="0">
-                <a:pos x="connsiteX13" y="connsiteY13"/>
-              </a:cxn>
-              <a:cxn ang="0">
-                <a:pos x="connsiteX14" y="connsiteY14"/>
-              </a:cxn>
-              <a:cxn ang="0">
-                <a:pos x="connsiteX15" y="connsiteY15"/>
-              </a:cxn>
-              <a:cxn ang="0">
-                <a:pos x="connsiteX16" y="connsiteY16"/>
-              </a:cxn>
-              <a:cxn ang="0">
-                <a:pos x="connsiteX17" y="connsiteY17"/>
-              </a:cxn>
-              <a:cxn ang="0">
-                <a:pos x="connsiteX18" y="connsiteY18"/>
-              </a:cxn>
-              <a:cxn ang="0">
-                <a:pos x="connsiteX19" y="connsiteY19"/>
-              </a:cxn>
-              <a:cxn ang="0">
-                <a:pos x="connsiteX20" y="connsiteY20"/>
-              </a:cxn>
-              <a:cxn ang="0">
-                <a:pos x="connsiteX21" y="connsiteY21"/>
-              </a:cxn>
-              <a:cxn ang="0">
-                <a:pos x="connsiteX22" y="connsiteY22"/>
-              </a:cxn>
-              <a:cxn ang="0">
-                <a:pos x="connsiteX23" y="connsiteY23"/>
-              </a:cxn>
-              <a:cxn ang="0">
-                <a:pos x="connsiteX24" y="connsiteY24"/>
-              </a:cxn>
-              <a:cxn ang="0">
-                <a:pos x="connsiteX25" y="connsiteY25"/>
-              </a:cxn>
-              <a:cxn ang="0">
-                <a:pos x="connsiteX26" y="connsiteY26"/>
-              </a:cxn>
-              <a:cxn ang="0">
-                <a:pos x="connsiteX27" y="connsiteY27"/>
-              </a:cxn>
-              <a:cxn ang="0">
-                <a:pos x="connsiteX28" y="connsiteY28"/>
-              </a:cxn>
-              <a:cxn ang="0">
-                <a:pos x="connsiteX29" y="connsiteY29"/>
-              </a:cxn>
-              <a:cxn ang="0">
-                <a:pos x="connsiteX30" y="connsiteY30"/>
-              </a:cxn>
-              <a:cxn ang="0">
-                <a:pos x="connsiteX31" y="connsiteY31"/>
-              </a:cxn>
-              <a:cxn ang="0">
-                <a:pos x="connsiteX32" y="connsiteY32"/>
-              </a:cxn>
-              <a:cxn ang="0">
-                <a:pos x="connsiteX33" y="connsiteY33"/>
-              </a:cxn>
-              <a:cxn ang="0">
-                <a:pos x="connsiteX34" y="connsiteY34"/>
-              </a:cxn>
-              <a:cxn ang="0">
-                <a:pos x="connsiteX35" y="connsiteY35"/>
-              </a:cxn>
-              <a:cxn ang="0">
-                <a:pos x="connsiteX36" y="connsiteY36"/>
-              </a:cxn>
-              <a:cxn ang="0">
-                <a:pos x="connsiteX37" y="connsiteY37"/>
-              </a:cxn>
-              <a:cxn ang="0">
-                <a:pos x="connsiteX38" y="connsiteY38"/>
-              </a:cxn>
-              <a:cxn ang="0">
-                <a:pos x="connsiteX39" y="connsiteY39"/>
-              </a:cxn>
-              <a:cxn ang="0">
-                <a:pos x="connsiteX40" y="connsiteY40"/>
-              </a:cxn>
-              <a:cxn ang="0">
-                <a:pos x="connsiteX41" y="connsiteY41"/>
-              </a:cxn>
-              <a:cxn ang="0">
-                <a:pos x="connsiteX42" y="connsiteY42"/>
-              </a:cxn>
-              <a:cxn ang="0">
-                <a:pos x="connsiteX43" y="connsiteY43"/>
-              </a:cxn>
-              <a:cxn ang="0">
-                <a:pos x="connsiteX44" y="connsiteY44"/>
-              </a:cxn>
-            </a:cxnLst>
-            <a:rect l="l" t="t" r="r" b="b"/>
-            <a:pathLst>
-              <a:path w="10515600" h="5416094" extrusionOk="0">
-                <a:moveTo>
-                  <a:pt x="0" y="902700"/>
-                </a:moveTo>
-                <a:cubicBezTo>
-                  <a:pt x="-57306" y="368805"/>
-                  <a:pt x="305054" y="37193"/>
-                  <a:pt x="902700" y="0"/>
-                </a:cubicBezTo>
-                <a:cubicBezTo>
-                  <a:pt x="1280419" y="-35006"/>
-                  <a:pt x="1407743" y="-35339"/>
-                  <a:pt x="1746919" y="0"/>
-                </a:cubicBezTo>
-                <a:cubicBezTo>
-                  <a:pt x="2086095" y="35339"/>
-                  <a:pt x="2146539" y="-12333"/>
-                  <a:pt x="2329833" y="0"/>
-                </a:cubicBezTo>
-                <a:cubicBezTo>
-                  <a:pt x="2513127" y="12333"/>
-                  <a:pt x="2706706" y="12952"/>
-                  <a:pt x="2825644" y="0"/>
-                </a:cubicBezTo>
-                <a:cubicBezTo>
-                  <a:pt x="2944582" y="-12952"/>
-                  <a:pt x="3420817" y="-27100"/>
-                  <a:pt x="3582762" y="0"/>
-                </a:cubicBezTo>
-                <a:cubicBezTo>
-                  <a:pt x="3744707" y="27100"/>
-                  <a:pt x="4023584" y="-9167"/>
-                  <a:pt x="4165675" y="0"/>
-                </a:cubicBezTo>
-                <a:cubicBezTo>
-                  <a:pt x="4307766" y="9167"/>
-                  <a:pt x="4770188" y="27031"/>
-                  <a:pt x="5009894" y="0"/>
-                </a:cubicBezTo>
-                <a:cubicBezTo>
-                  <a:pt x="5249600" y="-27031"/>
-                  <a:pt x="5349881" y="-194"/>
-                  <a:pt x="5505706" y="0"/>
-                </a:cubicBezTo>
-                <a:cubicBezTo>
-                  <a:pt x="5661531" y="194"/>
-                  <a:pt x="6129254" y="-29363"/>
-                  <a:pt x="6349925" y="0"/>
-                </a:cubicBezTo>
-                <a:cubicBezTo>
-                  <a:pt x="6570596" y="29363"/>
-                  <a:pt x="6581199" y="-14617"/>
-                  <a:pt x="6758634" y="0"/>
-                </a:cubicBezTo>
-                <a:cubicBezTo>
-                  <a:pt x="6936069" y="14617"/>
-                  <a:pt x="7246491" y="25675"/>
-                  <a:pt x="7428650" y="0"/>
-                </a:cubicBezTo>
-                <a:cubicBezTo>
-                  <a:pt x="7610809" y="-25675"/>
-                  <a:pt x="7825190" y="-17078"/>
-                  <a:pt x="8098665" y="0"/>
-                </a:cubicBezTo>
-                <a:cubicBezTo>
-                  <a:pt x="8372141" y="17078"/>
-                  <a:pt x="8559625" y="-21568"/>
-                  <a:pt x="8681579" y="0"/>
-                </a:cubicBezTo>
-                <a:cubicBezTo>
-                  <a:pt x="8803533" y="21568"/>
-                  <a:pt x="9307226" y="-46066"/>
-                  <a:pt x="9612900" y="0"/>
-                </a:cubicBezTo>
-                <a:cubicBezTo>
-                  <a:pt x="10119954" y="-10560"/>
-                  <a:pt x="10418674" y="366684"/>
-                  <a:pt x="10515600" y="902700"/>
-                </a:cubicBezTo>
-                <a:cubicBezTo>
-                  <a:pt x="10494548" y="1140809"/>
-                  <a:pt x="10524881" y="1252168"/>
-                  <a:pt x="10515600" y="1504482"/>
-                </a:cubicBezTo>
-                <a:cubicBezTo>
-                  <a:pt x="10506319" y="1756796"/>
-                  <a:pt x="10494309" y="1995078"/>
-                  <a:pt x="10515600" y="2178479"/>
-                </a:cubicBezTo>
-                <a:cubicBezTo>
-                  <a:pt x="10536891" y="2361880"/>
-                  <a:pt x="10522845" y="2487483"/>
-                  <a:pt x="10515600" y="2780261"/>
-                </a:cubicBezTo>
-                <a:cubicBezTo>
-                  <a:pt x="10508355" y="3073039"/>
-                  <a:pt x="10533694" y="3138252"/>
-                  <a:pt x="10515600" y="3273722"/>
-                </a:cubicBezTo>
-                <a:cubicBezTo>
-                  <a:pt x="10497506" y="3409192"/>
-                  <a:pt x="10514952" y="3569910"/>
-                  <a:pt x="10515600" y="3803291"/>
-                </a:cubicBezTo>
-                <a:cubicBezTo>
-                  <a:pt x="10516248" y="4036672"/>
-                  <a:pt x="10499126" y="4317688"/>
-                  <a:pt x="10515600" y="4513394"/>
-                </a:cubicBezTo>
-                <a:cubicBezTo>
-                  <a:pt x="10585499" y="4997151"/>
-                  <a:pt x="10115437" y="5453981"/>
-                  <a:pt x="9612900" y="5416094"/>
-                </a:cubicBezTo>
-                <a:cubicBezTo>
-                  <a:pt x="9473271" y="5418358"/>
-                  <a:pt x="9316384" y="5423764"/>
-                  <a:pt x="9117089" y="5416094"/>
-                </a:cubicBezTo>
-                <a:cubicBezTo>
-                  <a:pt x="8917794" y="5408424"/>
-                  <a:pt x="8902141" y="5433256"/>
-                  <a:pt x="8708379" y="5416094"/>
-                </a:cubicBezTo>
-                <a:cubicBezTo>
-                  <a:pt x="8514617" y="5398933"/>
-                  <a:pt x="8454700" y="5422387"/>
-                  <a:pt x="8299670" y="5416094"/>
-                </a:cubicBezTo>
-                <a:cubicBezTo>
-                  <a:pt x="8144640" y="5409801"/>
-                  <a:pt x="7907022" y="5398388"/>
-                  <a:pt x="7629654" y="5416094"/>
-                </a:cubicBezTo>
-                <a:cubicBezTo>
-                  <a:pt x="7352286" y="5433800"/>
-                  <a:pt x="7244777" y="5409877"/>
-                  <a:pt x="7133843" y="5416094"/>
-                </a:cubicBezTo>
-                <a:cubicBezTo>
-                  <a:pt x="7022909" y="5422311"/>
-                  <a:pt x="6748865" y="5379753"/>
-                  <a:pt x="6376726" y="5416094"/>
-                </a:cubicBezTo>
-                <a:cubicBezTo>
-                  <a:pt x="6004587" y="5452435"/>
-                  <a:pt x="5991442" y="5438860"/>
-                  <a:pt x="5880914" y="5416094"/>
-                </a:cubicBezTo>
-                <a:cubicBezTo>
-                  <a:pt x="5770386" y="5393328"/>
-                  <a:pt x="5294303" y="5440618"/>
-                  <a:pt x="5123797" y="5416094"/>
-                </a:cubicBezTo>
-                <a:cubicBezTo>
-                  <a:pt x="4953291" y="5391570"/>
-                  <a:pt x="4828705" y="5430421"/>
-                  <a:pt x="4715088" y="5416094"/>
-                </a:cubicBezTo>
-                <a:cubicBezTo>
-                  <a:pt x="4601471" y="5401767"/>
-                  <a:pt x="4227806" y="5381491"/>
-                  <a:pt x="3957970" y="5416094"/>
-                </a:cubicBezTo>
-                <a:cubicBezTo>
-                  <a:pt x="3688134" y="5450697"/>
-                  <a:pt x="3670638" y="5425309"/>
-                  <a:pt x="3462159" y="5416094"/>
-                </a:cubicBezTo>
-                <a:cubicBezTo>
-                  <a:pt x="3253680" y="5406879"/>
-                  <a:pt x="3167443" y="5432031"/>
-                  <a:pt x="3053449" y="5416094"/>
-                </a:cubicBezTo>
-                <a:cubicBezTo>
-                  <a:pt x="2939455" y="5400158"/>
-                  <a:pt x="2701485" y="5433995"/>
-                  <a:pt x="2557638" y="5416094"/>
-                </a:cubicBezTo>
-                <a:cubicBezTo>
-                  <a:pt x="2413791" y="5398193"/>
-                  <a:pt x="2168647" y="5424510"/>
-                  <a:pt x="1800521" y="5416094"/>
-                </a:cubicBezTo>
-                <a:cubicBezTo>
-                  <a:pt x="1432395" y="5407678"/>
-                  <a:pt x="1261364" y="5454497"/>
-                  <a:pt x="902700" y="5416094"/>
-                </a:cubicBezTo>
-                <a:cubicBezTo>
-                  <a:pt x="519468" y="5419760"/>
-                  <a:pt x="63003" y="5077223"/>
-                  <a:pt x="0" y="4513394"/>
-                </a:cubicBezTo>
-                <a:cubicBezTo>
-                  <a:pt x="-20265" y="4243495"/>
-                  <a:pt x="27650" y="4053844"/>
-                  <a:pt x="0" y="3911612"/>
-                </a:cubicBezTo>
-                <a:cubicBezTo>
-                  <a:pt x="-27650" y="3769380"/>
-                  <a:pt x="24988" y="3469350"/>
-                  <a:pt x="0" y="3309829"/>
-                </a:cubicBezTo>
-                <a:cubicBezTo>
-                  <a:pt x="-24988" y="3150308"/>
-                  <a:pt x="-16973" y="2933511"/>
-                  <a:pt x="0" y="2780261"/>
-                </a:cubicBezTo>
-                <a:cubicBezTo>
-                  <a:pt x="16973" y="2627011"/>
-                  <a:pt x="-11552" y="2315258"/>
-                  <a:pt x="0" y="2106265"/>
-                </a:cubicBezTo>
-                <a:cubicBezTo>
-                  <a:pt x="11552" y="1897272"/>
-                  <a:pt x="-9167" y="1726905"/>
-                  <a:pt x="0" y="1504482"/>
-                </a:cubicBezTo>
-                <a:cubicBezTo>
-                  <a:pt x="9167" y="1282059"/>
-                  <a:pt x="10972" y="1160784"/>
-                  <a:pt x="0" y="902700"/>
-                </a:cubicBezTo>
-                <a:close/>
-              </a:path>
-            </a:pathLst>
-          </a:custGeom>
-          <a:noFill/>
-          <a:ln w="60325" cap="rnd">
-            <a:solidFill>
-              <a:schemeClr val="tx1"/>
-            </a:solidFill>
-            <a:round/>
-            <a:extLst>
-              <a:ext uri="{C807C97D-BFC1-408E-A445-0C87EB9F89A2}">
-                <ask:lineSketchStyleProps xmlns:ask="http://schemas.microsoft.com/office/drawing/2018/sketchyshapes" sd="1219033472">
-                  <a:prstGeom prst="roundRect">
-                    <a:avLst/>
-                  </a:prstGeom>
-                  <ask:type>
-                    <ask:lineSketchFreehand/>
-                  </ask:type>
-                </ask:lineSketchStyleProps>
-              </a:ext>
-            </a:extLst>
-          </a:ln>
-        </p:spPr>
-        <p:style>
-          <a:lnRef idx="2">
-            <a:schemeClr val="accent1">
-              <a:shade val="50000"/>
-            </a:schemeClr>
-          </a:lnRef>
-          <a:fillRef idx="1">
-            <a:schemeClr val="accent1"/>
-          </a:fillRef>
-          <a:effectRef idx="0">
-            <a:schemeClr val="accent1"/>
-          </a:effectRef>
-          <a:fontRef idx="minor">
-            <a:schemeClr val="lt1"/>
-          </a:fontRef>
-        </p:style>
-        <p:txBody>
-          <a:bodyPr rtlCol="0" anchor="ctr"/>
-          <a:lstStyle/>
-          <a:p>
-            <a:pPr algn="ctr"/>
-            <a:endParaRPr lang="en-US"/>
-          </a:p>
-        </p:txBody>
-      </p:sp>
-      <p:pic>
-        <p:nvPicPr>
-          <p:cNvPr id="8" name="Imagen 7" descr="Logotipo&#10;&#10;Descripción generada automáticamente">
-            <a:extLst>
-              <a:ext uri="{FF2B5EF4-FFF2-40B4-BE49-F238E27FC236}">
-                <a16:creationId xmlns:a16="http://schemas.microsoft.com/office/drawing/2014/main" id="{F41B6FDA-0E83-4518-93C5-532BC30FB6F7}"/>
-              </a:ext>
-            </a:extLst>
-          </p:cNvPr>
-          <p:cNvPicPr>
-            <a:picLocks noChangeAspect="1"/>
-          </p:cNvPicPr>
-          <p:nvPr/>
-        </p:nvPicPr>
-        <p:blipFill>
-          <a:blip r:embed="rId3">
-            <a:extLst>
-              <a:ext uri="{28A0092B-C50C-407E-A947-70E740481C1C}">
-                <a14:useLocalDpi xmlns:a14="http://schemas.microsoft.com/office/drawing/2010/main" val="0"/>
-              </a:ext>
-            </a:extLst>
-          </a:blip>
-          <a:stretch>
-            <a:fillRect/>
-          </a:stretch>
-        </p:blipFill>
-        <p:spPr>
-          <a:xfrm>
-            <a:off x="1119609" y="2438577"/>
-            <a:ext cx="3923445" cy="1895422"/>
-          </a:xfrm>
-          <a:prstGeom prst="rect">
-            <a:avLst/>
-          </a:prstGeom>
-        </p:spPr>
-      </p:pic>
-      <p:pic>
-        <p:nvPicPr>
-          <p:cNvPr id="14" name="Imagen 13">
-            <a:extLst>
-              <a:ext uri="{FF2B5EF4-FFF2-40B4-BE49-F238E27FC236}">
-                <a16:creationId xmlns:a16="http://schemas.microsoft.com/office/drawing/2014/main" id="{2894A3FB-7C2B-E662-53F5-1FEA454D29CB}"/>
-              </a:ext>
-            </a:extLst>
-          </p:cNvPr>
-          <p:cNvPicPr>
-            <a:picLocks noChangeAspect="1"/>
-          </p:cNvPicPr>
-          <p:nvPr/>
-        </p:nvPicPr>
-        <p:blipFill rotWithShape="1">
-          <a:blip r:embed="rId4"/>
-          <a:srcRect l="5392" t="7718" r="4071" b="4535"/>
-          <a:stretch/>
-        </p:blipFill>
-        <p:spPr>
-          <a:xfrm>
-            <a:off x="8217795" y="2639815"/>
-            <a:ext cx="1791517" cy="1647998"/>
-          </a:xfrm>
-          <a:prstGeom prst="ellipse">
-            <a:avLst/>
-          </a:prstGeom>
-          <a:ln w="63500" cap="rnd">
-            <a:noFill/>
-          </a:ln>
-          <a:effectLst>
-            <a:outerShdw blurRad="381000" dist="292100" dir="5400000" sx="-80000" sy="-18000" rotWithShape="0">
-              <a:srgbClr val="000000">
-                <a:alpha val="22000"/>
-              </a:srgbClr>
-            </a:outerShdw>
-          </a:effectLst>
-          <a:scene3d>
-            <a:camera prst="orthographicFront"/>
-            <a:lightRig rig="contrasting" dir="t">
-              <a:rot lat="0" lon="0" rev="3000000"/>
-            </a:lightRig>
-          </a:scene3d>
-          <a:sp3d contourW="7620">
-            <a:bevelT w="95250" h="31750"/>
-            <a:contourClr>
-              <a:srgbClr val="333333"/>
-            </a:contourClr>
-          </a:sp3d>
-        </p:spPr>
-      </p:pic>
-    </p:spTree>
-    <p:extLst>
-      <p:ext uri="{BB962C8B-B14F-4D97-AF65-F5344CB8AC3E}">
-        <p14:creationId xmlns:p14="http://schemas.microsoft.com/office/powerpoint/2010/main" val="2505007553"/>
-      </p:ext>
-    </p:extLst>
-  </p:cSld>
-  <p:clrMapOvr>
-    <a:overrideClrMapping bg1="dk1" tx1="lt1" bg2="dk2" tx2="lt2" accent1="accent1" accent2="accent2" accent3="accent3" accent4="accent4" accent5="accent5" accent6="accent6" hlink="hlink" folHlink="folHlink"/>
-  </p:clrMapOvr>
-</p:sld>
-</file>
-
 <file path=ppt/slides/slide4.xml><?xml version="1.0" encoding="utf-8"?>
 <p:sld xmlns:a="http://schemas.openxmlformats.org/drawingml/2006/main" xmlns:r="http://schemas.openxmlformats.org/officeDocument/2006/relationships" xmlns:p="http://schemas.openxmlformats.org/presentationml/2006/main">
   <p:cSld>
@@ -9299,98 +8425,99 @@
       </p:cxnSp>
       <p:sp>
         <p:nvSpPr>
-          <p:cNvPr id="4" name="Título 1">
+          <p:cNvPr id="2" name="Título 1">
             <a:extLst>
               <a:ext uri="{FF2B5EF4-FFF2-40B4-BE49-F238E27FC236}">
-                <a16:creationId xmlns:a16="http://schemas.microsoft.com/office/drawing/2014/main" id="{96C72C34-9C2E-9EC8-A064-F624AA0C9A60}"/>
+                <a16:creationId xmlns:a16="http://schemas.microsoft.com/office/drawing/2014/main" id="{DA022CE2-0F34-2D5B-34B5-E10BE893E5A4}"/>
               </a:ext>
             </a:extLst>
           </p:cNvPr>
-          <p:cNvSpPr txBox="1">
-            <a:spLocks/>
+          <p:cNvSpPr>
+            <a:spLocks noGrp="1"/>
           </p:cNvSpPr>
-          <p:nvPr/>
+          <p:nvPr>
+            <p:ph type="ctrTitle"/>
+          </p:nvPr>
         </p:nvSpPr>
         <p:spPr>
           <a:xfrm>
             <a:off x="1522465" y="4516482"/>
-            <a:ext cx="9650360" cy="1323601"/>
+            <a:ext cx="9144000" cy="1719594"/>
           </a:xfrm>
-          <a:prstGeom prst="rect">
-            <a:avLst/>
-          </a:prstGeom>
         </p:spPr>
         <p:txBody>
-          <a:bodyPr vert="horz" lIns="91440" tIns="45720" rIns="91440" bIns="45720" rtlCol="0" anchor="b">
-            <a:noAutofit/>
+          <a:bodyPr>
+            <a:normAutofit/>
           </a:bodyPr>
-          <a:lstStyle>
-            <a:lvl1pPr algn="l" defTabSz="914400" rtl="0" eaLnBrk="1" latinLnBrk="0" hangingPunct="1">
-              <a:lnSpc>
-                <a:spcPct val="100000"/>
-              </a:lnSpc>
-              <a:spcBef>
-                <a:spcPct val="0"/>
-              </a:spcBef>
-              <a:buNone/>
-              <a:defRPr sz="9600" kern="1200">
-                <a:solidFill>
-                  <a:schemeClr val="tx1"/>
-                </a:solidFill>
-                <a:latin typeface="+mj-lt"/>
-                <a:ea typeface="+mj-ea"/>
-                <a:cs typeface="+mj-cs"/>
-              </a:defRPr>
-            </a:lvl1pPr>
-          </a:lstStyle>
+          <a:lstStyle/>
           <a:p>
             <a:pPr algn="ctr"/>
             <a:r>
-              <a:rPr lang="es-ES" sz="7200" dirty="0">
+              <a:rPr lang="es-ES" dirty="0">
                 <a:solidFill>
                   <a:schemeClr val="bg1"/>
                 </a:solidFill>
               </a:rPr>
-              <a:t>ENTIDAD-RELACION</a:t>
+              <a:t>GUÍA ESTILO</a:t>
             </a:r>
-            <a:endParaRPr lang="es-ES" sz="7200" dirty="0"/>
           </a:p>
         </p:txBody>
       </p:sp>
-      <p:pic>
-        <p:nvPicPr>
-          <p:cNvPr id="3" name="Imagen 2">
+      <p:sp>
+        <p:nvSpPr>
+          <p:cNvPr id="5" name="Subtítulo 2">
             <a:extLst>
               <a:ext uri="{FF2B5EF4-FFF2-40B4-BE49-F238E27FC236}">
-                <a16:creationId xmlns:a16="http://schemas.microsoft.com/office/drawing/2014/main" id="{38E9BDB6-15CB-79EC-E2E2-F252EDDE8CAD}"/>
+                <a16:creationId xmlns:a16="http://schemas.microsoft.com/office/drawing/2014/main" id="{3907BDA3-2F2F-67E9-40BD-169692B07E03}"/>
               </a:ext>
             </a:extLst>
           </p:cNvPr>
-          <p:cNvPicPr>
-            <a:picLocks noChangeAspect="1"/>
-          </p:cNvPicPr>
-          <p:nvPr/>
-        </p:nvPicPr>
-        <p:blipFill>
-          <a:blip r:embed="rId3"/>
-          <a:stretch>
-            <a:fillRect/>
-          </a:stretch>
-        </p:blipFill>
+          <p:cNvSpPr>
+            <a:spLocks noGrp="1"/>
+          </p:cNvSpPr>
+          <p:nvPr>
+            <p:ph type="subTitle" idx="1"/>
+          </p:nvPr>
+        </p:nvSpPr>
         <p:spPr>
           <a:xfrm>
-            <a:off x="3718143" y="190560"/>
-            <a:ext cx="4520982" cy="3800415"/>
+            <a:off x="1288797" y="632941"/>
+            <a:ext cx="9550837" cy="2395287"/>
           </a:xfrm>
-          <a:prstGeom prst="rect">
-            <a:avLst/>
-          </a:prstGeom>
         </p:spPr>
-      </p:pic>
+        <p:txBody>
+          <a:bodyPr anchor="ctr">
+            <a:normAutofit/>
+          </a:bodyPr>
+          <a:lstStyle/>
+          <a:p>
+            <a:pPr algn="ctr">
+              <a:lnSpc>
+                <a:spcPct val="100000"/>
+              </a:lnSpc>
+            </a:pPr>
+            <a:r>
+              <a:rPr lang="es-ES" sz="3600" b="1" dirty="0">
+                <a:solidFill>
+                  <a:schemeClr val="bg1"/>
+                </a:solidFill>
+                <a:effectLst>
+                  <a:outerShdw blurRad="38100" dist="38100" dir="2700000" algn="tl">
+                    <a:srgbClr val="000000">
+                      <a:alpha val="43137"/>
+                    </a:srgbClr>
+                  </a:outerShdw>
+                </a:effectLst>
+              </a:rPr>
+              <a:t>Se emplean colores con tonalidades marrones y negros dando la sensación de estar jugando en una mesa en vez del ordenador</a:t>
+            </a:r>
+          </a:p>
+        </p:txBody>
+      </p:sp>
     </p:spTree>
     <p:extLst>
       <p:ext uri="{BB962C8B-B14F-4D97-AF65-F5344CB8AC3E}">
-        <p14:creationId xmlns:p14="http://schemas.microsoft.com/office/powerpoint/2010/main" val="3713276915"/>
+        <p14:creationId xmlns:p14="http://schemas.microsoft.com/office/powerpoint/2010/main" val="3449393869"/>
       </p:ext>
     </p:extLst>
   </p:cSld>
@@ -9610,6 +8737,15 @@
 </file>
 
 <file path=customXml/item2.xml><?xml version="1.0" encoding="utf-8"?>
+<?mso-contentType ?>
+<FormTemplates xmlns="http://schemas.microsoft.com/sharepoint/v3/contenttype/forms">
+  <Display>DocumentLibraryForm</Display>
+  <Edit>DocumentLibraryForm</Edit>
+  <New>DocumentLibraryForm</New>
+</FormTemplates>
+</file>
+
+<file path=customXml/item3.xml><?xml version="1.0" encoding="utf-8"?>
 <ct:contentTypeSchema xmlns:ct="http://schemas.microsoft.com/office/2006/metadata/contentType" xmlns:ma="http://schemas.microsoft.com/office/2006/metadata/properties/metaAttributes" ct:_="" ma:_="" ma:contentTypeName="Documento" ma:contentTypeID="0x0101001CF815299FD08446828E528E2628D888" ma:contentTypeVersion="18" ma:contentTypeDescription="Crear nuevo documento." ma:contentTypeScope="" ma:versionID="eda16f0b0df14eff352f61fdd29391dd">
   <xsd:schema xmlns:xsd="http://www.w3.org/2001/XMLSchema" xmlns:xs="http://www.w3.org/2001/XMLSchema" xmlns:p="http://schemas.microsoft.com/office/2006/metadata/properties" xmlns:ns3="f2ea13ae-bb87-41e3-80ee-445ef9952b1b" xmlns:ns4="7e6392ed-20ae-4cf8-a2eb-b9a38b6c7442" targetNamespace="http://schemas.microsoft.com/office/2006/metadata/properties" ma:root="true" ma:fieldsID="39a5156d44086f184d4900c1f32878c2" ns3:_="" ns4:_="">
     <xsd:import namespace="f2ea13ae-bb87-41e3-80ee-445ef9952b1b"/>
@@ -9862,15 +8998,6 @@
 </ct:contentTypeSchema>
 </file>
 
-<file path=customXml/item3.xml><?xml version="1.0" encoding="utf-8"?>
-<?mso-contentType ?>
-<FormTemplates xmlns="http://schemas.microsoft.com/sharepoint/v3/contenttype/forms">
-  <Display>DocumentLibraryForm</Display>
-  <Edit>DocumentLibraryForm</Edit>
-  <New>DocumentLibraryForm</New>
-</FormTemplates>
-</file>
-
 <file path=customXml/itemProps1.xml><?xml version="1.0" encoding="utf-8"?>
 <ds:datastoreItem xmlns:ds="http://schemas.openxmlformats.org/officeDocument/2006/customXml" ds:itemID="{84F78817-FC4B-4DE8-91A2-DA4F6B7B016A}">
   <ds:schemaRefs>
@@ -9889,6 +9016,14 @@
 </file>
 
 <file path=customXml/itemProps2.xml><?xml version="1.0" encoding="utf-8"?>
+<ds:datastoreItem xmlns:ds="http://schemas.openxmlformats.org/officeDocument/2006/customXml" ds:itemID="{BDCF1FC9-F5C2-44A8-9472-8472B5853B3F}">
+  <ds:schemaRefs>
+    <ds:schemaRef ds:uri="http://schemas.microsoft.com/sharepoint/v3/contenttype/forms"/>
+  </ds:schemaRefs>
+</ds:datastoreItem>
+</file>
+
+<file path=customXml/itemProps3.xml><?xml version="1.0" encoding="utf-8"?>
 <ds:datastoreItem xmlns:ds="http://schemas.openxmlformats.org/officeDocument/2006/customXml" ds:itemID="{4616929A-81C1-416A-98D6-A4FC31BDA4E2}">
   <ds:schemaRefs>
     <ds:schemaRef ds:uri="http://schemas.microsoft.com/office/2006/metadata/contentType"/>
@@ -9905,12 +9040,4 @@
     <ds:schemaRef ds:uri="http://schemas.microsoft.com/internal/obd"/>
   </ds:schemaRefs>
 </ds:datastoreItem>
-</file>
-
-<file path=customXml/itemProps3.xml><?xml version="1.0" encoding="utf-8"?>
-<ds:datastoreItem xmlns:ds="http://schemas.openxmlformats.org/officeDocument/2006/customXml" ds:itemID="{BDCF1FC9-F5C2-44A8-9472-8472B5853B3F}">
-  <ds:schemaRefs>
-    <ds:schemaRef ds:uri="http://schemas.microsoft.com/sharepoint/v3/contenttype/forms"/>
-  </ds:schemaRefs>
-</ds:datastoreItem>
 </file>
</xml_diff>

<commit_message>
pequeña comprobacion e implementacion de perfil
</commit_message>
<xml_diff>
--- a/TableroConecta.pptx
+++ b/TableroConecta.pptx
@@ -7,7 +7,7 @@
   <p:sldIdLst>
     <p:sldId id="256" r:id="rId5"/>
     <p:sldId id="265" r:id="rId6"/>
-    <p:sldId id="264" r:id="rId7"/>
+    <p:sldId id="267" r:id="rId7"/>
     <p:sldId id="266" r:id="rId8"/>
   </p:sldIdLst>
   <p:sldSz cx="12192000" cy="6858000"/>
@@ -468,7 +468,7 @@
           <a:lstStyle/>
           <a:p>
             <a:pPr algn="ctr"/>
-            <a:endParaRPr lang="en-US">
+            <a:endParaRPr lang="en-US" dirty="0">
               <a:solidFill>
                 <a:schemeClr val="tx1"/>
               </a:solidFill>
@@ -638,7 +638,7 @@
           <a:bodyPr/>
           <a:lstStyle/>
           <a:p>
-            <a:endParaRPr lang="en-US"/>
+            <a:endParaRPr lang="en-US" dirty="0"/>
           </a:p>
         </p:txBody>
       </p:sp>
@@ -667,7 +667,7 @@
               <a:rPr lang="en-US" smtClean="0"/>
               <a:t>‹Nº›</a:t>
             </a:fld>
-            <a:endParaRPr lang="en-US"/>
+            <a:endParaRPr lang="en-US" dirty="0"/>
           </a:p>
         </p:txBody>
       </p:sp>
@@ -811,7 +811,7 @@
               <a:rPr lang="en-US" smtClean="0"/>
               <a:t>4/2/2024</a:t>
             </a:fld>
-            <a:endParaRPr lang="en-US"/>
+            <a:endParaRPr lang="en-US" dirty="0"/>
           </a:p>
         </p:txBody>
       </p:sp>
@@ -836,7 +836,7 @@
           <a:bodyPr/>
           <a:lstStyle/>
           <a:p>
-            <a:endParaRPr lang="en-US"/>
+            <a:endParaRPr lang="en-US" dirty="0"/>
           </a:p>
         </p:txBody>
       </p:sp>
@@ -865,7 +865,7 @@
               <a:rPr lang="en-US" smtClean="0"/>
               <a:t>‹Nº›</a:t>
             </a:fld>
-            <a:endParaRPr lang="en-US"/>
+            <a:endParaRPr lang="en-US" dirty="0"/>
           </a:p>
         </p:txBody>
       </p:sp>
@@ -1019,7 +1019,7 @@
               <a:rPr lang="en-US" smtClean="0"/>
               <a:t>4/2/2024</a:t>
             </a:fld>
-            <a:endParaRPr lang="en-US"/>
+            <a:endParaRPr lang="en-US" dirty="0"/>
           </a:p>
         </p:txBody>
       </p:sp>
@@ -1044,7 +1044,7 @@
           <a:bodyPr/>
           <a:lstStyle/>
           <a:p>
-            <a:endParaRPr lang="en-US"/>
+            <a:endParaRPr lang="en-US" dirty="0"/>
           </a:p>
         </p:txBody>
       </p:sp>
@@ -1073,7 +1073,7 @@
               <a:rPr lang="en-US" smtClean="0"/>
               <a:t>‹Nº›</a:t>
             </a:fld>
-            <a:endParaRPr lang="en-US"/>
+            <a:endParaRPr lang="en-US" dirty="0"/>
           </a:p>
         </p:txBody>
       </p:sp>
@@ -1241,7 +1241,7 @@
               <a:rPr lang="en-US" smtClean="0"/>
               <a:t>4/2/2024</a:t>
             </a:fld>
-            <a:endParaRPr lang="en-US"/>
+            <a:endParaRPr lang="en-US" dirty="0"/>
           </a:p>
         </p:txBody>
       </p:sp>
@@ -1266,7 +1266,7 @@
           <a:bodyPr/>
           <a:lstStyle/>
           <a:p>
-            <a:endParaRPr lang="en-US"/>
+            <a:endParaRPr lang="en-US" dirty="0"/>
           </a:p>
         </p:txBody>
       </p:sp>
@@ -1295,7 +1295,7 @@
               <a:rPr lang="en-US" smtClean="0"/>
               <a:t>‹Nº›</a:t>
             </a:fld>
-            <a:endParaRPr lang="en-US"/>
+            <a:endParaRPr lang="en-US" dirty="0"/>
           </a:p>
         </p:txBody>
       </p:sp>
@@ -1922,7 +1922,7 @@
           <a:lstStyle/>
           <a:p>
             <a:pPr algn="ctr"/>
-            <a:endParaRPr lang="en-US">
+            <a:endParaRPr lang="en-US" dirty="0">
               <a:solidFill>
                 <a:schemeClr val="tx1"/>
               </a:solidFill>
@@ -2152,7 +2152,7 @@
               <a:rPr lang="en-US" smtClean="0"/>
               <a:t>4/2/2024</a:t>
             </a:fld>
-            <a:endParaRPr lang="en-US"/>
+            <a:endParaRPr lang="en-US" dirty="0"/>
           </a:p>
         </p:txBody>
       </p:sp>
@@ -2177,7 +2177,7 @@
           <a:bodyPr/>
           <a:lstStyle/>
           <a:p>
-            <a:endParaRPr lang="en-US"/>
+            <a:endParaRPr lang="en-US" dirty="0"/>
           </a:p>
         </p:txBody>
       </p:sp>
@@ -2206,7 +2206,7 @@
               <a:rPr lang="en-US" smtClean="0"/>
               <a:t>‹Nº›</a:t>
             </a:fld>
-            <a:endParaRPr lang="en-US"/>
+            <a:endParaRPr lang="en-US" dirty="0"/>
           </a:p>
         </p:txBody>
       </p:sp>
@@ -2538,7 +2538,7 @@
           <a:lstStyle/>
           <a:p>
             <a:pPr algn="ctr"/>
-            <a:endParaRPr lang="en-US">
+            <a:endParaRPr lang="en-US" dirty="0">
               <a:solidFill>
                 <a:schemeClr val="tx1"/>
               </a:solidFill>
@@ -2755,7 +2755,7 @@
               <a:rPr lang="en-US" smtClean="0"/>
               <a:t>4/2/2024</a:t>
             </a:fld>
-            <a:endParaRPr lang="en-US"/>
+            <a:endParaRPr lang="en-US" dirty="0"/>
           </a:p>
         </p:txBody>
       </p:sp>
@@ -2780,7 +2780,7 @@
           <a:bodyPr/>
           <a:lstStyle/>
           <a:p>
-            <a:endParaRPr lang="en-US"/>
+            <a:endParaRPr lang="en-US" dirty="0"/>
           </a:p>
         </p:txBody>
       </p:sp>
@@ -2809,7 +2809,7 @@
               <a:rPr lang="en-US" smtClean="0"/>
               <a:t>‹Nº›</a:t>
             </a:fld>
-            <a:endParaRPr lang="en-US"/>
+            <a:endParaRPr lang="en-US" dirty="0"/>
           </a:p>
         </p:txBody>
       </p:sp>
@@ -3436,7 +3436,7 @@
           <a:lstStyle/>
           <a:p>
             <a:pPr algn="ctr"/>
-            <a:endParaRPr lang="en-US">
+            <a:endParaRPr lang="en-US" dirty="0">
               <a:solidFill>
                 <a:schemeClr val="tx1"/>
               </a:solidFill>
@@ -3803,7 +3803,7 @@
               <a:rPr lang="en-US" smtClean="0"/>
               <a:t>4/2/2024</a:t>
             </a:fld>
-            <a:endParaRPr lang="en-US"/>
+            <a:endParaRPr lang="en-US" dirty="0"/>
           </a:p>
         </p:txBody>
       </p:sp>
@@ -3828,7 +3828,7 @@
           <a:bodyPr/>
           <a:lstStyle/>
           <a:p>
-            <a:endParaRPr lang="en-US"/>
+            <a:endParaRPr lang="en-US" dirty="0"/>
           </a:p>
         </p:txBody>
       </p:sp>
@@ -3857,7 +3857,7 @@
               <a:rPr lang="en-US" smtClean="0"/>
               <a:t>‹Nº›</a:t>
             </a:fld>
-            <a:endParaRPr lang="en-US"/>
+            <a:endParaRPr lang="en-US" dirty="0"/>
           </a:p>
         </p:txBody>
       </p:sp>
@@ -4484,7 +4484,7 @@
           <a:lstStyle/>
           <a:p>
             <a:pPr algn="ctr"/>
-            <a:endParaRPr lang="en-US">
+            <a:endParaRPr lang="en-US" dirty="0">
               <a:solidFill>
                 <a:schemeClr val="tx1"/>
               </a:solidFill>
@@ -4587,7 +4587,7 @@
               <a:rPr lang="en-US" smtClean="0"/>
               <a:t>4/2/2024</a:t>
             </a:fld>
-            <a:endParaRPr lang="en-US"/>
+            <a:endParaRPr lang="en-US" dirty="0"/>
           </a:p>
         </p:txBody>
       </p:sp>
@@ -4612,7 +4612,7 @@
           <a:bodyPr/>
           <a:lstStyle/>
           <a:p>
-            <a:endParaRPr lang="en-US"/>
+            <a:endParaRPr lang="en-US" dirty="0"/>
           </a:p>
         </p:txBody>
       </p:sp>
@@ -4641,7 +4641,7 @@
               <a:rPr lang="en-US" smtClean="0"/>
               <a:t>‹Nº›</a:t>
             </a:fld>
-            <a:endParaRPr lang="en-US"/>
+            <a:endParaRPr lang="en-US" dirty="0"/>
           </a:p>
         </p:txBody>
       </p:sp>
@@ -4973,7 +4973,7 @@
           <a:lstStyle/>
           <a:p>
             <a:pPr algn="ctr"/>
-            <a:endParaRPr lang="en-US">
+            <a:endParaRPr lang="en-US" dirty="0">
               <a:solidFill>
                 <a:schemeClr val="tx1"/>
               </a:solidFill>
@@ -5036,7 +5036,7 @@
               <a:rPr lang="en-US" smtClean="0"/>
               <a:t>4/2/2024</a:t>
             </a:fld>
-            <a:endParaRPr lang="en-US"/>
+            <a:endParaRPr lang="en-US" dirty="0"/>
           </a:p>
         </p:txBody>
       </p:sp>
@@ -5061,7 +5061,7 @@
           <a:bodyPr/>
           <a:lstStyle/>
           <a:p>
-            <a:endParaRPr lang="en-US"/>
+            <a:endParaRPr lang="en-US" dirty="0"/>
           </a:p>
         </p:txBody>
       </p:sp>
@@ -5090,7 +5090,7 @@
               <a:rPr lang="en-US" smtClean="0"/>
               <a:t>‹Nº›</a:t>
             </a:fld>
-            <a:endParaRPr lang="en-US"/>
+            <a:endParaRPr lang="en-US" dirty="0"/>
           </a:p>
         </p:txBody>
       </p:sp>
@@ -5353,7 +5353,7 @@
               <a:rPr lang="en-US" smtClean="0"/>
               <a:t>4/2/2024</a:t>
             </a:fld>
-            <a:endParaRPr lang="en-US"/>
+            <a:endParaRPr lang="en-US" dirty="0"/>
           </a:p>
         </p:txBody>
       </p:sp>
@@ -5378,7 +5378,7 @@
           <a:bodyPr/>
           <a:lstStyle/>
           <a:p>
-            <a:endParaRPr lang="en-US"/>
+            <a:endParaRPr lang="en-US" dirty="0"/>
           </a:p>
         </p:txBody>
       </p:sp>
@@ -5407,7 +5407,7 @@
               <a:rPr lang="en-US" smtClean="0"/>
               <a:t>‹Nº›</a:t>
             </a:fld>
-            <a:endParaRPr lang="en-US"/>
+            <a:endParaRPr lang="en-US" dirty="0"/>
           </a:p>
         </p:txBody>
       </p:sp>
@@ -5739,7 +5739,7 @@
           <a:lstStyle/>
           <a:p>
             <a:pPr algn="ctr"/>
-            <a:endParaRPr lang="en-US"/>
+            <a:endParaRPr lang="en-US" dirty="0"/>
           </a:p>
         </p:txBody>
       </p:sp>
@@ -5877,7 +5877,7 @@
           </a:lstStyle>
           <a:p>
             <a:r>
-              <a:rPr lang="en-US"/>
+              <a:rPr lang="en-US" dirty="0"/>
               <a:t>Click icon to add picture</a:t>
             </a:r>
           </a:p>
@@ -5981,7 +5981,7 @@
               <a:rPr lang="en-US" smtClean="0"/>
               <a:t>4/2/2024</a:t>
             </a:fld>
-            <a:endParaRPr lang="en-US"/>
+            <a:endParaRPr lang="en-US" dirty="0"/>
           </a:p>
         </p:txBody>
       </p:sp>
@@ -6006,7 +6006,7 @@
           <a:bodyPr/>
           <a:lstStyle/>
           <a:p>
-            <a:endParaRPr lang="en-US"/>
+            <a:endParaRPr lang="en-US" dirty="0"/>
           </a:p>
         </p:txBody>
       </p:sp>
@@ -6035,7 +6035,7 @@
               <a:rPr lang="en-US" smtClean="0"/>
               <a:t>‹Nº›</a:t>
             </a:fld>
-            <a:endParaRPr lang="en-US"/>
+            <a:endParaRPr lang="en-US" dirty="0"/>
           </a:p>
         </p:txBody>
       </p:sp>
@@ -6367,7 +6367,7 @@
           <a:lstStyle/>
           <a:p>
             <a:pPr algn="ctr"/>
-            <a:endParaRPr lang="en-US"/>
+            <a:endParaRPr lang="en-US" dirty="0"/>
           </a:p>
         </p:txBody>
       </p:sp>
@@ -7083,7 +7083,7 @@
           <a:lstStyle/>
           <a:p>
             <a:pPr algn="ctr"/>
-            <a:endParaRPr lang="en-US"/>
+            <a:endParaRPr lang="en-US" dirty="0"/>
           </a:p>
         </p:txBody>
       </p:sp>
@@ -7124,18 +7124,13 @@
           <a:p>
             <a:pPr algn="ctr"/>
             <a:r>
-              <a:rPr lang="es-ES" sz="5400" dirty="0" err="1">
+              <a:rPr lang="es-ES" sz="5400" dirty="0">
                 <a:solidFill>
                   <a:schemeClr val="bg1"/>
                 </a:solidFill>
               </a:rPr>
               <a:t>TableroConecta</a:t>
             </a:r>
-            <a:endParaRPr lang="es-ES" sz="5400" dirty="0">
-              <a:solidFill>
-                <a:schemeClr val="bg1"/>
-              </a:solidFill>
-            </a:endParaRPr>
           </a:p>
         </p:txBody>
       </p:sp>
@@ -7175,7 +7170,7 @@
           <a:lstStyle/>
           <a:p>
             <a:pPr algn="ctr"/>
-            <a:endParaRPr lang="es-ES" sz="1800" b="1">
+            <a:endParaRPr lang="es-ES" sz="1800" b="1" dirty="0">
               <a:solidFill>
                 <a:schemeClr val="bg1"/>
               </a:solidFill>
@@ -7184,7 +7179,7 @@
           <a:p>
             <a:pPr algn="ctr"/>
             <a:r>
-              <a:rPr lang="es-ES" sz="1800" b="1">
+              <a:rPr lang="es-ES" sz="1800" b="1" dirty="0">
                 <a:solidFill>
                   <a:schemeClr val="bg1"/>
                 </a:solidFill>
@@ -7536,7 +7531,7 @@
           <a:lstStyle/>
           <a:p>
             <a:pPr algn="ctr"/>
-            <a:endParaRPr lang="en-US"/>
+            <a:endParaRPr lang="en-US" dirty="0"/>
           </a:p>
         </p:txBody>
       </p:sp>
@@ -7703,533 +7698,6 @@
 </file>
 
 <file path=ppt/slides/slide3.xml><?xml version="1.0" encoding="utf-8"?>
-<p:sld xmlns:a="http://schemas.openxmlformats.org/drawingml/2006/main" xmlns:r="http://schemas.openxmlformats.org/officeDocument/2006/relationships" xmlns:p="http://schemas.openxmlformats.org/presentationml/2006/main">
-  <p:cSld>
-    <p:bg>
-      <p:bgPr>
-        <a:solidFill>
-          <a:schemeClr val="bg1"/>
-        </a:solidFill>
-        <a:effectLst/>
-      </p:bgPr>
-    </p:bg>
-    <p:spTree>
-      <p:nvGrpSpPr>
-        <p:cNvPr id="1" name=""/>
-        <p:cNvGrpSpPr/>
-        <p:nvPr/>
-      </p:nvGrpSpPr>
-      <p:grpSpPr>
-        <a:xfrm>
-          <a:off x="0" y="0"/>
-          <a:ext cx="0" cy="0"/>
-          <a:chOff x="0" y="0"/>
-          <a:chExt cx="0" cy="0"/>
-        </a:xfrm>
-      </p:grpSpPr>
-      <p:sp useBgFill="1">
-        <p:nvSpPr>
-          <p:cNvPr id="63" name="Rectangle 58">
-            <a:extLst>
-              <a:ext uri="{FF2B5EF4-FFF2-40B4-BE49-F238E27FC236}">
-                <a16:creationId xmlns:a16="http://schemas.microsoft.com/office/drawing/2014/main" id="{665DBBEF-238B-476B-96AB-8AAC3224ECEA}"/>
-              </a:ext>
-              <a:ext uri="{C183D7F6-B498-43B3-948B-1728B52AA6E4}">
-                <adec:decorative xmlns:adec="http://schemas.microsoft.com/office/drawing/2017/decorative" val="1"/>
-              </a:ext>
-            </a:extLst>
-          </p:cNvPr>
-          <p:cNvSpPr>
-            <a:spLocks noGrp="1" noRot="1" noChangeAspect="1" noMove="1" noResize="1" noEditPoints="1" noAdjustHandles="1" noChangeArrowheads="1" noChangeShapeType="1" noTextEdit="1"/>
-          </p:cNvSpPr>
-          <p:nvPr>
-            <p:extLst>
-              <p:ext uri="{386F3935-93C4-4BCD-93E2-E3B085C9AB24}">
-                <p16:designElem xmlns:p16="http://schemas.microsoft.com/office/powerpoint/2015/main" val="1"/>
-              </p:ext>
-            </p:extLst>
-          </p:nvPr>
-        </p:nvSpPr>
-        <p:spPr>
-          <a:xfrm>
-            <a:off x="0" y="0"/>
-            <a:ext cx="12192000" cy="6858000"/>
-          </a:xfrm>
-          <a:prstGeom prst="rect">
-            <a:avLst/>
-          </a:prstGeom>
-          <a:ln>
-            <a:noFill/>
-          </a:ln>
-        </p:spPr>
-        <p:style>
-          <a:lnRef idx="2">
-            <a:schemeClr val="accent1">
-              <a:shade val="50000"/>
-            </a:schemeClr>
-          </a:lnRef>
-          <a:fillRef idx="1">
-            <a:schemeClr val="accent1"/>
-          </a:fillRef>
-          <a:effectRef idx="0">
-            <a:schemeClr val="accent1"/>
-          </a:effectRef>
-          <a:fontRef idx="minor">
-            <a:schemeClr val="lt1"/>
-          </a:fontRef>
-        </p:style>
-        <p:txBody>
-          <a:bodyPr rtlCol="0" anchor="ctr"/>
-          <a:lstStyle/>
-          <a:p>
-            <a:pPr algn="ctr"/>
-            <a:endParaRPr lang="en-US"/>
-          </a:p>
-        </p:txBody>
-      </p:sp>
-      <p:sp>
-        <p:nvSpPr>
-          <p:cNvPr id="2" name="Título 1">
-            <a:extLst>
-              <a:ext uri="{FF2B5EF4-FFF2-40B4-BE49-F238E27FC236}">
-                <a16:creationId xmlns:a16="http://schemas.microsoft.com/office/drawing/2014/main" id="{18EE046F-D8BC-24BA-6BA8-54A6F239BF53}"/>
-              </a:ext>
-            </a:extLst>
-          </p:cNvPr>
-          <p:cNvSpPr>
-            <a:spLocks noGrp="1"/>
-          </p:cNvSpPr>
-          <p:nvPr>
-            <p:ph type="ctrTitle"/>
-          </p:nvPr>
-        </p:nvSpPr>
-        <p:spPr>
-          <a:xfrm>
-            <a:off x="484920" y="954938"/>
-            <a:ext cx="3571810" cy="3573516"/>
-          </a:xfrm>
-        </p:spPr>
-        <p:txBody>
-          <a:bodyPr>
-            <a:normAutofit/>
-          </a:bodyPr>
-          <a:lstStyle/>
-          <a:p>
-            <a:r>
-              <a:rPr lang="es-ES" sz="5400" dirty="0"/>
-              <a:t>WIREFLOW</a:t>
-            </a:r>
-          </a:p>
-        </p:txBody>
-      </p:sp>
-      <p:sp>
-        <p:nvSpPr>
-          <p:cNvPr id="64" name="Rectangle 6">
-            <a:extLst>
-              <a:ext uri="{FF2B5EF4-FFF2-40B4-BE49-F238E27FC236}">
-                <a16:creationId xmlns:a16="http://schemas.microsoft.com/office/drawing/2014/main" id="{3FCFB1DE-0B7E-48CC-BA90-B2AB0889F9D6}"/>
-              </a:ext>
-              <a:ext uri="{C183D7F6-B498-43B3-948B-1728B52AA6E4}">
-                <adec:decorative xmlns:adec="http://schemas.microsoft.com/office/drawing/2017/decorative" val="1"/>
-              </a:ext>
-            </a:extLst>
-          </p:cNvPr>
-          <p:cNvSpPr>
-            <a:spLocks noGrp="1" noRot="1" noChangeAspect="1" noMove="1" noResize="1" noEditPoints="1" noAdjustHandles="1" noChangeArrowheads="1" noChangeShapeType="1" noTextEdit="1"/>
-          </p:cNvSpPr>
-          <p:nvPr>
-            <p:extLst>
-              <p:ext uri="{386F3935-93C4-4BCD-93E2-E3B085C9AB24}">
-                <p16:designElem xmlns:p16="http://schemas.microsoft.com/office/powerpoint/2015/main" val="1"/>
-              </p:ext>
-            </p:extLst>
-          </p:nvPr>
-        </p:nvSpPr>
-        <p:spPr>
-          <a:xfrm>
-            <a:off x="643278" y="4409267"/>
-            <a:ext cx="3255095" cy="27432"/>
-          </a:xfrm>
-          <a:custGeom>
-            <a:avLst/>
-            <a:gdLst>
-              <a:gd name="connsiteX0" fmla="*/ 0 w 3255095"/>
-              <a:gd name="connsiteY0" fmla="*/ 0 h 27432"/>
-              <a:gd name="connsiteX1" fmla="*/ 618468 w 3255095"/>
-              <a:gd name="connsiteY1" fmla="*/ 0 h 27432"/>
-              <a:gd name="connsiteX2" fmla="*/ 1269487 w 3255095"/>
-              <a:gd name="connsiteY2" fmla="*/ 0 h 27432"/>
-              <a:gd name="connsiteX3" fmla="*/ 1953057 w 3255095"/>
-              <a:gd name="connsiteY3" fmla="*/ 0 h 27432"/>
-              <a:gd name="connsiteX4" fmla="*/ 2636627 w 3255095"/>
-              <a:gd name="connsiteY4" fmla="*/ 0 h 27432"/>
-              <a:gd name="connsiteX5" fmla="*/ 3255095 w 3255095"/>
-              <a:gd name="connsiteY5" fmla="*/ 0 h 27432"/>
-              <a:gd name="connsiteX6" fmla="*/ 3255095 w 3255095"/>
-              <a:gd name="connsiteY6" fmla="*/ 27432 h 27432"/>
-              <a:gd name="connsiteX7" fmla="*/ 2538974 w 3255095"/>
-              <a:gd name="connsiteY7" fmla="*/ 27432 h 27432"/>
-              <a:gd name="connsiteX8" fmla="*/ 1822853 w 3255095"/>
-              <a:gd name="connsiteY8" fmla="*/ 27432 h 27432"/>
-              <a:gd name="connsiteX9" fmla="*/ 1171834 w 3255095"/>
-              <a:gd name="connsiteY9" fmla="*/ 27432 h 27432"/>
-              <a:gd name="connsiteX10" fmla="*/ 0 w 3255095"/>
-              <a:gd name="connsiteY10" fmla="*/ 27432 h 27432"/>
-              <a:gd name="connsiteX11" fmla="*/ 0 w 3255095"/>
-              <a:gd name="connsiteY11" fmla="*/ 0 h 27432"/>
-            </a:gdLst>
-            <a:ahLst/>
-            <a:cxnLst>
-              <a:cxn ang="0">
-                <a:pos x="connsiteX0" y="connsiteY0"/>
-              </a:cxn>
-              <a:cxn ang="0">
-                <a:pos x="connsiteX1" y="connsiteY1"/>
-              </a:cxn>
-              <a:cxn ang="0">
-                <a:pos x="connsiteX2" y="connsiteY2"/>
-              </a:cxn>
-              <a:cxn ang="0">
-                <a:pos x="connsiteX3" y="connsiteY3"/>
-              </a:cxn>
-              <a:cxn ang="0">
-                <a:pos x="connsiteX4" y="connsiteY4"/>
-              </a:cxn>
-              <a:cxn ang="0">
-                <a:pos x="connsiteX5" y="connsiteY5"/>
-              </a:cxn>
-              <a:cxn ang="0">
-                <a:pos x="connsiteX6" y="connsiteY6"/>
-              </a:cxn>
-              <a:cxn ang="0">
-                <a:pos x="connsiteX7" y="connsiteY7"/>
-              </a:cxn>
-              <a:cxn ang="0">
-                <a:pos x="connsiteX8" y="connsiteY8"/>
-              </a:cxn>
-              <a:cxn ang="0">
-                <a:pos x="connsiteX9" y="connsiteY9"/>
-              </a:cxn>
-              <a:cxn ang="0">
-                <a:pos x="connsiteX10" y="connsiteY10"/>
-              </a:cxn>
-              <a:cxn ang="0">
-                <a:pos x="connsiteX11" y="connsiteY11"/>
-              </a:cxn>
-            </a:cxnLst>
-            <a:rect l="l" t="t" r="r" b="b"/>
-            <a:pathLst>
-              <a:path w="3255095" h="27432" fill="none" extrusionOk="0">
-                <a:moveTo>
-                  <a:pt x="0" y="0"/>
-                </a:moveTo>
-                <a:cubicBezTo>
-                  <a:pt x="240201" y="-22123"/>
-                  <a:pt x="462021" y="-19623"/>
-                  <a:pt x="618468" y="0"/>
-                </a:cubicBezTo>
-                <a:cubicBezTo>
-                  <a:pt x="774915" y="19623"/>
-                  <a:pt x="974734" y="2035"/>
-                  <a:pt x="1269487" y="0"/>
-                </a:cubicBezTo>
-                <a:cubicBezTo>
-                  <a:pt x="1564240" y="-2035"/>
-                  <a:pt x="1733579" y="10639"/>
-                  <a:pt x="1953057" y="0"/>
-                </a:cubicBezTo>
-                <a:cubicBezTo>
-                  <a:pt x="2172535" y="-10639"/>
-                  <a:pt x="2453962" y="14018"/>
-                  <a:pt x="2636627" y="0"/>
-                </a:cubicBezTo>
-                <a:cubicBezTo>
-                  <a:pt x="2819292" y="-14018"/>
-                  <a:pt x="3121375" y="5399"/>
-                  <a:pt x="3255095" y="0"/>
-                </a:cubicBezTo>
-                <a:cubicBezTo>
-                  <a:pt x="3253929" y="7395"/>
-                  <a:pt x="3255140" y="21864"/>
-                  <a:pt x="3255095" y="27432"/>
-                </a:cubicBezTo>
-                <a:cubicBezTo>
-                  <a:pt x="3088545" y="32347"/>
-                  <a:pt x="2687475" y="16563"/>
-                  <a:pt x="2538974" y="27432"/>
-                </a:cubicBezTo>
-                <a:cubicBezTo>
-                  <a:pt x="2390473" y="38301"/>
-                  <a:pt x="2137381" y="185"/>
-                  <a:pt x="1822853" y="27432"/>
-                </a:cubicBezTo>
-                <a:cubicBezTo>
-                  <a:pt x="1508325" y="54679"/>
-                  <a:pt x="1466437" y="29529"/>
-                  <a:pt x="1171834" y="27432"/>
-                </a:cubicBezTo>
-                <a:cubicBezTo>
-                  <a:pt x="877231" y="25335"/>
-                  <a:pt x="561097" y="46787"/>
-                  <a:pt x="0" y="27432"/>
-                </a:cubicBezTo>
-                <a:cubicBezTo>
-                  <a:pt x="-503" y="20663"/>
-                  <a:pt x="1168" y="5855"/>
-                  <a:pt x="0" y="0"/>
-                </a:cubicBezTo>
-                <a:close/>
-              </a:path>
-              <a:path w="3255095" h="27432" stroke="0" extrusionOk="0">
-                <a:moveTo>
-                  <a:pt x="0" y="0"/>
-                </a:moveTo>
-                <a:cubicBezTo>
-                  <a:pt x="291965" y="19429"/>
-                  <a:pt x="363155" y="8568"/>
-                  <a:pt x="618468" y="0"/>
-                </a:cubicBezTo>
-                <a:cubicBezTo>
-                  <a:pt x="873781" y="-8568"/>
-                  <a:pt x="904459" y="-19505"/>
-                  <a:pt x="1171834" y="0"/>
-                </a:cubicBezTo>
-                <a:cubicBezTo>
-                  <a:pt x="1439209" y="19505"/>
-                  <a:pt x="1744369" y="9790"/>
-                  <a:pt x="1887955" y="0"/>
-                </a:cubicBezTo>
-                <a:cubicBezTo>
-                  <a:pt x="2031541" y="-9790"/>
-                  <a:pt x="2346378" y="21240"/>
-                  <a:pt x="2506423" y="0"/>
-                </a:cubicBezTo>
-                <a:cubicBezTo>
-                  <a:pt x="2666468" y="-21240"/>
-                  <a:pt x="2990257" y="30414"/>
-                  <a:pt x="3255095" y="0"/>
-                </a:cubicBezTo>
-                <a:cubicBezTo>
-                  <a:pt x="3255288" y="12649"/>
-                  <a:pt x="3254107" y="17989"/>
-                  <a:pt x="3255095" y="27432"/>
-                </a:cubicBezTo>
-                <a:cubicBezTo>
-                  <a:pt x="3120743" y="25834"/>
-                  <a:pt x="2759628" y="51606"/>
-                  <a:pt x="2604076" y="27432"/>
-                </a:cubicBezTo>
-                <a:cubicBezTo>
-                  <a:pt x="2448524" y="3258"/>
-                  <a:pt x="2184336" y="28743"/>
-                  <a:pt x="1887955" y="27432"/>
-                </a:cubicBezTo>
-                <a:cubicBezTo>
-                  <a:pt x="1591574" y="26121"/>
-                  <a:pt x="1548845" y="16014"/>
-                  <a:pt x="1334589" y="27432"/>
-                </a:cubicBezTo>
-                <a:cubicBezTo>
-                  <a:pt x="1120333" y="38850"/>
-                  <a:pt x="996014" y="18806"/>
-                  <a:pt x="683570" y="27432"/>
-                </a:cubicBezTo>
-                <a:cubicBezTo>
-                  <a:pt x="371126" y="36058"/>
-                  <a:pt x="198687" y="25311"/>
-                  <a:pt x="0" y="27432"/>
-                </a:cubicBezTo>
-                <a:cubicBezTo>
-                  <a:pt x="1300" y="19678"/>
-                  <a:pt x="-86" y="12044"/>
-                  <a:pt x="0" y="0"/>
-                </a:cubicBezTo>
-                <a:close/>
-              </a:path>
-            </a:pathLst>
-          </a:custGeom>
-          <a:solidFill>
-            <a:srgbClr val="E72950"/>
-          </a:solidFill>
-          <a:ln w="38100" cap="rnd">
-            <a:solidFill>
-              <a:srgbClr val="E72950"/>
-            </a:solidFill>
-            <a:round/>
-            <a:extLst>
-              <a:ext uri="{C807C97D-BFC1-408E-A445-0C87EB9F89A2}">
-                <ask:lineSketchStyleProps xmlns:ask="http://schemas.microsoft.com/office/drawing/2018/sketchyshapes" sd="1219033472">
-                  <a:prstGeom prst="rect">
-                    <a:avLst/>
-                  </a:prstGeom>
-                  <ask:type>
-                    <ask:lineSketchFreehand/>
-                  </ask:type>
-                </ask:lineSketchStyleProps>
-              </a:ext>
-            </a:extLst>
-          </a:ln>
-        </p:spPr>
-        <p:style>
-          <a:lnRef idx="2">
-            <a:schemeClr val="accent1">
-              <a:shade val="50000"/>
-            </a:schemeClr>
-          </a:lnRef>
-          <a:fillRef idx="1">
-            <a:schemeClr val="accent1"/>
-          </a:fillRef>
-          <a:effectRef idx="0">
-            <a:schemeClr val="accent1"/>
-          </a:effectRef>
-          <a:fontRef idx="minor">
-            <a:schemeClr val="lt1"/>
-          </a:fontRef>
-        </p:style>
-        <p:txBody>
-          <a:bodyPr rtlCol="0" anchor="ctr"/>
-          <a:lstStyle/>
-          <a:p>
-            <a:pPr algn="ctr"/>
-            <a:endParaRPr lang="en-US"/>
-          </a:p>
-        </p:txBody>
-      </p:sp>
-      <p:pic>
-        <p:nvPicPr>
-          <p:cNvPr id="7" name="Imagen 6">
-            <a:extLst>
-              <a:ext uri="{FF2B5EF4-FFF2-40B4-BE49-F238E27FC236}">
-                <a16:creationId xmlns:a16="http://schemas.microsoft.com/office/drawing/2014/main" id="{FC6073CE-57D8-B603-637E-7A051D6FEC9A}"/>
-              </a:ext>
-            </a:extLst>
-          </p:cNvPr>
-          <p:cNvPicPr>
-            <a:picLocks noChangeAspect="1"/>
-          </p:cNvPicPr>
-          <p:nvPr/>
-        </p:nvPicPr>
-        <p:blipFill rotWithShape="1">
-          <a:blip r:embed="rId2"/>
-          <a:srcRect l="213" t="403" r="92" b="472"/>
-          <a:stretch/>
-        </p:blipFill>
-        <p:spPr>
-          <a:xfrm>
-            <a:off x="3898374" y="1307192"/>
-            <a:ext cx="8083550" cy="4188751"/>
-          </a:xfrm>
-          <a:prstGeom prst="rect">
-            <a:avLst/>
-          </a:prstGeom>
-        </p:spPr>
-      </p:pic>
-    </p:spTree>
-    <p:extLst>
-      <p:ext uri="{BB962C8B-B14F-4D97-AF65-F5344CB8AC3E}">
-        <p14:creationId xmlns:p14="http://schemas.microsoft.com/office/powerpoint/2010/main" val="3887910851"/>
-      </p:ext>
-    </p:extLst>
-  </p:cSld>
-  <p:clrMapOvr>
-    <a:masterClrMapping/>
-  </p:clrMapOvr>
-  <p:timing>
-    <p:tnLst>
-      <p:par>
-        <p:cTn id="1" dur="indefinite" restart="never" nodeType="tmRoot">
-          <p:childTnLst>
-            <p:seq concurrent="1" nextAc="seek">
-              <p:cTn id="2" dur="indefinite" nodeType="mainSeq">
-                <p:childTnLst>
-                  <p:par>
-                    <p:cTn id="3" fill="hold">
-                      <p:stCondLst>
-                        <p:cond delay="indefinite"/>
-                        <p:cond evt="onBegin" delay="0">
-                          <p:tn val="2"/>
-                        </p:cond>
-                      </p:stCondLst>
-                      <p:childTnLst>
-                        <p:par>
-                          <p:cTn id="4" fill="hold">
-                            <p:stCondLst>
-                              <p:cond delay="0"/>
-                            </p:stCondLst>
-                            <p:childTnLst>
-                              <p:par>
-                                <p:cTn id="5" presetID="10" presetClass="entr" presetSubtype="0" fill="hold" grpId="0" nodeType="withEffect">
-                                  <p:stCondLst>
-                                    <p:cond delay="1000"/>
-                                  </p:stCondLst>
-                                  <p:iterate type="lt">
-                                    <p:tmPct val="10000"/>
-                                  </p:iterate>
-                                  <p:childTnLst>
-                                    <p:set>
-                                      <p:cBhvr>
-                                        <p:cTn id="6" dur="1" fill="hold">
-                                          <p:stCondLst>
-                                            <p:cond delay="0"/>
-                                          </p:stCondLst>
-                                        </p:cTn>
-                                        <p:tgtEl>
-                                          <p:spTgt spid="2"/>
-                                        </p:tgtEl>
-                                        <p:attrNameLst>
-                                          <p:attrName>style.visibility</p:attrName>
-                                        </p:attrNameLst>
-                                      </p:cBhvr>
-                                      <p:to>
-                                        <p:strVal val="visible"/>
-                                      </p:to>
-                                    </p:set>
-                                    <p:animEffect transition="in" filter="fade">
-                                      <p:cBhvr>
-                                        <p:cTn id="7" dur="400"/>
-                                        <p:tgtEl>
-                                          <p:spTgt spid="2"/>
-                                        </p:tgtEl>
-                                      </p:cBhvr>
-                                    </p:animEffect>
-                                  </p:childTnLst>
-                                </p:cTn>
-                              </p:par>
-                            </p:childTnLst>
-                          </p:cTn>
-                        </p:par>
-                      </p:childTnLst>
-                    </p:cTn>
-                  </p:par>
-                </p:childTnLst>
-              </p:cTn>
-              <p:prevCondLst>
-                <p:cond evt="onPrev" delay="0">
-                  <p:tgtEl>
-                    <p:sldTgt/>
-                  </p:tgtEl>
-                </p:cond>
-              </p:prevCondLst>
-              <p:nextCondLst>
-                <p:cond evt="onNext" delay="0">
-                  <p:tgtEl>
-                    <p:sldTgt/>
-                  </p:tgtEl>
-                </p:cond>
-              </p:nextCondLst>
-            </p:seq>
-          </p:childTnLst>
-        </p:cTn>
-      </p:par>
-    </p:tnLst>
-    <p:bldLst>
-      <p:bldP spid="2" grpId="0"/>
-    </p:bldLst>
-  </p:timing>
-</p:sld>
-</file>
-
-<file path=ppt/slides/slide4.xml><?xml version="1.0" encoding="utf-8"?>
 <p:sld xmlns:a="http://schemas.openxmlformats.org/drawingml/2006/main" xmlns:r="http://schemas.openxmlformats.org/officeDocument/2006/relationships" xmlns:p="http://schemas.openxmlformats.org/presentationml/2006/main">
   <p:cSld>
     <p:bg>
@@ -8360,7 +7828,374 @@
           <a:lstStyle/>
           <a:p>
             <a:pPr algn="ctr"/>
-            <a:endParaRPr lang="en-US"/>
+            <a:endParaRPr lang="en-US" dirty="0"/>
+          </a:p>
+        </p:txBody>
+      </p:sp>
+      <p:cxnSp>
+        <p:nvCxnSpPr>
+          <p:cNvPr id="39" name="Straight Connector 38">
+            <a:extLst>
+              <a:ext uri="{FF2B5EF4-FFF2-40B4-BE49-F238E27FC236}">
+                <a16:creationId xmlns:a16="http://schemas.microsoft.com/office/drawing/2014/main" id="{34E5597F-CE67-4085-9548-E6A8036DA3BB}"/>
+              </a:ext>
+              <a:ext uri="{C183D7F6-B498-43B3-948B-1728B52AA6E4}">
+                <adec:decorative xmlns:adec="http://schemas.microsoft.com/office/drawing/2017/decorative" val="1"/>
+              </a:ext>
+            </a:extLst>
+          </p:cNvPr>
+          <p:cNvCxnSpPr>
+            <a:cxnSpLocks noGrp="1" noRot="1" noChangeAspect="1" noMove="1" noResize="1" noEditPoints="1" noAdjustHandles="1" noChangeArrowheads="1" noChangeShapeType="1"/>
+          </p:cNvCxnSpPr>
+          <p:nvPr>
+            <p:extLst>
+              <p:ext uri="{386F3935-93C4-4BCD-93E2-E3B085C9AB24}">
+                <p16:designElem xmlns:p16="http://schemas.microsoft.com/office/powerpoint/2015/main" val="1"/>
+              </p:ext>
+            </p:extLst>
+          </p:nvPr>
+        </p:nvCxnSpPr>
+        <p:spPr>
+          <a:xfrm>
+            <a:off x="3393881" y="4035362"/>
+            <a:ext cx="5404237" cy="0"/>
+          </a:xfrm>
+          <a:prstGeom prst="line">
+            <a:avLst/>
+          </a:prstGeom>
+          <a:ln>
+            <a:solidFill>
+              <a:schemeClr val="bg1"/>
+            </a:solidFill>
+          </a:ln>
+          <a:effectLst>
+            <a:outerShdw blurRad="50800" dist="38100" dir="2700000" algn="tl" rotWithShape="0">
+              <a:prstClr val="black">
+                <a:alpha val="40000"/>
+              </a:prstClr>
+            </a:outerShdw>
+          </a:effectLst>
+        </p:spPr>
+        <p:style>
+          <a:lnRef idx="1">
+            <a:schemeClr val="accent1"/>
+          </a:lnRef>
+          <a:fillRef idx="0">
+            <a:schemeClr val="accent1"/>
+          </a:fillRef>
+          <a:effectRef idx="0">
+            <a:schemeClr val="accent1"/>
+          </a:effectRef>
+          <a:fontRef idx="minor">
+            <a:schemeClr val="tx1"/>
+          </a:fontRef>
+        </p:style>
+      </p:cxnSp>
+      <p:pic>
+        <p:nvPicPr>
+          <p:cNvPr id="2" name="Imagen 1">
+            <a:extLst>
+              <a:ext uri="{FF2B5EF4-FFF2-40B4-BE49-F238E27FC236}">
+                <a16:creationId xmlns:a16="http://schemas.microsoft.com/office/drawing/2014/main" id="{B8543351-2130-C704-E945-D515845EE167}"/>
+              </a:ext>
+            </a:extLst>
+          </p:cNvPr>
+          <p:cNvPicPr>
+            <a:picLocks noChangeAspect="1"/>
+          </p:cNvPicPr>
+          <p:nvPr/>
+        </p:nvPicPr>
+        <p:blipFill rotWithShape="1">
+          <a:blip r:embed="rId3"/>
+          <a:srcRect l="213" t="403" r="92" b="472"/>
+          <a:stretch/>
+        </p:blipFill>
+        <p:spPr>
+          <a:xfrm>
+            <a:off x="784088" y="142011"/>
+            <a:ext cx="10617727" cy="4825727"/>
+          </a:xfrm>
+          <a:prstGeom prst="rect">
+            <a:avLst/>
+          </a:prstGeom>
+        </p:spPr>
+      </p:pic>
+      <p:sp>
+        <p:nvSpPr>
+          <p:cNvPr id="5" name="Título 1">
+            <a:extLst>
+              <a:ext uri="{FF2B5EF4-FFF2-40B4-BE49-F238E27FC236}">
+                <a16:creationId xmlns:a16="http://schemas.microsoft.com/office/drawing/2014/main" id="{0FA8439C-2345-C3EC-3681-4F3CA1C20642}"/>
+              </a:ext>
+            </a:extLst>
+          </p:cNvPr>
+          <p:cNvSpPr>
+            <a:spLocks noGrp="1"/>
+          </p:cNvSpPr>
+          <p:nvPr>
+            <p:ph type="ctrTitle"/>
+          </p:nvPr>
+        </p:nvSpPr>
+        <p:spPr>
+          <a:xfrm>
+            <a:off x="4089064" y="4967738"/>
+            <a:ext cx="3851287" cy="1204229"/>
+          </a:xfrm>
+        </p:spPr>
+        <p:txBody>
+          <a:bodyPr>
+            <a:normAutofit/>
+          </a:bodyPr>
+          <a:lstStyle/>
+          <a:p>
+            <a:r>
+              <a:rPr lang="es-ES" sz="5400" dirty="0">
+                <a:solidFill>
+                  <a:schemeClr val="bg1"/>
+                </a:solidFill>
+              </a:rPr>
+              <a:t>WIREFLOW</a:t>
+            </a:r>
+          </a:p>
+        </p:txBody>
+      </p:sp>
+    </p:spTree>
+    <p:extLst>
+      <p:ext uri="{BB962C8B-B14F-4D97-AF65-F5344CB8AC3E}">
+        <p14:creationId xmlns:p14="http://schemas.microsoft.com/office/powerpoint/2010/main" val="2180385801"/>
+      </p:ext>
+    </p:extLst>
+  </p:cSld>
+  <p:clrMapOvr>
+    <a:masterClrMapping/>
+  </p:clrMapOvr>
+  <p:timing>
+    <p:tnLst>
+      <p:par>
+        <p:cTn id="1" dur="indefinite" restart="never" nodeType="tmRoot">
+          <p:childTnLst>
+            <p:seq concurrent="1" nextAc="seek">
+              <p:cTn id="2" dur="indefinite" nodeType="mainSeq">
+                <p:childTnLst>
+                  <p:par>
+                    <p:cTn id="3" fill="hold">
+                      <p:stCondLst>
+                        <p:cond delay="indefinite"/>
+                        <p:cond evt="onBegin" delay="0">
+                          <p:tn val="2"/>
+                        </p:cond>
+                      </p:stCondLst>
+                      <p:childTnLst>
+                        <p:par>
+                          <p:cTn id="4" fill="hold">
+                            <p:stCondLst>
+                              <p:cond delay="0"/>
+                            </p:stCondLst>
+                            <p:childTnLst>
+                              <p:par>
+                                <p:cTn id="5" presetID="10" presetClass="entr" presetSubtype="0" fill="hold" grpId="0" nodeType="withEffect">
+                                  <p:stCondLst>
+                                    <p:cond delay="1000"/>
+                                  </p:stCondLst>
+                                  <p:iterate type="lt">
+                                    <p:tmPct val="10000"/>
+                                  </p:iterate>
+                                  <p:childTnLst>
+                                    <p:set>
+                                      <p:cBhvr>
+                                        <p:cTn id="6" dur="1" fill="hold">
+                                          <p:stCondLst>
+                                            <p:cond delay="0"/>
+                                          </p:stCondLst>
+                                        </p:cTn>
+                                        <p:tgtEl>
+                                          <p:spTgt spid="5"/>
+                                        </p:tgtEl>
+                                        <p:attrNameLst>
+                                          <p:attrName>style.visibility</p:attrName>
+                                        </p:attrNameLst>
+                                      </p:cBhvr>
+                                      <p:to>
+                                        <p:strVal val="visible"/>
+                                      </p:to>
+                                    </p:set>
+                                    <p:animEffect transition="in" filter="fade">
+                                      <p:cBhvr>
+                                        <p:cTn id="7" dur="400"/>
+                                        <p:tgtEl>
+                                          <p:spTgt spid="5"/>
+                                        </p:tgtEl>
+                                      </p:cBhvr>
+                                    </p:animEffect>
+                                  </p:childTnLst>
+                                </p:cTn>
+                              </p:par>
+                            </p:childTnLst>
+                          </p:cTn>
+                        </p:par>
+                      </p:childTnLst>
+                    </p:cTn>
+                  </p:par>
+                </p:childTnLst>
+              </p:cTn>
+              <p:prevCondLst>
+                <p:cond evt="onPrev" delay="0">
+                  <p:tgtEl>
+                    <p:sldTgt/>
+                  </p:tgtEl>
+                </p:cond>
+              </p:prevCondLst>
+              <p:nextCondLst>
+                <p:cond evt="onNext" delay="0">
+                  <p:tgtEl>
+                    <p:sldTgt/>
+                  </p:tgtEl>
+                </p:cond>
+              </p:nextCondLst>
+            </p:seq>
+          </p:childTnLst>
+        </p:cTn>
+      </p:par>
+    </p:tnLst>
+    <p:bldLst>
+      <p:bldP spid="5" grpId="0"/>
+    </p:bldLst>
+  </p:timing>
+</p:sld>
+</file>
+
+<file path=ppt/slides/slide4.xml><?xml version="1.0" encoding="utf-8"?>
+<p:sld xmlns:a="http://schemas.openxmlformats.org/drawingml/2006/main" xmlns:r="http://schemas.openxmlformats.org/officeDocument/2006/relationships" xmlns:p="http://schemas.openxmlformats.org/presentationml/2006/main">
+  <p:cSld>
+    <p:bg>
+      <p:bgPr>
+        <a:solidFill>
+          <a:schemeClr val="bg1"/>
+        </a:solidFill>
+        <a:effectLst/>
+      </p:bgPr>
+    </p:bg>
+    <p:spTree>
+      <p:nvGrpSpPr>
+        <p:cNvPr id="1" name=""/>
+        <p:cNvGrpSpPr/>
+        <p:nvPr/>
+      </p:nvGrpSpPr>
+      <p:grpSpPr>
+        <a:xfrm>
+          <a:off x="0" y="0"/>
+          <a:ext cx="0" cy="0"/>
+          <a:chOff x="0" y="0"/>
+          <a:chExt cx="0" cy="0"/>
+        </a:xfrm>
+      </p:grpSpPr>
+      <p:pic>
+        <p:nvPicPr>
+          <p:cNvPr id="33" name="Picture 32" descr="Movimiento de jaque mate en un tablero de ajedrez">
+            <a:extLst>
+              <a:ext uri="{FF2B5EF4-FFF2-40B4-BE49-F238E27FC236}">
+                <a16:creationId xmlns:a16="http://schemas.microsoft.com/office/drawing/2014/main" id="{7C19B8B7-51A6-4095-DDE1-232B5CF6115B}"/>
+              </a:ext>
+            </a:extLst>
+          </p:cNvPr>
+          <p:cNvPicPr>
+            <a:picLocks noChangeAspect="1"/>
+          </p:cNvPicPr>
+          <p:nvPr/>
+        </p:nvPicPr>
+        <p:blipFill rotWithShape="1">
+          <a:blip r:embed="rId2"/>
+          <a:srcRect t="15414"/>
+          <a:stretch/>
+        </p:blipFill>
+        <p:spPr>
+          <a:xfrm>
+            <a:off x="-3047" y="10"/>
+            <a:ext cx="12191999" cy="6857990"/>
+          </a:xfrm>
+          <a:prstGeom prst="rect">
+            <a:avLst/>
+          </a:prstGeom>
+        </p:spPr>
+      </p:pic>
+      <p:sp>
+        <p:nvSpPr>
+          <p:cNvPr id="37" name="Rectangle 36">
+            <a:extLst>
+              <a:ext uri="{FF2B5EF4-FFF2-40B4-BE49-F238E27FC236}">
+                <a16:creationId xmlns:a16="http://schemas.microsoft.com/office/drawing/2014/main" id="{007891EC-4501-44ED-A8C8-B11B6DB767AB}"/>
+              </a:ext>
+              <a:ext uri="{C183D7F6-B498-43B3-948B-1728B52AA6E4}">
+                <adec:decorative xmlns:adec="http://schemas.microsoft.com/office/drawing/2017/decorative" val="1"/>
+              </a:ext>
+            </a:extLst>
+          </p:cNvPr>
+          <p:cNvSpPr>
+            <a:spLocks noGrp="1" noRot="1" noChangeAspect="1" noMove="1" noResize="1" noEditPoints="1" noAdjustHandles="1" noChangeArrowheads="1" noChangeShapeType="1" noTextEdit="1"/>
+          </p:cNvSpPr>
+          <p:nvPr>
+            <p:extLst>
+              <p:ext uri="{386F3935-93C4-4BCD-93E2-E3B085C9AB24}">
+                <p16:designElem xmlns:p16="http://schemas.microsoft.com/office/powerpoint/2015/main" val="1"/>
+              </p:ext>
+            </p:extLst>
+          </p:nvPr>
+        </p:nvSpPr>
+        <p:spPr>
+          <a:xfrm>
+            <a:off x="0" y="2207602"/>
+            <a:ext cx="12191999" cy="3162146"/>
+          </a:xfrm>
+          <a:prstGeom prst="rect">
+            <a:avLst/>
+          </a:prstGeom>
+          <a:gradFill flip="none" rotWithShape="1">
+            <a:gsLst>
+              <a:gs pos="0">
+                <a:schemeClr val="tx1">
+                  <a:alpha val="0"/>
+                </a:schemeClr>
+              </a:gs>
+              <a:gs pos="50000">
+                <a:schemeClr val="tx1">
+                  <a:alpha val="35000"/>
+                </a:schemeClr>
+              </a:gs>
+              <a:gs pos="100000">
+                <a:schemeClr val="tx1">
+                  <a:alpha val="0"/>
+                </a:schemeClr>
+              </a:gs>
+            </a:gsLst>
+            <a:lin ang="16200000" scaled="1"/>
+            <a:tileRect/>
+          </a:gradFill>
+          <a:ln>
+            <a:noFill/>
+          </a:ln>
+        </p:spPr>
+        <p:style>
+          <a:lnRef idx="2">
+            <a:schemeClr val="accent1">
+              <a:shade val="50000"/>
+            </a:schemeClr>
+          </a:lnRef>
+          <a:fillRef idx="1">
+            <a:schemeClr val="accent1"/>
+          </a:fillRef>
+          <a:effectRef idx="0">
+            <a:schemeClr val="accent1"/>
+          </a:effectRef>
+          <a:fontRef idx="minor">
+            <a:schemeClr val="lt1"/>
+          </a:fontRef>
+        </p:style>
+        <p:txBody>
+          <a:bodyPr rtlCol="0" anchor="ctr"/>
+          <a:lstStyle/>
+          <a:p>
+            <a:pPr algn="ctr"/>
+            <a:endParaRPr lang="en-US" dirty="0"/>
           </a:p>
         </p:txBody>
       </p:sp>
@@ -8481,8 +8316,8 @@
         </p:nvSpPr>
         <p:spPr>
           <a:xfrm>
-            <a:off x="1288797" y="632941"/>
-            <a:ext cx="9550837" cy="2395287"/>
+            <a:off x="196969" y="621924"/>
+            <a:ext cx="11638262" cy="3551068"/>
           </a:xfrm>
         </p:spPr>
         <p:txBody>
@@ -8509,7 +8344,73 @@
                   </a:outerShdw>
                 </a:effectLst>
               </a:rPr>
-              <a:t>Se emplean colores con tonalidades marrones y negros dando la sensación de estar jugando en una mesa en vez del ordenador</a:t>
+              <a:t>Se emplean colores con tonalidades marrones y negros dando la sensación de estar jugando en una mesa.</a:t>
+            </a:r>
+          </a:p>
+          <a:p>
+            <a:pPr algn="ctr">
+              <a:lnSpc>
+                <a:spcPct val="100000"/>
+              </a:lnSpc>
+            </a:pPr>
+            <a:r>
+              <a:rPr lang="es-ES" sz="3600" b="1" dirty="0">
+                <a:solidFill>
+                  <a:schemeClr val="bg1"/>
+                </a:solidFill>
+                <a:effectLst>
+                  <a:outerShdw blurRad="38100" dist="38100" dir="2700000" algn="tl">
+                    <a:srgbClr val="000000">
+                      <a:alpha val="43137"/>
+                    </a:srgbClr>
+                  </a:outerShdw>
+                </a:effectLst>
+              </a:rPr>
+              <a:t>Además, la página contara con tarjetas con diseños atractivos para darle ese toque moderno y atraer tanto a un público tradicional como más actual de los juegos de mesa a la aplicación.</a:t>
+            </a:r>
+          </a:p>
+          <a:p>
+            <a:pPr algn="ctr">
+              <a:lnSpc>
+                <a:spcPct val="100000"/>
+              </a:lnSpc>
+            </a:pPr>
+            <a:r>
+              <a:rPr lang="es-ES" sz="3600" b="1" dirty="0">
+                <a:solidFill>
+                  <a:schemeClr val="bg1"/>
+                </a:solidFill>
+                <a:effectLst>
+                  <a:outerShdw blurRad="38100" dist="38100" dir="2700000" algn="tl">
+                    <a:srgbClr val="000000">
+                      <a:alpha val="43137"/>
+                    </a:srgbClr>
+                  </a:outerShdw>
+                </a:effectLst>
+              </a:rPr>
+              <a:t>Además, las alertas que se usen para interactuar con el usuario estarán personalizadas.</a:t>
+            </a:r>
+          </a:p>
+          <a:p>
+            <a:pPr algn="ctr">
+              <a:lnSpc>
+                <a:spcPct val="100000"/>
+              </a:lnSpc>
+            </a:pPr>
+            <a:r>
+              <a:rPr lang="es-ES" sz="3600" b="1" dirty="0">
+                <a:solidFill>
+                  <a:schemeClr val="bg1"/>
+                </a:solidFill>
+                <a:effectLst>
+                  <a:outerShdw blurRad="38100" dist="38100" dir="2700000" algn="tl">
+                    <a:srgbClr val="000000">
+                      <a:alpha val="43137"/>
+                    </a:srgbClr>
+                  </a:outerShdw>
+                </a:effectLst>
+              </a:rPr>
+              <a:t>La aplicación tendrá su logo acorde al diseño desarrollado</a:t>
             </a:r>
           </a:p>
         </p:txBody>
@@ -8737,15 +8638,6 @@
 </file>
 
 <file path=customXml/item2.xml><?xml version="1.0" encoding="utf-8"?>
-<?mso-contentType ?>
-<FormTemplates xmlns="http://schemas.microsoft.com/sharepoint/v3/contenttype/forms">
-  <Display>DocumentLibraryForm</Display>
-  <Edit>DocumentLibraryForm</Edit>
-  <New>DocumentLibraryForm</New>
-</FormTemplates>
-</file>
-
-<file path=customXml/item3.xml><?xml version="1.0" encoding="utf-8"?>
 <ct:contentTypeSchema xmlns:ct="http://schemas.microsoft.com/office/2006/metadata/contentType" xmlns:ma="http://schemas.microsoft.com/office/2006/metadata/properties/metaAttributes" ct:_="" ma:_="" ma:contentTypeName="Documento" ma:contentTypeID="0x0101001CF815299FD08446828E528E2628D888" ma:contentTypeVersion="18" ma:contentTypeDescription="Crear nuevo documento." ma:contentTypeScope="" ma:versionID="eda16f0b0df14eff352f61fdd29391dd">
   <xsd:schema xmlns:xsd="http://www.w3.org/2001/XMLSchema" xmlns:xs="http://www.w3.org/2001/XMLSchema" xmlns:p="http://schemas.microsoft.com/office/2006/metadata/properties" xmlns:ns3="f2ea13ae-bb87-41e3-80ee-445ef9952b1b" xmlns:ns4="7e6392ed-20ae-4cf8-a2eb-b9a38b6c7442" targetNamespace="http://schemas.microsoft.com/office/2006/metadata/properties" ma:root="true" ma:fieldsID="39a5156d44086f184d4900c1f32878c2" ns3:_="" ns4:_="">
     <xsd:import namespace="f2ea13ae-bb87-41e3-80ee-445ef9952b1b"/>
@@ -8998,6 +8890,15 @@
 </ct:contentTypeSchema>
 </file>
 
+<file path=customXml/item3.xml><?xml version="1.0" encoding="utf-8"?>
+<?mso-contentType ?>
+<FormTemplates xmlns="http://schemas.microsoft.com/sharepoint/v3/contenttype/forms">
+  <Display>DocumentLibraryForm</Display>
+  <Edit>DocumentLibraryForm</Edit>
+  <New>DocumentLibraryForm</New>
+</FormTemplates>
+</file>
+
 <file path=customXml/itemProps1.xml><?xml version="1.0" encoding="utf-8"?>
 <ds:datastoreItem xmlns:ds="http://schemas.openxmlformats.org/officeDocument/2006/customXml" ds:itemID="{84F78817-FC4B-4DE8-91A2-DA4F6B7B016A}">
   <ds:schemaRefs>
@@ -9016,14 +8917,6 @@
 </file>
 
 <file path=customXml/itemProps2.xml><?xml version="1.0" encoding="utf-8"?>
-<ds:datastoreItem xmlns:ds="http://schemas.openxmlformats.org/officeDocument/2006/customXml" ds:itemID="{BDCF1FC9-F5C2-44A8-9472-8472B5853B3F}">
-  <ds:schemaRefs>
-    <ds:schemaRef ds:uri="http://schemas.microsoft.com/sharepoint/v3/contenttype/forms"/>
-  </ds:schemaRefs>
-</ds:datastoreItem>
-</file>
-
-<file path=customXml/itemProps3.xml><?xml version="1.0" encoding="utf-8"?>
 <ds:datastoreItem xmlns:ds="http://schemas.openxmlformats.org/officeDocument/2006/customXml" ds:itemID="{4616929A-81C1-416A-98D6-A4FC31BDA4E2}">
   <ds:schemaRefs>
     <ds:schemaRef ds:uri="http://schemas.microsoft.com/office/2006/metadata/contentType"/>
@@ -9040,4 +8933,12 @@
     <ds:schemaRef ds:uri="http://schemas.microsoft.com/internal/obd"/>
   </ds:schemaRefs>
 </ds:datastoreItem>
+</file>
+
+<file path=customXml/itemProps3.xml><?xml version="1.0" encoding="utf-8"?>
+<ds:datastoreItem xmlns:ds="http://schemas.openxmlformats.org/officeDocument/2006/customXml" ds:itemID="{BDCF1FC9-F5C2-44A8-9472-8472B5853B3F}">
+  <ds:schemaRefs>
+    <ds:schemaRef ds:uri="http://schemas.microsoft.com/sharepoint/v3/contenttype/forms"/>
+  </ds:schemaRefs>
+</ds:datastoreItem>
 </file>
</xml_diff>

<commit_message>
control de errores y de registro y login mas timeout por erroes al logear, actualizacion bd definitiva
</commit_message>
<xml_diff>
--- a/TableroConecta.pptx
+++ b/TableroConecta.pptx
@@ -7656,10 +7656,10 @@
       </p:sp>
       <p:pic>
         <p:nvPicPr>
-          <p:cNvPr id="3" name="Imagen 2">
-            <a:extLst>
-              <a:ext uri="{FF2B5EF4-FFF2-40B4-BE49-F238E27FC236}">
-                <a16:creationId xmlns:a16="http://schemas.microsoft.com/office/drawing/2014/main" id="{38E9BDB6-15CB-79EC-E2E2-F252EDDE8CAD}"/>
+          <p:cNvPr id="5" name="Imagen 4">
+            <a:extLst>
+              <a:ext uri="{FF2B5EF4-FFF2-40B4-BE49-F238E27FC236}">
+                <a16:creationId xmlns:a16="http://schemas.microsoft.com/office/drawing/2014/main" id="{E47698EA-B819-4F76-A34C-A00C8016E832}"/>
               </a:ext>
             </a:extLst>
           </p:cNvPr>
@@ -7668,16 +7668,15 @@
           </p:cNvPicPr>
           <p:nvPr/>
         </p:nvPicPr>
-        <p:blipFill>
+        <p:blipFill rotWithShape="1">
           <a:blip r:embed="rId3"/>
-          <a:stretch>
-            <a:fillRect/>
-          </a:stretch>
+          <a:srcRect l="10604" t="4119" r="7174" b="7592"/>
+          <a:stretch/>
         </p:blipFill>
         <p:spPr>
           <a:xfrm>
-            <a:off x="3718143" y="190560"/>
-            <a:ext cx="4520982" cy="3800415"/>
+            <a:off x="3753621" y="99304"/>
+            <a:ext cx="4684757" cy="4332271"/>
           </a:xfrm>
           <a:prstGeom prst="rect">
             <a:avLst/>
@@ -8638,6 +8637,15 @@
 </file>
 
 <file path=customXml/item2.xml><?xml version="1.0" encoding="utf-8"?>
+<?mso-contentType ?>
+<FormTemplates xmlns="http://schemas.microsoft.com/sharepoint/v3/contenttype/forms">
+  <Display>DocumentLibraryForm</Display>
+  <Edit>DocumentLibraryForm</Edit>
+  <New>DocumentLibraryForm</New>
+</FormTemplates>
+</file>
+
+<file path=customXml/item3.xml><?xml version="1.0" encoding="utf-8"?>
 <ct:contentTypeSchema xmlns:ct="http://schemas.microsoft.com/office/2006/metadata/contentType" xmlns:ma="http://schemas.microsoft.com/office/2006/metadata/properties/metaAttributes" ct:_="" ma:_="" ma:contentTypeName="Documento" ma:contentTypeID="0x0101001CF815299FD08446828E528E2628D888" ma:contentTypeVersion="18" ma:contentTypeDescription="Crear nuevo documento." ma:contentTypeScope="" ma:versionID="eda16f0b0df14eff352f61fdd29391dd">
   <xsd:schema xmlns:xsd="http://www.w3.org/2001/XMLSchema" xmlns:xs="http://www.w3.org/2001/XMLSchema" xmlns:p="http://schemas.microsoft.com/office/2006/metadata/properties" xmlns:ns3="f2ea13ae-bb87-41e3-80ee-445ef9952b1b" xmlns:ns4="7e6392ed-20ae-4cf8-a2eb-b9a38b6c7442" targetNamespace="http://schemas.microsoft.com/office/2006/metadata/properties" ma:root="true" ma:fieldsID="39a5156d44086f184d4900c1f32878c2" ns3:_="" ns4:_="">
     <xsd:import namespace="f2ea13ae-bb87-41e3-80ee-445ef9952b1b"/>
@@ -8890,15 +8898,6 @@
 </ct:contentTypeSchema>
 </file>
 
-<file path=customXml/item3.xml><?xml version="1.0" encoding="utf-8"?>
-<?mso-contentType ?>
-<FormTemplates xmlns="http://schemas.microsoft.com/sharepoint/v3/contenttype/forms">
-  <Display>DocumentLibraryForm</Display>
-  <Edit>DocumentLibraryForm</Edit>
-  <New>DocumentLibraryForm</New>
-</FormTemplates>
-</file>
-
 <file path=customXml/itemProps1.xml><?xml version="1.0" encoding="utf-8"?>
 <ds:datastoreItem xmlns:ds="http://schemas.openxmlformats.org/officeDocument/2006/customXml" ds:itemID="{84F78817-FC4B-4DE8-91A2-DA4F6B7B016A}">
   <ds:schemaRefs>
@@ -8917,6 +8916,14 @@
 </file>
 
 <file path=customXml/itemProps2.xml><?xml version="1.0" encoding="utf-8"?>
+<ds:datastoreItem xmlns:ds="http://schemas.openxmlformats.org/officeDocument/2006/customXml" ds:itemID="{BDCF1FC9-F5C2-44A8-9472-8472B5853B3F}">
+  <ds:schemaRefs>
+    <ds:schemaRef ds:uri="http://schemas.microsoft.com/sharepoint/v3/contenttype/forms"/>
+  </ds:schemaRefs>
+</ds:datastoreItem>
+</file>
+
+<file path=customXml/itemProps3.xml><?xml version="1.0" encoding="utf-8"?>
 <ds:datastoreItem xmlns:ds="http://schemas.openxmlformats.org/officeDocument/2006/customXml" ds:itemID="{4616929A-81C1-416A-98D6-A4FC31BDA4E2}">
   <ds:schemaRefs>
     <ds:schemaRef ds:uri="http://schemas.microsoft.com/office/2006/metadata/contentType"/>
@@ -8933,12 +8940,4 @@
     <ds:schemaRef ds:uri="http://schemas.microsoft.com/internal/obd"/>
   </ds:schemaRefs>
 </ds:datastoreItem>
-</file>
-
-<file path=customXml/itemProps3.xml><?xml version="1.0" encoding="utf-8"?>
-<ds:datastoreItem xmlns:ds="http://schemas.openxmlformats.org/officeDocument/2006/customXml" ds:itemID="{BDCF1FC9-F5C2-44A8-9472-8472B5853B3F}">
-  <ds:schemaRefs>
-    <ds:schemaRef ds:uri="http://schemas.microsoft.com/sharepoint/v3/contenttype/forms"/>
-  </ds:schemaRefs>
-</ds:datastoreItem>
 </file>
</xml_diff>

<commit_message>
Mas personalizacion para el usuario, optimizacion de las cargas, comprobacion para mal login y cambios en el diseño
</commit_message>
<xml_diff>
--- a/TableroConecta.pptx
+++ b/TableroConecta.pptx
@@ -611,7 +611,7 @@
           <a:p>
             <a:fld id="{72345051-2045-45DA-935E-2E3CA1A69ADC}" type="datetimeFigureOut">
               <a:rPr lang="en-US" smtClean="0"/>
-              <a:t>4/2/2024</a:t>
+              <a:t>4/3/2024</a:t>
             </a:fld>
             <a:endParaRPr lang="en-US" dirty="0"/>
           </a:p>
@@ -809,7 +809,7 @@
           <a:p>
             <a:fld id="{72345051-2045-45DA-935E-2E3CA1A69ADC}" type="datetimeFigureOut">
               <a:rPr lang="en-US" smtClean="0"/>
-              <a:t>4/2/2024</a:t>
+              <a:t>4/3/2024</a:t>
             </a:fld>
             <a:endParaRPr lang="en-US" dirty="0"/>
           </a:p>
@@ -1017,7 +1017,7 @@
           <a:p>
             <a:fld id="{72345051-2045-45DA-935E-2E3CA1A69ADC}" type="datetimeFigureOut">
               <a:rPr lang="en-US" smtClean="0"/>
-              <a:t>4/2/2024</a:t>
+              <a:t>4/3/2024</a:t>
             </a:fld>
             <a:endParaRPr lang="en-US" dirty="0"/>
           </a:p>
@@ -1239,7 +1239,7 @@
           <a:p>
             <a:fld id="{72345051-2045-45DA-935E-2E3CA1A69ADC}" type="datetimeFigureOut">
               <a:rPr lang="en-US" smtClean="0"/>
-              <a:t>4/2/2024</a:t>
+              <a:t>4/3/2024</a:t>
             </a:fld>
             <a:endParaRPr lang="en-US" dirty="0"/>
           </a:p>
@@ -2150,7 +2150,7 @@
           <a:p>
             <a:fld id="{72345051-2045-45DA-935E-2E3CA1A69ADC}" type="datetimeFigureOut">
               <a:rPr lang="en-US" smtClean="0"/>
-              <a:t>4/2/2024</a:t>
+              <a:t>4/3/2024</a:t>
             </a:fld>
             <a:endParaRPr lang="en-US" dirty="0"/>
           </a:p>
@@ -2753,7 +2753,7 @@
           <a:p>
             <a:fld id="{72345051-2045-45DA-935E-2E3CA1A69ADC}" type="datetimeFigureOut">
               <a:rPr lang="en-US" smtClean="0"/>
-              <a:t>4/2/2024</a:t>
+              <a:t>4/3/2024</a:t>
             </a:fld>
             <a:endParaRPr lang="en-US" dirty="0"/>
           </a:p>
@@ -3801,7 +3801,7 @@
           <a:p>
             <a:fld id="{72345051-2045-45DA-935E-2E3CA1A69ADC}" type="datetimeFigureOut">
               <a:rPr lang="en-US" smtClean="0"/>
-              <a:t>4/2/2024</a:t>
+              <a:t>4/3/2024</a:t>
             </a:fld>
             <a:endParaRPr lang="en-US" dirty="0"/>
           </a:p>
@@ -4585,7 +4585,7 @@
           <a:p>
             <a:fld id="{72345051-2045-45DA-935E-2E3CA1A69ADC}" type="datetimeFigureOut">
               <a:rPr lang="en-US" smtClean="0"/>
-              <a:t>4/2/2024</a:t>
+              <a:t>4/3/2024</a:t>
             </a:fld>
             <a:endParaRPr lang="en-US" dirty="0"/>
           </a:p>
@@ -5034,7 +5034,7 @@
           <a:p>
             <a:fld id="{72345051-2045-45DA-935E-2E3CA1A69ADC}" type="datetimeFigureOut">
               <a:rPr lang="en-US" smtClean="0"/>
-              <a:t>4/2/2024</a:t>
+              <a:t>4/3/2024</a:t>
             </a:fld>
             <a:endParaRPr lang="en-US" dirty="0"/>
           </a:p>
@@ -5351,7 +5351,7 @@
           <a:p>
             <a:fld id="{72345051-2045-45DA-935E-2E3CA1A69ADC}" type="datetimeFigureOut">
               <a:rPr lang="en-US" smtClean="0"/>
-              <a:t>4/2/2024</a:t>
+              <a:t>4/3/2024</a:t>
             </a:fld>
             <a:endParaRPr lang="en-US" dirty="0"/>
           </a:p>
@@ -5979,7 +5979,7 @@
           <a:p>
             <a:fld id="{72345051-2045-45DA-935E-2E3CA1A69ADC}" type="datetimeFigureOut">
               <a:rPr lang="en-US" smtClean="0"/>
-              <a:t>4/2/2024</a:t>
+              <a:t>4/3/2024</a:t>
             </a:fld>
             <a:endParaRPr lang="en-US" dirty="0"/>
           </a:p>
@@ -6552,7 +6552,7 @@
           <a:p>
             <a:fld id="{72345051-2045-45DA-935E-2E3CA1A69ADC}" type="datetimeFigureOut">
               <a:rPr lang="en-US" smtClean="0"/>
-              <a:t>4/2/2024</a:t>
+              <a:t>4/3/2024</a:t>
             </a:fld>
             <a:endParaRPr lang="en-US" dirty="0"/>
           </a:p>
@@ -7659,7 +7659,7 @@
           <p:cNvPr id="5" name="Imagen 4">
             <a:extLst>
               <a:ext uri="{FF2B5EF4-FFF2-40B4-BE49-F238E27FC236}">
-                <a16:creationId xmlns:a16="http://schemas.microsoft.com/office/drawing/2014/main" id="{E47698EA-B819-4F76-A34C-A00C8016E832}"/>
+                <a16:creationId xmlns:a16="http://schemas.microsoft.com/office/drawing/2014/main" id="{37F0F2D7-9C44-BA09-70EE-FE3477C2BAB0}"/>
               </a:ext>
             </a:extLst>
           </p:cNvPr>
@@ -7670,13 +7670,13 @@
         </p:nvPicPr>
         <p:blipFill rotWithShape="1">
           <a:blip r:embed="rId3"/>
-          <a:srcRect l="10604" t="4119" r="7174" b="7592"/>
+          <a:srcRect l="7094" t="4059" r="1572" b="2629"/>
           <a:stretch/>
         </p:blipFill>
         <p:spPr>
           <a:xfrm>
-            <a:off x="3753621" y="99304"/>
-            <a:ext cx="4684757" cy="4332271"/>
+            <a:off x="3873158" y="76969"/>
+            <a:ext cx="4445683" cy="4335229"/>
           </a:xfrm>
           <a:prstGeom prst="rect">
             <a:avLst/>

</xml_diff>

<commit_message>
moificacion pestaña admin y nuevo juego si coger base de datps
</commit_message>
<xml_diff>
--- a/TableroConecta.pptx
+++ b/TableroConecta.pptx
@@ -7,8 +7,13 @@
   <p:sldIdLst>
     <p:sldId id="256" r:id="rId5"/>
     <p:sldId id="265" r:id="rId6"/>
-    <p:sldId id="267" r:id="rId7"/>
-    <p:sldId id="266" r:id="rId8"/>
+    <p:sldId id="268" r:id="rId7"/>
+    <p:sldId id="269" r:id="rId8"/>
+    <p:sldId id="267" r:id="rId9"/>
+    <p:sldId id="270" r:id="rId10"/>
+    <p:sldId id="274" r:id="rId11"/>
+    <p:sldId id="275" r:id="rId12"/>
+    <p:sldId id="276" r:id="rId13"/>
   </p:sldIdLst>
   <p:sldSz cx="12192000" cy="6858000"/>
   <p:notesSz cx="6858000" cy="9144000"/>
@@ -611,7 +616,7 @@
           <a:p>
             <a:fld id="{72345051-2045-45DA-935E-2E3CA1A69ADC}" type="datetimeFigureOut">
               <a:rPr lang="en-US" smtClean="0"/>
-              <a:t>4/3/2024</a:t>
+              <a:t>5/14/2024</a:t>
             </a:fld>
             <a:endParaRPr lang="en-US" dirty="0"/>
           </a:p>
@@ -809,7 +814,7 @@
           <a:p>
             <a:fld id="{72345051-2045-45DA-935E-2E3CA1A69ADC}" type="datetimeFigureOut">
               <a:rPr lang="en-US" smtClean="0"/>
-              <a:t>4/3/2024</a:t>
+              <a:t>5/14/2024</a:t>
             </a:fld>
             <a:endParaRPr lang="en-US" dirty="0"/>
           </a:p>
@@ -1017,7 +1022,7 @@
           <a:p>
             <a:fld id="{72345051-2045-45DA-935E-2E3CA1A69ADC}" type="datetimeFigureOut">
               <a:rPr lang="en-US" smtClean="0"/>
-              <a:t>4/3/2024</a:t>
+              <a:t>5/14/2024</a:t>
             </a:fld>
             <a:endParaRPr lang="en-US" dirty="0"/>
           </a:p>
@@ -1239,7 +1244,7 @@
           <a:p>
             <a:fld id="{72345051-2045-45DA-935E-2E3CA1A69ADC}" type="datetimeFigureOut">
               <a:rPr lang="en-US" smtClean="0"/>
-              <a:t>4/3/2024</a:t>
+              <a:t>5/14/2024</a:t>
             </a:fld>
             <a:endParaRPr lang="en-US" dirty="0"/>
           </a:p>
@@ -2150,7 +2155,7 @@
           <a:p>
             <a:fld id="{72345051-2045-45DA-935E-2E3CA1A69ADC}" type="datetimeFigureOut">
               <a:rPr lang="en-US" smtClean="0"/>
-              <a:t>4/3/2024</a:t>
+              <a:t>5/14/2024</a:t>
             </a:fld>
             <a:endParaRPr lang="en-US" dirty="0"/>
           </a:p>
@@ -2753,7 +2758,7 @@
           <a:p>
             <a:fld id="{72345051-2045-45DA-935E-2E3CA1A69ADC}" type="datetimeFigureOut">
               <a:rPr lang="en-US" smtClean="0"/>
-              <a:t>4/3/2024</a:t>
+              <a:t>5/14/2024</a:t>
             </a:fld>
             <a:endParaRPr lang="en-US" dirty="0"/>
           </a:p>
@@ -3801,7 +3806,7 @@
           <a:p>
             <a:fld id="{72345051-2045-45DA-935E-2E3CA1A69ADC}" type="datetimeFigureOut">
               <a:rPr lang="en-US" smtClean="0"/>
-              <a:t>4/3/2024</a:t>
+              <a:t>5/14/2024</a:t>
             </a:fld>
             <a:endParaRPr lang="en-US" dirty="0"/>
           </a:p>
@@ -4585,7 +4590,7 @@
           <a:p>
             <a:fld id="{72345051-2045-45DA-935E-2E3CA1A69ADC}" type="datetimeFigureOut">
               <a:rPr lang="en-US" smtClean="0"/>
-              <a:t>4/3/2024</a:t>
+              <a:t>5/14/2024</a:t>
             </a:fld>
             <a:endParaRPr lang="en-US" dirty="0"/>
           </a:p>
@@ -5034,7 +5039,7 @@
           <a:p>
             <a:fld id="{72345051-2045-45DA-935E-2E3CA1A69ADC}" type="datetimeFigureOut">
               <a:rPr lang="en-US" smtClean="0"/>
-              <a:t>4/3/2024</a:t>
+              <a:t>5/14/2024</a:t>
             </a:fld>
             <a:endParaRPr lang="en-US" dirty="0"/>
           </a:p>
@@ -5351,7 +5356,7 @@
           <a:p>
             <a:fld id="{72345051-2045-45DA-935E-2E3CA1A69ADC}" type="datetimeFigureOut">
               <a:rPr lang="en-US" smtClean="0"/>
-              <a:t>4/3/2024</a:t>
+              <a:t>5/14/2024</a:t>
             </a:fld>
             <a:endParaRPr lang="en-US" dirty="0"/>
           </a:p>
@@ -5979,7 +5984,7 @@
           <a:p>
             <a:fld id="{72345051-2045-45DA-935E-2E3CA1A69ADC}" type="datetimeFigureOut">
               <a:rPr lang="en-US" smtClean="0"/>
-              <a:t>4/3/2024</a:t>
+              <a:t>5/14/2024</a:t>
             </a:fld>
             <a:endParaRPr lang="en-US" dirty="0"/>
           </a:p>
@@ -6552,7 +6557,7 @@
           <a:p>
             <a:fld id="{72345051-2045-45DA-935E-2E3CA1A69ADC}" type="datetimeFigureOut">
               <a:rPr lang="en-US" smtClean="0"/>
-              <a:t>4/3/2024</a:t>
+              <a:t>5/14/2024</a:t>
             </a:fld>
             <a:endParaRPr lang="en-US" dirty="0"/>
           </a:p>
@@ -7165,7 +7170,7 @@
         </p:spPr>
         <p:txBody>
           <a:bodyPr>
-            <a:normAutofit/>
+            <a:normAutofit fontScale="92500" lnSpcReduction="20000"/>
           </a:bodyPr>
           <a:lstStyle/>
           <a:p>
@@ -7179,7 +7184,7 @@
           <a:p>
             <a:pPr algn="ctr"/>
             <a:r>
-              <a:rPr lang="es-ES" sz="1800" b="1" dirty="0">
+              <a:rPr lang="es-ES" sz="3900" b="1" dirty="0">
                 <a:solidFill>
                   <a:schemeClr val="bg1"/>
                 </a:solidFill>
@@ -7248,6 +7253,81 @@
           </a:fontRef>
         </p:style>
       </p:cxnSp>
+      <p:sp>
+        <p:nvSpPr>
+          <p:cNvPr id="4" name="CuadroTexto 3">
+            <a:extLst>
+              <a:ext uri="{FF2B5EF4-FFF2-40B4-BE49-F238E27FC236}">
+                <a16:creationId xmlns:a16="http://schemas.microsoft.com/office/drawing/2014/main" id="{E799CEF2-F5EF-6C59-A3DC-3E6022039EA6}"/>
+              </a:ext>
+            </a:extLst>
+          </p:cNvPr>
+          <p:cNvSpPr txBox="1"/>
+          <p:nvPr/>
+        </p:nvSpPr>
+        <p:spPr>
+          <a:xfrm>
+            <a:off x="5346503" y="5369748"/>
+            <a:ext cx="1492898" cy="646331"/>
+          </a:xfrm>
+          <a:prstGeom prst="rect">
+            <a:avLst/>
+          </a:prstGeom>
+          <a:noFill/>
+        </p:spPr>
+        <p:txBody>
+          <a:bodyPr wrap="square" rtlCol="0">
+            <a:spAutoFit/>
+          </a:bodyPr>
+          <a:lstStyle/>
+          <a:p>
+            <a:r>
+              <a:rPr lang="es-ES" sz="3600" dirty="0">
+                <a:solidFill>
+                  <a:schemeClr val="bg1"/>
+                </a:solidFill>
+              </a:rPr>
+              <a:t>2023/2024</a:t>
+            </a:r>
+          </a:p>
+        </p:txBody>
+      </p:sp>
+      <p:pic>
+        <p:nvPicPr>
+          <p:cNvPr id="5" name="Imagen 4" descr="Dibujo en blanco y negro&#10;&#10;Descripción generada automáticamente con confianza media">
+            <a:extLst>
+              <a:ext uri="{FF2B5EF4-FFF2-40B4-BE49-F238E27FC236}">
+                <a16:creationId xmlns:a16="http://schemas.microsoft.com/office/drawing/2014/main" id="{7978B169-B1F6-82D1-9ADA-11A38B852D0C}"/>
+              </a:ext>
+            </a:extLst>
+          </p:cNvPr>
+          <p:cNvPicPr>
+            <a:picLocks noChangeAspect="1"/>
+          </p:cNvPicPr>
+          <p:nvPr/>
+        </p:nvPicPr>
+        <p:blipFill>
+          <a:blip r:embed="rId3" cstate="print">
+            <a:extLst>
+              <a:ext uri="{28A0092B-C50C-407E-A947-70E740481C1C}">
+                <a14:useLocalDpi xmlns:a14="http://schemas.microsoft.com/office/drawing/2010/main" val="0"/>
+              </a:ext>
+            </a:extLst>
+          </a:blip>
+          <a:stretch>
+            <a:fillRect/>
+          </a:stretch>
+        </p:blipFill>
+        <p:spPr>
+          <a:xfrm>
+            <a:off x="2556275" y="2868191"/>
+            <a:ext cx="1028700" cy="1233170"/>
+          </a:xfrm>
+          <a:prstGeom prst="rect">
+            <a:avLst/>
+          </a:prstGeom>
+        </p:spPr>
+      </p:pic>
     </p:spTree>
     <p:extLst>
       <p:ext uri="{BB962C8B-B14F-4D97-AF65-F5344CB8AC3E}">
@@ -7654,35 +7734,6 @@
           </a:p>
         </p:txBody>
       </p:sp>
-      <p:pic>
-        <p:nvPicPr>
-          <p:cNvPr id="5" name="Imagen 4">
-            <a:extLst>
-              <a:ext uri="{FF2B5EF4-FFF2-40B4-BE49-F238E27FC236}">
-                <a16:creationId xmlns:a16="http://schemas.microsoft.com/office/drawing/2014/main" id="{37F0F2D7-9C44-BA09-70EE-FE3477C2BAB0}"/>
-              </a:ext>
-            </a:extLst>
-          </p:cNvPr>
-          <p:cNvPicPr>
-            <a:picLocks noChangeAspect="1"/>
-          </p:cNvPicPr>
-          <p:nvPr/>
-        </p:nvPicPr>
-        <p:blipFill rotWithShape="1">
-          <a:blip r:embed="rId3"/>
-          <a:srcRect l="7094" t="4059" r="1572" b="2629"/>
-          <a:stretch/>
-        </p:blipFill>
-        <p:spPr>
-          <a:xfrm>
-            <a:off x="3873158" y="76969"/>
-            <a:ext cx="4445683" cy="4335229"/>
-          </a:xfrm>
-          <a:prstGeom prst="rect">
-            <a:avLst/>
-          </a:prstGeom>
-        </p:spPr>
-      </p:pic>
     </p:spTree>
     <p:extLst>
       <p:ext uri="{BB962C8B-B14F-4D97-AF65-F5344CB8AC3E}">
@@ -7697,6 +7748,877 @@
 </file>
 
 <file path=ppt/slides/slide3.xml><?xml version="1.0" encoding="utf-8"?>
+<p:sld xmlns:a="http://schemas.openxmlformats.org/drawingml/2006/main" xmlns:r="http://schemas.openxmlformats.org/officeDocument/2006/relationships" xmlns:p="http://schemas.openxmlformats.org/presentationml/2006/main">
+  <p:cSld>
+    <p:bg>
+      <p:bgPr>
+        <a:solidFill>
+          <a:schemeClr val="bg1"/>
+        </a:solidFill>
+        <a:effectLst/>
+      </p:bgPr>
+    </p:bg>
+    <p:spTree>
+      <p:nvGrpSpPr>
+        <p:cNvPr id="1" name=""/>
+        <p:cNvGrpSpPr/>
+        <p:nvPr/>
+      </p:nvGrpSpPr>
+      <p:grpSpPr>
+        <a:xfrm>
+          <a:off x="0" y="0"/>
+          <a:ext cx="0" cy="0"/>
+          <a:chOff x="0" y="0"/>
+          <a:chExt cx="0" cy="0"/>
+        </a:xfrm>
+      </p:grpSpPr>
+      <p:pic>
+        <p:nvPicPr>
+          <p:cNvPr id="33" name="Picture 32" descr="Movimiento de jaque mate en un tablero de ajedrez">
+            <a:extLst>
+              <a:ext uri="{FF2B5EF4-FFF2-40B4-BE49-F238E27FC236}">
+                <a16:creationId xmlns:a16="http://schemas.microsoft.com/office/drawing/2014/main" id="{7C19B8B7-51A6-4095-DDE1-232B5CF6115B}"/>
+              </a:ext>
+            </a:extLst>
+          </p:cNvPr>
+          <p:cNvPicPr>
+            <a:picLocks noChangeAspect="1"/>
+          </p:cNvPicPr>
+          <p:nvPr/>
+        </p:nvPicPr>
+        <p:blipFill rotWithShape="1">
+          <a:blip r:embed="rId2"/>
+          <a:srcRect t="15414"/>
+          <a:stretch/>
+        </p:blipFill>
+        <p:spPr>
+          <a:xfrm>
+            <a:off x="-3047" y="10"/>
+            <a:ext cx="12191999" cy="6857990"/>
+          </a:xfrm>
+          <a:prstGeom prst="rect">
+            <a:avLst/>
+          </a:prstGeom>
+        </p:spPr>
+      </p:pic>
+      <p:sp>
+        <p:nvSpPr>
+          <p:cNvPr id="37" name="Rectangle 36">
+            <a:extLst>
+              <a:ext uri="{FF2B5EF4-FFF2-40B4-BE49-F238E27FC236}">
+                <a16:creationId xmlns:a16="http://schemas.microsoft.com/office/drawing/2014/main" id="{007891EC-4501-44ED-A8C8-B11B6DB767AB}"/>
+              </a:ext>
+              <a:ext uri="{C183D7F6-B498-43B3-948B-1728B52AA6E4}">
+                <adec:decorative xmlns:adec="http://schemas.microsoft.com/office/drawing/2017/decorative" val="1"/>
+              </a:ext>
+            </a:extLst>
+          </p:cNvPr>
+          <p:cNvSpPr>
+            <a:spLocks noGrp="1" noRot="1" noChangeAspect="1" noMove="1" noResize="1" noEditPoints="1" noAdjustHandles="1" noChangeArrowheads="1" noChangeShapeType="1" noTextEdit="1"/>
+          </p:cNvSpPr>
+          <p:nvPr>
+            <p:extLst>
+              <p:ext uri="{386F3935-93C4-4BCD-93E2-E3B085C9AB24}">
+                <p16:designElem xmlns:p16="http://schemas.microsoft.com/office/powerpoint/2015/main" val="1"/>
+              </p:ext>
+            </p:extLst>
+          </p:nvPr>
+        </p:nvSpPr>
+        <p:spPr>
+          <a:xfrm>
+            <a:off x="0" y="2207602"/>
+            <a:ext cx="12191999" cy="3162146"/>
+          </a:xfrm>
+          <a:prstGeom prst="rect">
+            <a:avLst/>
+          </a:prstGeom>
+          <a:gradFill flip="none" rotWithShape="1">
+            <a:gsLst>
+              <a:gs pos="0">
+                <a:schemeClr val="tx1">
+                  <a:alpha val="0"/>
+                </a:schemeClr>
+              </a:gs>
+              <a:gs pos="50000">
+                <a:schemeClr val="tx1">
+                  <a:alpha val="35000"/>
+                </a:schemeClr>
+              </a:gs>
+              <a:gs pos="100000">
+                <a:schemeClr val="tx1">
+                  <a:alpha val="0"/>
+                </a:schemeClr>
+              </a:gs>
+            </a:gsLst>
+            <a:lin ang="16200000" scaled="1"/>
+            <a:tileRect/>
+          </a:gradFill>
+          <a:ln>
+            <a:noFill/>
+          </a:ln>
+        </p:spPr>
+        <p:style>
+          <a:lnRef idx="2">
+            <a:schemeClr val="accent1">
+              <a:shade val="50000"/>
+            </a:schemeClr>
+          </a:lnRef>
+          <a:fillRef idx="1">
+            <a:schemeClr val="accent1"/>
+          </a:fillRef>
+          <a:effectRef idx="0">
+            <a:schemeClr val="accent1"/>
+          </a:effectRef>
+          <a:fontRef idx="minor">
+            <a:schemeClr val="lt1"/>
+          </a:fontRef>
+        </p:style>
+        <p:txBody>
+          <a:bodyPr rtlCol="0" anchor="ctr"/>
+          <a:lstStyle/>
+          <a:p>
+            <a:pPr algn="ctr"/>
+            <a:endParaRPr lang="en-US" dirty="0"/>
+          </a:p>
+        </p:txBody>
+      </p:sp>
+      <p:cxnSp>
+        <p:nvCxnSpPr>
+          <p:cNvPr id="39" name="Straight Connector 38">
+            <a:extLst>
+              <a:ext uri="{FF2B5EF4-FFF2-40B4-BE49-F238E27FC236}">
+                <a16:creationId xmlns:a16="http://schemas.microsoft.com/office/drawing/2014/main" id="{34E5597F-CE67-4085-9548-E6A8036DA3BB}"/>
+              </a:ext>
+              <a:ext uri="{C183D7F6-B498-43B3-948B-1728B52AA6E4}">
+                <adec:decorative xmlns:adec="http://schemas.microsoft.com/office/drawing/2017/decorative" val="1"/>
+              </a:ext>
+            </a:extLst>
+          </p:cNvPr>
+          <p:cNvCxnSpPr>
+            <a:cxnSpLocks noGrp="1" noRot="1" noChangeAspect="1" noMove="1" noResize="1" noEditPoints="1" noAdjustHandles="1" noChangeArrowheads="1" noChangeShapeType="1"/>
+          </p:cNvCxnSpPr>
+          <p:nvPr>
+            <p:extLst>
+              <p:ext uri="{386F3935-93C4-4BCD-93E2-E3B085C9AB24}">
+                <p16:designElem xmlns:p16="http://schemas.microsoft.com/office/powerpoint/2015/main" val="1"/>
+              </p:ext>
+            </p:extLst>
+          </p:nvPr>
+        </p:nvCxnSpPr>
+        <p:spPr>
+          <a:xfrm>
+            <a:off x="3393881" y="4035362"/>
+            <a:ext cx="5404237" cy="0"/>
+          </a:xfrm>
+          <a:prstGeom prst="line">
+            <a:avLst/>
+          </a:prstGeom>
+          <a:ln>
+            <a:solidFill>
+              <a:schemeClr val="bg1"/>
+            </a:solidFill>
+          </a:ln>
+          <a:effectLst>
+            <a:outerShdw blurRad="50800" dist="38100" dir="2700000" algn="tl" rotWithShape="0">
+              <a:prstClr val="black">
+                <a:alpha val="40000"/>
+              </a:prstClr>
+            </a:outerShdw>
+          </a:effectLst>
+        </p:spPr>
+        <p:style>
+          <a:lnRef idx="1">
+            <a:schemeClr val="accent1"/>
+          </a:lnRef>
+          <a:fillRef idx="0">
+            <a:schemeClr val="accent1"/>
+          </a:fillRef>
+          <a:effectRef idx="0">
+            <a:schemeClr val="accent1"/>
+          </a:effectRef>
+          <a:fontRef idx="minor">
+            <a:schemeClr val="tx1"/>
+          </a:fontRef>
+        </p:style>
+      </p:cxnSp>
+      <p:sp>
+        <p:nvSpPr>
+          <p:cNvPr id="4" name="Título 1">
+            <a:extLst>
+              <a:ext uri="{FF2B5EF4-FFF2-40B4-BE49-F238E27FC236}">
+                <a16:creationId xmlns:a16="http://schemas.microsoft.com/office/drawing/2014/main" id="{96C72C34-9C2E-9EC8-A064-F624AA0C9A60}"/>
+              </a:ext>
+            </a:extLst>
+          </p:cNvPr>
+          <p:cNvSpPr txBox="1">
+            <a:spLocks/>
+          </p:cNvSpPr>
+          <p:nvPr/>
+        </p:nvSpPr>
+        <p:spPr>
+          <a:xfrm>
+            <a:off x="1522465" y="4516482"/>
+            <a:ext cx="9650360" cy="1323601"/>
+          </a:xfrm>
+          <a:prstGeom prst="rect">
+            <a:avLst/>
+          </a:prstGeom>
+        </p:spPr>
+        <p:txBody>
+          <a:bodyPr vert="horz" lIns="91440" tIns="45720" rIns="91440" bIns="45720" rtlCol="0" anchor="b">
+            <a:noAutofit/>
+          </a:bodyPr>
+          <a:lstStyle>
+            <a:lvl1pPr algn="l" defTabSz="914400" rtl="0" eaLnBrk="1" latinLnBrk="0" hangingPunct="1">
+              <a:lnSpc>
+                <a:spcPct val="100000"/>
+              </a:lnSpc>
+              <a:spcBef>
+                <a:spcPct val="0"/>
+              </a:spcBef>
+              <a:buNone/>
+              <a:defRPr sz="9600" kern="1200">
+                <a:solidFill>
+                  <a:schemeClr val="tx1"/>
+                </a:solidFill>
+                <a:latin typeface="+mj-lt"/>
+                <a:ea typeface="+mj-ea"/>
+                <a:cs typeface="+mj-cs"/>
+              </a:defRPr>
+            </a:lvl1pPr>
+          </a:lstStyle>
+          <a:p>
+            <a:pPr algn="ctr"/>
+            <a:r>
+              <a:rPr lang="es-ES" sz="7200" dirty="0">
+                <a:solidFill>
+                  <a:schemeClr val="bg1"/>
+                </a:solidFill>
+              </a:rPr>
+              <a:t>SOFTWARE</a:t>
+            </a:r>
+            <a:endParaRPr lang="es-ES" sz="7200" dirty="0"/>
+          </a:p>
+        </p:txBody>
+      </p:sp>
+      <p:pic>
+        <p:nvPicPr>
+          <p:cNvPr id="3" name="Imagen 2">
+            <a:extLst>
+              <a:ext uri="{FF2B5EF4-FFF2-40B4-BE49-F238E27FC236}">
+                <a16:creationId xmlns:a16="http://schemas.microsoft.com/office/drawing/2014/main" id="{5191EE69-0EEF-0DAE-DD75-3CB498DE4456}"/>
+              </a:ext>
+            </a:extLst>
+          </p:cNvPr>
+          <p:cNvPicPr>
+            <a:picLocks noChangeAspect="1"/>
+          </p:cNvPicPr>
+          <p:nvPr/>
+        </p:nvPicPr>
+        <p:blipFill>
+          <a:blip r:embed="rId3"/>
+          <a:stretch>
+            <a:fillRect/>
+          </a:stretch>
+        </p:blipFill>
+        <p:spPr>
+          <a:xfrm>
+            <a:off x="2872930" y="459724"/>
+            <a:ext cx="1482255" cy="1649412"/>
+          </a:xfrm>
+          <a:prstGeom prst="rect">
+            <a:avLst/>
+          </a:prstGeom>
+        </p:spPr>
+      </p:pic>
+      <p:pic>
+        <p:nvPicPr>
+          <p:cNvPr id="9" name="Imagen 8">
+            <a:extLst>
+              <a:ext uri="{FF2B5EF4-FFF2-40B4-BE49-F238E27FC236}">
+                <a16:creationId xmlns:a16="http://schemas.microsoft.com/office/drawing/2014/main" id="{AA45B247-0149-EF79-798D-D0E195714042}"/>
+              </a:ext>
+            </a:extLst>
+          </p:cNvPr>
+          <p:cNvPicPr>
+            <a:picLocks noChangeAspect="1"/>
+          </p:cNvPicPr>
+          <p:nvPr/>
+        </p:nvPicPr>
+        <p:blipFill>
+          <a:blip r:embed="rId4"/>
+          <a:stretch>
+            <a:fillRect/>
+          </a:stretch>
+        </p:blipFill>
+        <p:spPr>
+          <a:xfrm>
+            <a:off x="4526104" y="2340351"/>
+            <a:ext cx="1482256" cy="1448326"/>
+          </a:xfrm>
+          <a:prstGeom prst="rect">
+            <a:avLst/>
+          </a:prstGeom>
+        </p:spPr>
+      </p:pic>
+      <p:pic>
+        <p:nvPicPr>
+          <p:cNvPr id="13" name="Imagen 12">
+            <a:extLst>
+              <a:ext uri="{FF2B5EF4-FFF2-40B4-BE49-F238E27FC236}">
+                <a16:creationId xmlns:a16="http://schemas.microsoft.com/office/drawing/2014/main" id="{D8B44784-ACF9-4733-889C-80EB7BFE8116}"/>
+              </a:ext>
+            </a:extLst>
+          </p:cNvPr>
+          <p:cNvPicPr>
+            <a:picLocks noChangeAspect="1"/>
+          </p:cNvPicPr>
+          <p:nvPr/>
+        </p:nvPicPr>
+        <p:blipFill>
+          <a:blip r:embed="rId5"/>
+          <a:stretch>
+            <a:fillRect/>
+          </a:stretch>
+        </p:blipFill>
+        <p:spPr>
+          <a:xfrm>
+            <a:off x="6092952" y="459723"/>
+            <a:ext cx="1345460" cy="1649412"/>
+          </a:xfrm>
+          <a:prstGeom prst="rect">
+            <a:avLst/>
+          </a:prstGeom>
+        </p:spPr>
+      </p:pic>
+      <p:pic>
+        <p:nvPicPr>
+          <p:cNvPr id="15" name="Imagen 14">
+            <a:extLst>
+              <a:ext uri="{FF2B5EF4-FFF2-40B4-BE49-F238E27FC236}">
+                <a16:creationId xmlns:a16="http://schemas.microsoft.com/office/drawing/2014/main" id="{DA0419D5-4AED-2274-7780-F446636952FF}"/>
+              </a:ext>
+            </a:extLst>
+          </p:cNvPr>
+          <p:cNvPicPr>
+            <a:picLocks noChangeAspect="1"/>
+          </p:cNvPicPr>
+          <p:nvPr/>
+        </p:nvPicPr>
+        <p:blipFill>
+          <a:blip r:embed="rId6"/>
+          <a:stretch>
+            <a:fillRect/>
+          </a:stretch>
+        </p:blipFill>
+        <p:spPr>
+          <a:xfrm>
+            <a:off x="4526104" y="459722"/>
+            <a:ext cx="1384818" cy="1649413"/>
+          </a:xfrm>
+          <a:prstGeom prst="rect">
+            <a:avLst/>
+          </a:prstGeom>
+        </p:spPr>
+      </p:pic>
+      <p:pic>
+        <p:nvPicPr>
+          <p:cNvPr id="17" name="Imagen 16">
+            <a:extLst>
+              <a:ext uri="{FF2B5EF4-FFF2-40B4-BE49-F238E27FC236}">
+                <a16:creationId xmlns:a16="http://schemas.microsoft.com/office/drawing/2014/main" id="{5C6DD9FA-72EE-F40C-4601-76A5F689143B}"/>
+              </a:ext>
+            </a:extLst>
+          </p:cNvPr>
+          <p:cNvPicPr>
+            <a:picLocks noChangeAspect="1"/>
+          </p:cNvPicPr>
+          <p:nvPr/>
+        </p:nvPicPr>
+        <p:blipFill>
+          <a:blip r:embed="rId7"/>
+          <a:stretch>
+            <a:fillRect/>
+          </a:stretch>
+        </p:blipFill>
+        <p:spPr>
+          <a:xfrm>
+            <a:off x="6103569" y="2340350"/>
+            <a:ext cx="1342413" cy="1448321"/>
+          </a:xfrm>
+          <a:prstGeom prst="rect">
+            <a:avLst/>
+          </a:prstGeom>
+        </p:spPr>
+      </p:pic>
+      <p:pic>
+        <p:nvPicPr>
+          <p:cNvPr id="19" name="Imagen 18">
+            <a:extLst>
+              <a:ext uri="{FF2B5EF4-FFF2-40B4-BE49-F238E27FC236}">
+                <a16:creationId xmlns:a16="http://schemas.microsoft.com/office/drawing/2014/main" id="{1FA65D47-DC10-CD62-FF66-43AF7C6A9AC5}"/>
+              </a:ext>
+            </a:extLst>
+          </p:cNvPr>
+          <p:cNvPicPr>
+            <a:picLocks noChangeAspect="1"/>
+          </p:cNvPicPr>
+          <p:nvPr/>
+        </p:nvPicPr>
+        <p:blipFill>
+          <a:blip r:embed="rId8"/>
+          <a:stretch>
+            <a:fillRect/>
+          </a:stretch>
+        </p:blipFill>
+        <p:spPr>
+          <a:xfrm>
+            <a:off x="2872930" y="2340351"/>
+            <a:ext cx="1482256" cy="1448320"/>
+          </a:xfrm>
+          <a:prstGeom prst="rect">
+            <a:avLst/>
+          </a:prstGeom>
+        </p:spPr>
+      </p:pic>
+      <p:pic>
+        <p:nvPicPr>
+          <p:cNvPr id="21" name="Imagen 20">
+            <a:extLst>
+              <a:ext uri="{FF2B5EF4-FFF2-40B4-BE49-F238E27FC236}">
+                <a16:creationId xmlns:a16="http://schemas.microsoft.com/office/drawing/2014/main" id="{332285D4-031D-C4E8-5818-306401E8FBD1}"/>
+              </a:ext>
+            </a:extLst>
+          </p:cNvPr>
+          <p:cNvPicPr>
+            <a:picLocks noChangeAspect="1"/>
+          </p:cNvPicPr>
+          <p:nvPr/>
+        </p:nvPicPr>
+        <p:blipFill rotWithShape="1">
+          <a:blip r:embed="rId9"/>
+          <a:srcRect t="6591"/>
+          <a:stretch/>
+        </p:blipFill>
+        <p:spPr>
+          <a:xfrm>
+            <a:off x="7610212" y="2340351"/>
+            <a:ext cx="1503245" cy="1448324"/>
+          </a:xfrm>
+          <a:prstGeom prst="rect">
+            <a:avLst/>
+          </a:prstGeom>
+        </p:spPr>
+      </p:pic>
+      <p:pic>
+        <p:nvPicPr>
+          <p:cNvPr id="23" name="Imagen 22">
+            <a:extLst>
+              <a:ext uri="{FF2B5EF4-FFF2-40B4-BE49-F238E27FC236}">
+                <a16:creationId xmlns:a16="http://schemas.microsoft.com/office/drawing/2014/main" id="{A6C089CB-CE63-0E5C-EADC-9E05199D00F5}"/>
+              </a:ext>
+            </a:extLst>
+          </p:cNvPr>
+          <p:cNvPicPr>
+            <a:picLocks noChangeAspect="1"/>
+          </p:cNvPicPr>
+          <p:nvPr/>
+        </p:nvPicPr>
+        <p:blipFill>
+          <a:blip r:embed="rId10"/>
+          <a:stretch>
+            <a:fillRect/>
+          </a:stretch>
+        </p:blipFill>
+        <p:spPr>
+          <a:xfrm>
+            <a:off x="7632283" y="459723"/>
+            <a:ext cx="1481174" cy="1649412"/>
+          </a:xfrm>
+          <a:prstGeom prst="rect">
+            <a:avLst/>
+          </a:prstGeom>
+        </p:spPr>
+      </p:pic>
+    </p:spTree>
+    <p:extLst>
+      <p:ext uri="{BB962C8B-B14F-4D97-AF65-F5344CB8AC3E}">
+        <p14:creationId xmlns:p14="http://schemas.microsoft.com/office/powerpoint/2010/main" val="933163089"/>
+      </p:ext>
+    </p:extLst>
+  </p:cSld>
+  <p:clrMapOvr>
+    <a:masterClrMapping/>
+  </p:clrMapOvr>
+</p:sld>
+</file>
+
+<file path=ppt/slides/slide4.xml><?xml version="1.0" encoding="utf-8"?>
+<p:sld xmlns:a="http://schemas.openxmlformats.org/drawingml/2006/main" xmlns:r="http://schemas.openxmlformats.org/officeDocument/2006/relationships" xmlns:p="http://schemas.openxmlformats.org/presentationml/2006/main">
+  <p:cSld>
+    <p:spTree>
+      <p:nvGrpSpPr>
+        <p:cNvPr id="1" name=""/>
+        <p:cNvGrpSpPr/>
+        <p:nvPr/>
+      </p:nvGrpSpPr>
+      <p:grpSpPr>
+        <a:xfrm>
+          <a:off x="0" y="0"/>
+          <a:ext cx="0" cy="0"/>
+          <a:chOff x="0" y="0"/>
+          <a:chExt cx="0" cy="0"/>
+        </a:xfrm>
+      </p:grpSpPr>
+      <p:pic>
+        <p:nvPicPr>
+          <p:cNvPr id="33" name="Picture 32" descr="Movimiento de jaque mate en un tablero de ajedrez">
+            <a:extLst>
+              <a:ext uri="{FF2B5EF4-FFF2-40B4-BE49-F238E27FC236}">
+                <a16:creationId xmlns:a16="http://schemas.microsoft.com/office/drawing/2014/main" id="{7C19B8B7-51A6-4095-DDE1-232B5CF6115B}"/>
+              </a:ext>
+            </a:extLst>
+          </p:cNvPr>
+          <p:cNvPicPr>
+            <a:picLocks noChangeAspect="1"/>
+          </p:cNvPicPr>
+          <p:nvPr/>
+        </p:nvPicPr>
+        <p:blipFill rotWithShape="1">
+          <a:blip r:embed="rId2"/>
+          <a:srcRect t="15414"/>
+          <a:stretch/>
+        </p:blipFill>
+        <p:spPr>
+          <a:xfrm>
+            <a:off x="-3047" y="10"/>
+            <a:ext cx="12191999" cy="6857990"/>
+          </a:xfrm>
+          <a:prstGeom prst="rect">
+            <a:avLst/>
+          </a:prstGeom>
+        </p:spPr>
+      </p:pic>
+      <p:sp>
+        <p:nvSpPr>
+          <p:cNvPr id="4" name="Título 1">
+            <a:extLst>
+              <a:ext uri="{FF2B5EF4-FFF2-40B4-BE49-F238E27FC236}">
+                <a16:creationId xmlns:a16="http://schemas.microsoft.com/office/drawing/2014/main" id="{96C72C34-9C2E-9EC8-A064-F624AA0C9A60}"/>
+              </a:ext>
+            </a:extLst>
+          </p:cNvPr>
+          <p:cNvSpPr txBox="1">
+            <a:spLocks/>
+          </p:cNvSpPr>
+          <p:nvPr/>
+        </p:nvSpPr>
+        <p:spPr>
+          <a:xfrm>
+            <a:off x="1163216" y="4868463"/>
+            <a:ext cx="9650360" cy="1323601"/>
+          </a:xfrm>
+          <a:prstGeom prst="rect">
+            <a:avLst/>
+          </a:prstGeom>
+        </p:spPr>
+        <p:txBody>
+          <a:bodyPr vert="horz" lIns="91440" tIns="45720" rIns="91440" bIns="45720" rtlCol="0" anchor="b">
+            <a:noAutofit/>
+          </a:bodyPr>
+          <a:lstStyle>
+            <a:lvl1pPr algn="l" defTabSz="914400" rtl="0" eaLnBrk="1" latinLnBrk="0" hangingPunct="1">
+              <a:lnSpc>
+                <a:spcPct val="100000"/>
+              </a:lnSpc>
+              <a:spcBef>
+                <a:spcPct val="0"/>
+              </a:spcBef>
+              <a:buNone/>
+              <a:defRPr sz="9600" kern="1200">
+                <a:solidFill>
+                  <a:schemeClr val="tx1"/>
+                </a:solidFill>
+                <a:latin typeface="+mj-lt"/>
+                <a:ea typeface="+mj-ea"/>
+                <a:cs typeface="+mj-cs"/>
+              </a:defRPr>
+            </a:lvl1pPr>
+          </a:lstStyle>
+          <a:p>
+            <a:pPr algn="ctr"/>
+            <a:r>
+              <a:rPr lang="es-ES" sz="7200" dirty="0">
+                <a:solidFill>
+                  <a:schemeClr val="bg1"/>
+                </a:solidFill>
+              </a:rPr>
+              <a:t>HARDWARE</a:t>
+            </a:r>
+          </a:p>
+        </p:txBody>
+      </p:sp>
+      <p:sp>
+        <p:nvSpPr>
+          <p:cNvPr id="2" name="CuadroTexto 1">
+            <a:extLst>
+              <a:ext uri="{FF2B5EF4-FFF2-40B4-BE49-F238E27FC236}">
+                <a16:creationId xmlns:a16="http://schemas.microsoft.com/office/drawing/2014/main" id="{3B18E70D-B8D1-F7ED-F20C-B1E39A1AD8B3}"/>
+              </a:ext>
+            </a:extLst>
+          </p:cNvPr>
+          <p:cNvSpPr txBox="1"/>
+          <p:nvPr/>
+        </p:nvSpPr>
+        <p:spPr>
+          <a:xfrm>
+            <a:off x="1522465" y="665936"/>
+            <a:ext cx="9506319" cy="4570867"/>
+          </a:xfrm>
+          <a:prstGeom prst="rect">
+            <a:avLst/>
+          </a:prstGeom>
+          <a:noFill/>
+        </p:spPr>
+        <p:txBody>
+          <a:bodyPr wrap="square" rtlCol="0">
+            <a:spAutoFit/>
+          </a:bodyPr>
+          <a:lstStyle/>
+          <a:p>
+            <a:pPr>
+              <a:lnSpc>
+                <a:spcPct val="107000"/>
+              </a:lnSpc>
+              <a:spcAft>
+                <a:spcPts val="800"/>
+              </a:spcAft>
+            </a:pPr>
+            <a:r>
+              <a:rPr lang="es-ES" sz="3200" b="1" kern="100" dirty="0">
+                <a:solidFill>
+                  <a:schemeClr val="bg2"/>
+                </a:solidFill>
+                <a:effectLst>
+                  <a:outerShdw blurRad="38100" dist="38100" dir="2700000" algn="tl">
+                    <a:srgbClr val="000000">
+                      <a:alpha val="43137"/>
+                    </a:srgbClr>
+                  </a:outerShdw>
+                </a:effectLst>
+                <a:latin typeface="Arial" panose="020B0604020202020204" pitchFamily="34" charset="0"/>
+                <a:ea typeface="Calibri" panose="020F0502020204030204" pitchFamily="34" charset="0"/>
+                <a:cs typeface="Times New Roman" panose="02020603050405020304" pitchFamily="18" charset="0"/>
+              </a:rPr>
+              <a:t>La aplicación ha sido desarrollada en un ordenador portátil con 16 GB de RAM con un I5 11º.</a:t>
+            </a:r>
+            <a:endParaRPr lang="es-ES" sz="3200" b="1" kern="100" dirty="0">
+              <a:solidFill>
+                <a:schemeClr val="bg2"/>
+              </a:solidFill>
+              <a:effectLst>
+                <a:outerShdw blurRad="38100" dist="38100" dir="2700000" algn="tl">
+                  <a:srgbClr val="000000">
+                    <a:alpha val="43137"/>
+                  </a:srgbClr>
+                </a:outerShdw>
+              </a:effectLst>
+              <a:latin typeface="Calibri" panose="020F0502020204030204" pitchFamily="34" charset="0"/>
+              <a:ea typeface="Calibri" panose="020F0502020204030204" pitchFamily="34" charset="0"/>
+              <a:cs typeface="Times New Roman" panose="02020603050405020304" pitchFamily="18" charset="0"/>
+            </a:endParaRPr>
+          </a:p>
+          <a:p>
+            <a:pPr>
+              <a:lnSpc>
+                <a:spcPct val="107000"/>
+              </a:lnSpc>
+              <a:spcAft>
+                <a:spcPts val="800"/>
+              </a:spcAft>
+            </a:pPr>
+            <a:r>
+              <a:rPr lang="es-ES" sz="3200" b="1" kern="100" dirty="0">
+                <a:solidFill>
+                  <a:schemeClr val="bg2"/>
+                </a:solidFill>
+                <a:effectLst>
+                  <a:outerShdw blurRad="38100" dist="38100" dir="2700000" algn="tl">
+                    <a:srgbClr val="000000">
+                      <a:alpha val="43137"/>
+                    </a:srgbClr>
+                  </a:outerShdw>
+                </a:effectLst>
+                <a:latin typeface="Arial" panose="020B0604020202020204" pitchFamily="34" charset="0"/>
+                <a:ea typeface="Calibri" panose="020F0502020204030204" pitchFamily="34" charset="0"/>
+                <a:cs typeface="Times New Roman" panose="02020603050405020304" pitchFamily="18" charset="0"/>
+              </a:rPr>
+              <a:t>No se han utilizado servidores externos.</a:t>
+            </a:r>
+            <a:endParaRPr lang="es-ES" sz="3200" b="1" kern="100" dirty="0">
+              <a:solidFill>
+                <a:schemeClr val="bg2"/>
+              </a:solidFill>
+              <a:effectLst>
+                <a:outerShdw blurRad="38100" dist="38100" dir="2700000" algn="tl">
+                  <a:srgbClr val="000000">
+                    <a:alpha val="43137"/>
+                  </a:srgbClr>
+                </a:outerShdw>
+              </a:effectLst>
+              <a:latin typeface="Calibri" panose="020F0502020204030204" pitchFamily="34" charset="0"/>
+              <a:ea typeface="Calibri" panose="020F0502020204030204" pitchFamily="34" charset="0"/>
+              <a:cs typeface="Times New Roman" panose="02020603050405020304" pitchFamily="18" charset="0"/>
+            </a:endParaRPr>
+          </a:p>
+          <a:p>
+            <a:pPr>
+              <a:lnSpc>
+                <a:spcPct val="107000"/>
+              </a:lnSpc>
+              <a:spcAft>
+                <a:spcPts val="800"/>
+              </a:spcAft>
+            </a:pPr>
+            <a:r>
+              <a:rPr lang="es-ES" sz="3200" b="1" kern="100" dirty="0">
+                <a:solidFill>
+                  <a:schemeClr val="bg2"/>
+                </a:solidFill>
+                <a:effectLst>
+                  <a:outerShdw blurRad="38100" dist="38100" dir="2700000" algn="tl">
+                    <a:srgbClr val="000000">
+                      <a:alpha val="43137"/>
+                    </a:srgbClr>
+                  </a:outerShdw>
+                </a:effectLst>
+                <a:latin typeface="Arial" panose="020B0604020202020204" pitchFamily="34" charset="0"/>
+                <a:ea typeface="Calibri" panose="020F0502020204030204" pitchFamily="34" charset="0"/>
+                <a:cs typeface="Times New Roman" panose="02020603050405020304" pitchFamily="18" charset="0"/>
+              </a:rPr>
+              <a:t>El WIFI empleado es de 175 Mbps.</a:t>
+            </a:r>
+            <a:endParaRPr lang="es-ES" sz="3200" b="1" kern="100" dirty="0">
+              <a:solidFill>
+                <a:schemeClr val="bg2"/>
+              </a:solidFill>
+              <a:effectLst>
+                <a:outerShdw blurRad="38100" dist="38100" dir="2700000" algn="tl">
+                  <a:srgbClr val="000000">
+                    <a:alpha val="43137"/>
+                  </a:srgbClr>
+                </a:outerShdw>
+              </a:effectLst>
+              <a:latin typeface="Calibri" panose="020F0502020204030204" pitchFamily="34" charset="0"/>
+              <a:ea typeface="Calibri" panose="020F0502020204030204" pitchFamily="34" charset="0"/>
+              <a:cs typeface="Times New Roman" panose="02020603050405020304" pitchFamily="18" charset="0"/>
+            </a:endParaRPr>
+          </a:p>
+          <a:p>
+            <a:pPr>
+              <a:lnSpc>
+                <a:spcPct val="107000"/>
+              </a:lnSpc>
+              <a:spcAft>
+                <a:spcPts val="800"/>
+              </a:spcAft>
+            </a:pPr>
+            <a:r>
+              <a:rPr lang="es-ES" sz="3200" b="1" kern="100" dirty="0">
+                <a:solidFill>
+                  <a:schemeClr val="bg2"/>
+                </a:solidFill>
+                <a:effectLst>
+                  <a:outerShdw blurRad="38100" dist="38100" dir="2700000" algn="tl">
+                    <a:srgbClr val="000000">
+                      <a:alpha val="43137"/>
+                    </a:srgbClr>
+                  </a:outerShdw>
+                </a:effectLst>
+                <a:latin typeface="Arial" panose="020B0604020202020204" pitchFamily="34" charset="0"/>
+                <a:ea typeface="Calibri" panose="020F0502020204030204" pitchFamily="34" charset="0"/>
+                <a:cs typeface="Times New Roman" panose="02020603050405020304" pitchFamily="18" charset="0"/>
+              </a:rPr>
+              <a:t>Se ha usado Windows 10 pro.</a:t>
+            </a:r>
+            <a:endParaRPr lang="es-ES" sz="3200" b="1" kern="100" dirty="0">
+              <a:solidFill>
+                <a:schemeClr val="bg2"/>
+              </a:solidFill>
+              <a:effectLst>
+                <a:outerShdw blurRad="38100" dist="38100" dir="2700000" algn="tl">
+                  <a:srgbClr val="000000">
+                    <a:alpha val="43137"/>
+                  </a:srgbClr>
+                </a:outerShdw>
+              </a:effectLst>
+              <a:latin typeface="Calibri" panose="020F0502020204030204" pitchFamily="34" charset="0"/>
+              <a:ea typeface="Calibri" panose="020F0502020204030204" pitchFamily="34" charset="0"/>
+              <a:cs typeface="Times New Roman" panose="02020603050405020304" pitchFamily="18" charset="0"/>
+            </a:endParaRPr>
+          </a:p>
+          <a:p>
+            <a:pPr>
+              <a:lnSpc>
+                <a:spcPct val="107000"/>
+              </a:lnSpc>
+              <a:spcAft>
+                <a:spcPts val="800"/>
+              </a:spcAft>
+            </a:pPr>
+            <a:r>
+              <a:rPr lang="es-ES" sz="3200" b="1" kern="100" dirty="0">
+                <a:solidFill>
+                  <a:schemeClr val="bg2"/>
+                </a:solidFill>
+                <a:effectLst>
+                  <a:outerShdw blurRad="38100" dist="38100" dir="2700000" algn="tl">
+                    <a:srgbClr val="000000">
+                      <a:alpha val="43137"/>
+                    </a:srgbClr>
+                  </a:outerShdw>
+                </a:effectLst>
+                <a:latin typeface="Arial" panose="020B0604020202020204" pitchFamily="34" charset="0"/>
+                <a:ea typeface="Calibri" panose="020F0502020204030204" pitchFamily="34" charset="0"/>
+                <a:cs typeface="Times New Roman" panose="02020603050405020304" pitchFamily="18" charset="0"/>
+              </a:rPr>
+              <a:t>Pantalla de 14 pulgadas.</a:t>
+            </a:r>
+            <a:endParaRPr lang="es-ES" sz="3200" b="1" kern="100" dirty="0">
+              <a:solidFill>
+                <a:schemeClr val="bg2"/>
+              </a:solidFill>
+              <a:effectLst>
+                <a:outerShdw blurRad="38100" dist="38100" dir="2700000" algn="tl">
+                  <a:srgbClr val="000000">
+                    <a:alpha val="43137"/>
+                  </a:srgbClr>
+                </a:outerShdw>
+              </a:effectLst>
+              <a:latin typeface="Calibri" panose="020F0502020204030204" pitchFamily="34" charset="0"/>
+              <a:ea typeface="Calibri" panose="020F0502020204030204" pitchFamily="34" charset="0"/>
+              <a:cs typeface="Times New Roman" panose="02020603050405020304" pitchFamily="18" charset="0"/>
+            </a:endParaRPr>
+          </a:p>
+          <a:p>
+            <a:endParaRPr lang="es-ES" dirty="0"/>
+          </a:p>
+        </p:txBody>
+      </p:sp>
+    </p:spTree>
+    <p:extLst>
+      <p:ext uri="{BB962C8B-B14F-4D97-AF65-F5344CB8AC3E}">
+        <p14:creationId xmlns:p14="http://schemas.microsoft.com/office/powerpoint/2010/main" val="2395809568"/>
+      </p:ext>
+    </p:extLst>
+  </p:cSld>
+  <p:clrMapOvr>
+    <a:masterClrMapping/>
+  </p:clrMapOvr>
+</p:sld>
+</file>
+
+<file path=ppt/slides/slide5.xml><?xml version="1.0" encoding="utf-8"?>
 <p:sld xmlns:a="http://schemas.openxmlformats.org/drawingml/2006/main" xmlns:r="http://schemas.openxmlformats.org/officeDocument/2006/relationships" xmlns:p="http://schemas.openxmlformats.org/presentationml/2006/main">
   <p:cSld>
     <p:bg>
@@ -8063,17 +8985,9 @@
 </p:sld>
 </file>
 
-<file path=ppt/slides/slide4.xml><?xml version="1.0" encoding="utf-8"?>
+<file path=ppt/slides/slide6.xml><?xml version="1.0" encoding="utf-8"?>
 <p:sld xmlns:a="http://schemas.openxmlformats.org/drawingml/2006/main" xmlns:r="http://schemas.openxmlformats.org/officeDocument/2006/relationships" xmlns:p="http://schemas.openxmlformats.org/presentationml/2006/main">
   <p:cSld>
-    <p:bg>
-      <p:bgPr>
-        <a:solidFill>
-          <a:schemeClr val="bg1"/>
-        </a:solidFill>
-        <a:effectLst/>
-      </p:bgPr>
-    </p:bg>
     <p:spTree>
       <p:nvGrpSpPr>
         <p:cNvPr id="1" name=""/>
@@ -8119,150 +9033,322 @@
       </p:pic>
       <p:sp>
         <p:nvSpPr>
-          <p:cNvPr id="37" name="Rectangle 36">
-            <a:extLst>
-              <a:ext uri="{FF2B5EF4-FFF2-40B4-BE49-F238E27FC236}">
-                <a16:creationId xmlns:a16="http://schemas.microsoft.com/office/drawing/2014/main" id="{007891EC-4501-44ED-A8C8-B11B6DB767AB}"/>
-              </a:ext>
-              <a:ext uri="{C183D7F6-B498-43B3-948B-1728B52AA6E4}">
-                <adec:decorative xmlns:adec="http://schemas.microsoft.com/office/drawing/2017/decorative" val="1"/>
+          <p:cNvPr id="4" name="Título 1">
+            <a:extLst>
+              <a:ext uri="{FF2B5EF4-FFF2-40B4-BE49-F238E27FC236}">
+                <a16:creationId xmlns:a16="http://schemas.microsoft.com/office/drawing/2014/main" id="{96C72C34-9C2E-9EC8-A064-F624AA0C9A60}"/>
+              </a:ext>
+            </a:extLst>
+          </p:cNvPr>
+          <p:cNvSpPr txBox="1">
+            <a:spLocks/>
+          </p:cNvSpPr>
+          <p:nvPr/>
+        </p:nvSpPr>
+        <p:spPr>
+          <a:xfrm>
+            <a:off x="1522465" y="4516482"/>
+            <a:ext cx="9650360" cy="1323601"/>
+          </a:xfrm>
+          <a:prstGeom prst="rect">
+            <a:avLst/>
+          </a:prstGeom>
+        </p:spPr>
+        <p:txBody>
+          <a:bodyPr vert="horz" lIns="91440" tIns="45720" rIns="91440" bIns="45720" rtlCol="0" anchor="b">
+            <a:noAutofit/>
+          </a:bodyPr>
+          <a:lstStyle>
+            <a:lvl1pPr algn="l" defTabSz="914400" rtl="0" eaLnBrk="1" latinLnBrk="0" hangingPunct="1">
+              <a:lnSpc>
+                <a:spcPct val="100000"/>
+              </a:lnSpc>
+              <a:spcBef>
+                <a:spcPct val="0"/>
+              </a:spcBef>
+              <a:buNone/>
+              <a:defRPr sz="9600" kern="1200">
+                <a:solidFill>
+                  <a:schemeClr val="tx1"/>
+                </a:solidFill>
+                <a:latin typeface="+mj-lt"/>
+                <a:ea typeface="+mj-ea"/>
+                <a:cs typeface="+mj-cs"/>
+              </a:defRPr>
+            </a:lvl1pPr>
+          </a:lstStyle>
+          <a:p>
+            <a:pPr algn="ctr"/>
+            <a:r>
+              <a:rPr lang="es-ES" sz="7200" dirty="0">
+                <a:solidFill>
+                  <a:schemeClr val="bg1"/>
+                </a:solidFill>
+              </a:rPr>
+              <a:t>ENTIDAD-RELACION</a:t>
+            </a:r>
+            <a:endParaRPr lang="es-ES" sz="7200" dirty="0"/>
+          </a:p>
+        </p:txBody>
+      </p:sp>
+      <p:pic>
+        <p:nvPicPr>
+          <p:cNvPr id="5" name="Imagen 4">
+            <a:extLst>
+              <a:ext uri="{FF2B5EF4-FFF2-40B4-BE49-F238E27FC236}">
+                <a16:creationId xmlns:a16="http://schemas.microsoft.com/office/drawing/2014/main" id="{37F0F2D7-9C44-BA09-70EE-FE3477C2BAB0}"/>
+              </a:ext>
+            </a:extLst>
+          </p:cNvPr>
+          <p:cNvPicPr>
+            <a:picLocks noChangeAspect="1"/>
+          </p:cNvPicPr>
+          <p:nvPr/>
+        </p:nvPicPr>
+        <p:blipFill rotWithShape="1">
+          <a:blip r:embed="rId3"/>
+          <a:srcRect l="7094" t="4059" r="1572" b="2629"/>
+          <a:stretch/>
+        </p:blipFill>
+        <p:spPr>
+          <a:xfrm>
+            <a:off x="3873158" y="76969"/>
+            <a:ext cx="4445683" cy="4335229"/>
+          </a:xfrm>
+          <a:prstGeom prst="rect">
+            <a:avLst/>
+          </a:prstGeom>
+        </p:spPr>
+      </p:pic>
+    </p:spTree>
+    <p:extLst>
+      <p:ext uri="{BB962C8B-B14F-4D97-AF65-F5344CB8AC3E}">
+        <p14:creationId xmlns:p14="http://schemas.microsoft.com/office/powerpoint/2010/main" val="3804007349"/>
+      </p:ext>
+    </p:extLst>
+  </p:cSld>
+  <p:clrMapOvr>
+    <a:masterClrMapping/>
+  </p:clrMapOvr>
+</p:sld>
+</file>
+
+<file path=ppt/slides/slide7.xml><?xml version="1.0" encoding="utf-8"?>
+<p:sld xmlns:a="http://schemas.openxmlformats.org/drawingml/2006/main" xmlns:r="http://schemas.openxmlformats.org/officeDocument/2006/relationships" xmlns:p="http://schemas.openxmlformats.org/presentationml/2006/main">
+  <p:cSld>
+    <p:spTree>
+      <p:nvGrpSpPr>
+        <p:cNvPr id="1" name=""/>
+        <p:cNvGrpSpPr/>
+        <p:nvPr/>
+      </p:nvGrpSpPr>
+      <p:grpSpPr>
+        <a:xfrm>
+          <a:off x="0" y="0"/>
+          <a:ext cx="0" cy="0"/>
+          <a:chOff x="0" y="0"/>
+          <a:chExt cx="0" cy="0"/>
+        </a:xfrm>
+      </p:grpSpPr>
+      <p:pic>
+        <p:nvPicPr>
+          <p:cNvPr id="33" name="Picture 32" descr="Movimiento de jaque mate en un tablero de ajedrez">
+            <a:extLst>
+              <a:ext uri="{FF2B5EF4-FFF2-40B4-BE49-F238E27FC236}">
+                <a16:creationId xmlns:a16="http://schemas.microsoft.com/office/drawing/2014/main" id="{7C19B8B7-51A6-4095-DDE1-232B5CF6115B}"/>
+              </a:ext>
+            </a:extLst>
+          </p:cNvPr>
+          <p:cNvPicPr>
+            <a:picLocks noChangeAspect="1"/>
+          </p:cNvPicPr>
+          <p:nvPr/>
+        </p:nvPicPr>
+        <p:blipFill rotWithShape="1">
+          <a:blip r:embed="rId2"/>
+          <a:srcRect t="15414"/>
+          <a:stretch/>
+        </p:blipFill>
+        <p:spPr>
+          <a:xfrm>
+            <a:off x="-3047" y="10"/>
+            <a:ext cx="12191999" cy="6857990"/>
+          </a:xfrm>
+          <a:prstGeom prst="rect">
+            <a:avLst/>
+          </a:prstGeom>
+        </p:spPr>
+      </p:pic>
+      <p:sp>
+        <p:nvSpPr>
+          <p:cNvPr id="3" name="Subtítulo 2">
+            <a:extLst>
+              <a:ext uri="{FF2B5EF4-FFF2-40B4-BE49-F238E27FC236}">
+                <a16:creationId xmlns:a16="http://schemas.microsoft.com/office/drawing/2014/main" id="{4E73F7DF-9A12-3BF5-A8E0-2CBBDCFC051A}"/>
               </a:ext>
             </a:extLst>
           </p:cNvPr>
           <p:cNvSpPr>
-            <a:spLocks noGrp="1" noRot="1" noChangeAspect="1" noMove="1" noResize="1" noEditPoints="1" noAdjustHandles="1" noChangeArrowheads="1" noChangeShapeType="1" noTextEdit="1"/>
+            <a:spLocks noGrp="1"/>
           </p:cNvSpPr>
           <p:nvPr>
-            <p:extLst>
-              <p:ext uri="{386F3935-93C4-4BCD-93E2-E3B085C9AB24}">
-                <p16:designElem xmlns:p16="http://schemas.microsoft.com/office/powerpoint/2015/main" val="1"/>
-              </p:ext>
-            </p:extLst>
+            <p:ph type="subTitle" idx="1"/>
           </p:nvPr>
         </p:nvSpPr>
         <p:spPr>
           <a:xfrm>
-            <a:off x="0" y="2207602"/>
-            <a:ext cx="12191999" cy="3162146"/>
+            <a:off x="196969" y="621924"/>
+            <a:ext cx="11638262" cy="3551068"/>
           </a:xfrm>
-          <a:prstGeom prst="rect">
-            <a:avLst/>
-          </a:prstGeom>
-          <a:gradFill flip="none" rotWithShape="1">
-            <a:gsLst>
-              <a:gs pos="0">
-                <a:schemeClr val="tx1">
-                  <a:alpha val="0"/>
-                </a:schemeClr>
-              </a:gs>
-              <a:gs pos="50000">
-                <a:schemeClr val="tx1">
-                  <a:alpha val="35000"/>
-                </a:schemeClr>
-              </a:gs>
-              <a:gs pos="100000">
-                <a:schemeClr val="tx1">
-                  <a:alpha val="0"/>
-                </a:schemeClr>
-              </a:gs>
-            </a:gsLst>
-            <a:lin ang="16200000" scaled="1"/>
-            <a:tileRect/>
-          </a:gradFill>
-          <a:ln>
-            <a:noFill/>
-          </a:ln>
         </p:spPr>
-        <p:style>
-          <a:lnRef idx="2">
-            <a:schemeClr val="accent1">
-              <a:shade val="50000"/>
-            </a:schemeClr>
-          </a:lnRef>
-          <a:fillRef idx="1">
-            <a:schemeClr val="accent1"/>
-          </a:fillRef>
-          <a:effectRef idx="0">
-            <a:schemeClr val="accent1"/>
-          </a:effectRef>
-          <a:fontRef idx="minor">
-            <a:schemeClr val="lt1"/>
-          </a:fontRef>
-        </p:style>
         <p:txBody>
-          <a:bodyPr rtlCol="0" anchor="ctr"/>
+          <a:bodyPr anchor="ctr">
+            <a:normAutofit lnSpcReduction="10000"/>
+          </a:bodyPr>
           <a:lstStyle/>
           <a:p>
-            <a:pPr algn="ctr"/>
-            <a:endParaRPr lang="en-US" dirty="0"/>
+            <a:pPr algn="ctr">
+              <a:lnSpc>
+                <a:spcPct val="100000"/>
+              </a:lnSpc>
+            </a:pPr>
+            <a:r>
+              <a:rPr lang="es-ES" sz="3200" b="1" dirty="0">
+                <a:solidFill>
+                  <a:schemeClr val="bg1"/>
+                </a:solidFill>
+                <a:effectLst>
+                  <a:outerShdw blurRad="38100" dist="38100" dir="2700000" algn="tl">
+                    <a:srgbClr val="000000">
+                      <a:alpha val="43137"/>
+                    </a:srgbClr>
+                  </a:outerShdw>
+                </a:effectLst>
+                <a:latin typeface="Arial" panose="020B0604020202020204" pitchFamily="34" charset="0"/>
+                <a:cs typeface="Arial" panose="020B0604020202020204" pitchFamily="34" charset="0"/>
+              </a:rPr>
+              <a:t>Permite</a:t>
+            </a:r>
+            <a:r>
+              <a:rPr lang="es-ES" sz="3600" b="1" dirty="0">
+                <a:solidFill>
+                  <a:schemeClr val="bg1"/>
+                </a:solidFill>
+                <a:effectLst>
+                  <a:outerShdw blurRad="38100" dist="38100" dir="2700000" algn="tl">
+                    <a:srgbClr val="000000">
+                      <a:alpha val="43137"/>
+                    </a:srgbClr>
+                  </a:outerShdw>
+                </a:effectLst>
+                <a:latin typeface="Arial" panose="020B0604020202020204" pitchFamily="34" charset="0"/>
+                <a:cs typeface="Arial" panose="020B0604020202020204" pitchFamily="34" charset="0"/>
+              </a:rPr>
+              <a:t> la interacción entre usuarios mediante las partidas.</a:t>
+            </a:r>
+          </a:p>
+          <a:p>
+            <a:pPr algn="ctr">
+              <a:lnSpc>
+                <a:spcPct val="100000"/>
+              </a:lnSpc>
+            </a:pPr>
+            <a:r>
+              <a:rPr lang="es-ES" sz="3600" b="1" dirty="0">
+                <a:solidFill>
+                  <a:schemeClr val="bg1"/>
+                </a:solidFill>
+                <a:effectLst>
+                  <a:outerShdw blurRad="38100" dist="38100" dir="2700000" algn="tl">
+                    <a:srgbClr val="000000">
+                      <a:alpha val="43137"/>
+                    </a:srgbClr>
+                  </a:outerShdw>
+                </a:effectLst>
+                <a:latin typeface="Arial" panose="020B0604020202020204" pitchFamily="34" charset="0"/>
+                <a:cs typeface="Arial" panose="020B0604020202020204" pitchFamily="34" charset="0"/>
+              </a:rPr>
+              <a:t>Sistema de ranking y </a:t>
+            </a:r>
+            <a:r>
+              <a:rPr lang="es-ES" sz="3600" b="1" dirty="0" err="1">
+                <a:solidFill>
+                  <a:schemeClr val="bg1"/>
+                </a:solidFill>
+                <a:effectLst>
+                  <a:outerShdw blurRad="38100" dist="38100" dir="2700000" algn="tl">
+                    <a:srgbClr val="000000">
+                      <a:alpha val="43137"/>
+                    </a:srgbClr>
+                  </a:outerShdw>
+                </a:effectLst>
+                <a:latin typeface="Arial" panose="020B0604020202020204" pitchFamily="34" charset="0"/>
+                <a:cs typeface="Arial" panose="020B0604020202020204" pitchFamily="34" charset="0"/>
+              </a:rPr>
+              <a:t>baneos</a:t>
+            </a:r>
+            <a:r>
+              <a:rPr lang="es-ES" sz="3600" b="1" dirty="0">
+                <a:solidFill>
+                  <a:schemeClr val="bg1"/>
+                </a:solidFill>
+                <a:effectLst>
+                  <a:outerShdw blurRad="38100" dist="38100" dir="2700000" algn="tl">
+                    <a:srgbClr val="000000">
+                      <a:alpha val="43137"/>
+                    </a:srgbClr>
+                  </a:outerShdw>
+                </a:effectLst>
+                <a:latin typeface="Arial" panose="020B0604020202020204" pitchFamily="34" charset="0"/>
+                <a:cs typeface="Arial" panose="020B0604020202020204" pitchFamily="34" charset="0"/>
+              </a:rPr>
+              <a:t> para premiar la deportividad.</a:t>
+            </a:r>
+          </a:p>
+          <a:p>
+            <a:pPr algn="ctr">
+              <a:lnSpc>
+                <a:spcPct val="100000"/>
+              </a:lnSpc>
+            </a:pPr>
+            <a:r>
+              <a:rPr lang="es-ES" sz="3600" b="1" dirty="0">
+                <a:solidFill>
+                  <a:schemeClr val="bg1"/>
+                </a:solidFill>
+                <a:effectLst>
+                  <a:outerShdw blurRad="38100" dist="38100" dir="2700000" algn="tl">
+                    <a:srgbClr val="000000">
+                      <a:alpha val="43137"/>
+                    </a:srgbClr>
+                  </a:outerShdw>
+                </a:effectLst>
+                <a:latin typeface="Arial" panose="020B0604020202020204" pitchFamily="34" charset="0"/>
+                <a:cs typeface="Arial" panose="020B0604020202020204" pitchFamily="34" charset="0"/>
+              </a:rPr>
+              <a:t>Permite modificar el perfil del usuario para darle un toque más personal.</a:t>
+            </a:r>
+            <a:endParaRPr lang="es-ES" sz="3600" b="1" dirty="0">
+              <a:solidFill>
+                <a:schemeClr val="bg1"/>
+              </a:solidFill>
+              <a:effectLst>
+                <a:outerShdw blurRad="38100" dist="38100" dir="2700000" algn="tl">
+                  <a:srgbClr val="000000">
+                    <a:alpha val="43137"/>
+                  </a:srgbClr>
+                </a:outerShdw>
+              </a:effectLst>
+            </a:endParaRPr>
           </a:p>
         </p:txBody>
       </p:sp>
-      <p:cxnSp>
-        <p:nvCxnSpPr>
-          <p:cNvPr id="39" name="Straight Connector 38">
-            <a:extLst>
-              <a:ext uri="{FF2B5EF4-FFF2-40B4-BE49-F238E27FC236}">
-                <a16:creationId xmlns:a16="http://schemas.microsoft.com/office/drawing/2014/main" id="{34E5597F-CE67-4085-9548-E6A8036DA3BB}"/>
-              </a:ext>
-              <a:ext uri="{C183D7F6-B498-43B3-948B-1728B52AA6E4}">
-                <adec:decorative xmlns:adec="http://schemas.microsoft.com/office/drawing/2017/decorative" val="1"/>
-              </a:ext>
-            </a:extLst>
-          </p:cNvPr>
-          <p:cNvCxnSpPr>
-            <a:cxnSpLocks noGrp="1" noRot="1" noChangeAspect="1" noMove="1" noResize="1" noEditPoints="1" noAdjustHandles="1" noChangeArrowheads="1" noChangeShapeType="1"/>
-          </p:cNvCxnSpPr>
-          <p:nvPr>
-            <p:extLst>
-              <p:ext uri="{386F3935-93C4-4BCD-93E2-E3B085C9AB24}">
-                <p16:designElem xmlns:p16="http://schemas.microsoft.com/office/powerpoint/2015/main" val="1"/>
-              </p:ext>
-            </p:extLst>
-          </p:nvPr>
-        </p:nvCxnSpPr>
-        <p:spPr>
-          <a:xfrm>
-            <a:off x="3393881" y="4035362"/>
-            <a:ext cx="5404237" cy="0"/>
-          </a:xfrm>
-          <a:prstGeom prst="line">
-            <a:avLst/>
-          </a:prstGeom>
-          <a:ln>
-            <a:solidFill>
-              <a:schemeClr val="bg1"/>
-            </a:solidFill>
-          </a:ln>
-          <a:effectLst>
-            <a:outerShdw blurRad="50800" dist="38100" dir="2700000" algn="tl" rotWithShape="0">
-              <a:prstClr val="black">
-                <a:alpha val="40000"/>
-              </a:prstClr>
-            </a:outerShdw>
-          </a:effectLst>
-        </p:spPr>
-        <p:style>
-          <a:lnRef idx="1">
-            <a:schemeClr val="accent1"/>
-          </a:lnRef>
-          <a:fillRef idx="0">
-            <a:schemeClr val="accent1"/>
-          </a:fillRef>
-          <a:effectRef idx="0">
-            <a:schemeClr val="accent1"/>
-          </a:effectRef>
-          <a:fontRef idx="minor">
-            <a:schemeClr val="tx1"/>
-          </a:fontRef>
-        </p:style>
-      </p:cxnSp>
       <p:sp>
         <p:nvSpPr>
-          <p:cNvPr id="2" name="Título 1">
-            <a:extLst>
-              <a:ext uri="{FF2B5EF4-FFF2-40B4-BE49-F238E27FC236}">
-                <a16:creationId xmlns:a16="http://schemas.microsoft.com/office/drawing/2014/main" id="{DA022CE2-0F34-2D5B-34B5-E10BE893E5A4}"/>
+          <p:cNvPr id="6" name="Título 1">
+            <a:extLst>
+              <a:ext uri="{FF2B5EF4-FFF2-40B4-BE49-F238E27FC236}">
+                <a16:creationId xmlns:a16="http://schemas.microsoft.com/office/drawing/2014/main" id="{468B48F9-3033-3828-C126-2F0FBA8CE81E}"/>
               </a:ext>
             </a:extLst>
           </p:cNvPr>
@@ -8275,34 +9361,93 @@
         </p:nvSpPr>
         <p:spPr>
           <a:xfrm>
-            <a:off x="1522465" y="4516482"/>
-            <a:ext cx="9144000" cy="1719594"/>
+            <a:off x="1216287" y="4940540"/>
+            <a:ext cx="9599625" cy="866328"/>
           </a:xfrm>
         </p:spPr>
         <p:txBody>
           <a:bodyPr>
-            <a:normAutofit/>
+            <a:noAutofit/>
           </a:bodyPr>
           <a:lstStyle/>
           <a:p>
             <a:pPr algn="ctr"/>
             <a:r>
-              <a:rPr lang="es-ES" dirty="0">
+              <a:rPr lang="es-ES" sz="5400" dirty="0">
                 <a:solidFill>
                   <a:schemeClr val="bg1"/>
                 </a:solidFill>
               </a:rPr>
-              <a:t>GUÍA ESTILO</a:t>
+              <a:t>Funcionalidades destacadas</a:t>
             </a:r>
           </a:p>
         </p:txBody>
       </p:sp>
+    </p:spTree>
+    <p:extLst>
+      <p:ext uri="{BB962C8B-B14F-4D97-AF65-F5344CB8AC3E}">
+        <p14:creationId xmlns:p14="http://schemas.microsoft.com/office/powerpoint/2010/main" val="4197215657"/>
+      </p:ext>
+    </p:extLst>
+  </p:cSld>
+  <p:clrMapOvr>
+    <a:masterClrMapping/>
+  </p:clrMapOvr>
+</p:sld>
+</file>
+
+<file path=ppt/slides/slide8.xml><?xml version="1.0" encoding="utf-8"?>
+<p:sld xmlns:a="http://schemas.openxmlformats.org/drawingml/2006/main" xmlns:r="http://schemas.openxmlformats.org/officeDocument/2006/relationships" xmlns:p="http://schemas.openxmlformats.org/presentationml/2006/main">
+  <p:cSld>
+    <p:spTree>
+      <p:nvGrpSpPr>
+        <p:cNvPr id="1" name=""/>
+        <p:cNvGrpSpPr/>
+        <p:nvPr/>
+      </p:nvGrpSpPr>
+      <p:grpSpPr>
+        <a:xfrm>
+          <a:off x="0" y="0"/>
+          <a:ext cx="0" cy="0"/>
+          <a:chOff x="0" y="0"/>
+          <a:chExt cx="0" cy="0"/>
+        </a:xfrm>
+      </p:grpSpPr>
+      <p:pic>
+        <p:nvPicPr>
+          <p:cNvPr id="33" name="Picture 32" descr="Movimiento de jaque mate en un tablero de ajedrez">
+            <a:extLst>
+              <a:ext uri="{FF2B5EF4-FFF2-40B4-BE49-F238E27FC236}">
+                <a16:creationId xmlns:a16="http://schemas.microsoft.com/office/drawing/2014/main" id="{7C19B8B7-51A6-4095-DDE1-232B5CF6115B}"/>
+              </a:ext>
+            </a:extLst>
+          </p:cNvPr>
+          <p:cNvPicPr>
+            <a:picLocks noChangeAspect="1"/>
+          </p:cNvPicPr>
+          <p:nvPr/>
+        </p:nvPicPr>
+        <p:blipFill rotWithShape="1">
+          <a:blip r:embed="rId2"/>
+          <a:srcRect t="15414"/>
+          <a:stretch/>
+        </p:blipFill>
+        <p:spPr>
+          <a:xfrm>
+            <a:off x="-3047" y="10"/>
+            <a:ext cx="12191999" cy="6857990"/>
+          </a:xfrm>
+          <a:prstGeom prst="rect">
+            <a:avLst/>
+          </a:prstGeom>
+        </p:spPr>
+      </p:pic>
       <p:sp>
         <p:nvSpPr>
-          <p:cNvPr id="5" name="Subtítulo 2">
-            <a:extLst>
-              <a:ext uri="{FF2B5EF4-FFF2-40B4-BE49-F238E27FC236}">
-                <a16:creationId xmlns:a16="http://schemas.microsoft.com/office/drawing/2014/main" id="{3907BDA3-2F2F-67E9-40BD-169692B07E03}"/>
+          <p:cNvPr id="3" name="Subtítulo 2">
+            <a:extLst>
+              <a:ext uri="{FF2B5EF4-FFF2-40B4-BE49-F238E27FC236}">
+                <a16:creationId xmlns:a16="http://schemas.microsoft.com/office/drawing/2014/main" id="{4E73F7DF-9A12-3BF5-A8E0-2CBBDCFC051A}"/>
               </a:ext>
             </a:extLst>
           </p:cNvPr>
@@ -8331,7 +9476,7 @@
               </a:lnSpc>
             </a:pPr>
             <a:r>
-              <a:rPr lang="es-ES" sz="3600" b="1" dirty="0">
+              <a:rPr lang="es-ES" sz="3200" b="1" dirty="0">
                 <a:solidFill>
                   <a:schemeClr val="bg1"/>
                 </a:solidFill>
@@ -8342,8 +9487,10 @@
                     </a:srgbClr>
                   </a:outerShdw>
                 </a:effectLst>
+                <a:latin typeface="Arial" panose="020B0604020202020204" pitchFamily="34" charset="0"/>
+                <a:cs typeface="Arial" panose="020B0604020202020204" pitchFamily="34" charset="0"/>
               </a:rPr>
-              <a:t>Se emplean colores con tonalidades marrones y negros dando la sensación de estar jugando en una mesa.</a:t>
+              <a:t>Implementar más juegos en futuro.</a:t>
             </a:r>
           </a:p>
           <a:p>
@@ -8353,7 +9500,7 @@
               </a:lnSpc>
             </a:pPr>
             <a:r>
-              <a:rPr lang="es-ES" sz="3600" b="1" dirty="0">
+              <a:rPr lang="es-ES" sz="3200" b="1" dirty="0">
                 <a:solidFill>
                   <a:schemeClr val="bg1"/>
                 </a:solidFill>
@@ -8364,9 +9511,167 @@
                     </a:srgbClr>
                   </a:outerShdw>
                 </a:effectLst>
+                <a:latin typeface="Arial" panose="020B0604020202020204" pitchFamily="34" charset="0"/>
+                <a:cs typeface="Arial" panose="020B0604020202020204" pitchFamily="34" charset="0"/>
               </a:rPr>
-              <a:t>Además, la página contara con tarjetas con diseños atractivos para darle ese toque moderno y atraer tanto a un público tradicional como más actual de los juegos de mesa a la aplicación.</a:t>
+              <a:t>Un sistema de correo electrónico para informar de nuevas partidas y modificaciones en esta</a:t>
             </a:r>
+          </a:p>
+        </p:txBody>
+      </p:sp>
+      <p:sp>
+        <p:nvSpPr>
+          <p:cNvPr id="6" name="Título 1">
+            <a:extLst>
+              <a:ext uri="{FF2B5EF4-FFF2-40B4-BE49-F238E27FC236}">
+                <a16:creationId xmlns:a16="http://schemas.microsoft.com/office/drawing/2014/main" id="{468B48F9-3033-3828-C126-2F0FBA8CE81E}"/>
+              </a:ext>
+            </a:extLst>
+          </p:cNvPr>
+          <p:cNvSpPr>
+            <a:spLocks noGrp="1"/>
+          </p:cNvSpPr>
+          <p:nvPr>
+            <p:ph type="ctrTitle"/>
+          </p:nvPr>
+        </p:nvSpPr>
+        <p:spPr>
+          <a:xfrm>
+            <a:off x="1216287" y="4940540"/>
+            <a:ext cx="9599625" cy="866328"/>
+          </a:xfrm>
+        </p:spPr>
+        <p:txBody>
+          <a:bodyPr>
+            <a:noAutofit/>
+          </a:bodyPr>
+          <a:lstStyle/>
+          <a:p>
+            <a:pPr algn="ctr"/>
+            <a:r>
+              <a:rPr lang="es-ES" sz="5400" dirty="0">
+                <a:solidFill>
+                  <a:schemeClr val="bg1"/>
+                </a:solidFill>
+              </a:rPr>
+              <a:t>Desarrollos posteriores</a:t>
+            </a:r>
+          </a:p>
+        </p:txBody>
+      </p:sp>
+    </p:spTree>
+    <p:extLst>
+      <p:ext uri="{BB962C8B-B14F-4D97-AF65-F5344CB8AC3E}">
+        <p14:creationId xmlns:p14="http://schemas.microsoft.com/office/powerpoint/2010/main" val="4031824988"/>
+      </p:ext>
+    </p:extLst>
+  </p:cSld>
+  <p:clrMapOvr>
+    <a:masterClrMapping/>
+  </p:clrMapOvr>
+</p:sld>
+</file>
+
+<file path=ppt/slides/slide9.xml><?xml version="1.0" encoding="utf-8"?>
+<p:sld xmlns:a="http://schemas.openxmlformats.org/drawingml/2006/main" xmlns:r="http://schemas.openxmlformats.org/officeDocument/2006/relationships" xmlns:p="http://schemas.openxmlformats.org/presentationml/2006/main">
+  <p:cSld>
+    <p:spTree>
+      <p:nvGrpSpPr>
+        <p:cNvPr id="1" name=""/>
+        <p:cNvGrpSpPr/>
+        <p:nvPr/>
+      </p:nvGrpSpPr>
+      <p:grpSpPr>
+        <a:xfrm>
+          <a:off x="0" y="0"/>
+          <a:ext cx="0" cy="0"/>
+          <a:chOff x="0" y="0"/>
+          <a:chExt cx="0" cy="0"/>
+        </a:xfrm>
+      </p:grpSpPr>
+      <p:pic>
+        <p:nvPicPr>
+          <p:cNvPr id="33" name="Picture 32" descr="Movimiento de jaque mate en un tablero de ajedrez">
+            <a:extLst>
+              <a:ext uri="{FF2B5EF4-FFF2-40B4-BE49-F238E27FC236}">
+                <a16:creationId xmlns:a16="http://schemas.microsoft.com/office/drawing/2014/main" id="{7C19B8B7-51A6-4095-DDE1-232B5CF6115B}"/>
+              </a:ext>
+            </a:extLst>
+          </p:cNvPr>
+          <p:cNvPicPr>
+            <a:picLocks noChangeAspect="1"/>
+          </p:cNvPicPr>
+          <p:nvPr/>
+        </p:nvPicPr>
+        <p:blipFill rotWithShape="1">
+          <a:blip r:embed="rId2"/>
+          <a:srcRect t="15414"/>
+          <a:stretch/>
+        </p:blipFill>
+        <p:spPr>
+          <a:xfrm>
+            <a:off x="-3047" y="10"/>
+            <a:ext cx="12191999" cy="6857990"/>
+          </a:xfrm>
+          <a:prstGeom prst="rect">
+            <a:avLst/>
+          </a:prstGeom>
+        </p:spPr>
+      </p:pic>
+      <p:sp>
+        <p:nvSpPr>
+          <p:cNvPr id="3" name="Subtítulo 2">
+            <a:extLst>
+              <a:ext uri="{FF2B5EF4-FFF2-40B4-BE49-F238E27FC236}">
+                <a16:creationId xmlns:a16="http://schemas.microsoft.com/office/drawing/2014/main" id="{4E73F7DF-9A12-3BF5-A8E0-2CBBDCFC051A}"/>
+              </a:ext>
+            </a:extLst>
+          </p:cNvPr>
+          <p:cNvSpPr>
+            <a:spLocks noGrp="1"/>
+          </p:cNvSpPr>
+          <p:nvPr>
+            <p:ph type="subTitle" idx="1"/>
+          </p:nvPr>
+        </p:nvSpPr>
+        <p:spPr>
+          <a:xfrm>
+            <a:off x="196968" y="0"/>
+            <a:ext cx="11638262" cy="5531596"/>
+          </a:xfrm>
+        </p:spPr>
+        <p:txBody>
+          <a:bodyPr anchor="ctr">
+            <a:normAutofit/>
+          </a:bodyPr>
+          <a:lstStyle/>
+          <a:p>
+            <a:pPr algn="ctr">
+              <a:lnSpc>
+                <a:spcPct val="100000"/>
+              </a:lnSpc>
+            </a:pPr>
+            <a:endParaRPr lang="es-ES" sz="3600" b="1" dirty="0">
+              <a:solidFill>
+                <a:schemeClr val="bg2"/>
+              </a:solidFill>
+              <a:effectLst>
+                <a:outerShdw blurRad="38100" dist="38100" dir="2700000" algn="tl">
+                  <a:srgbClr val="000000">
+                    <a:alpha val="43137"/>
+                  </a:srgbClr>
+                </a:outerShdw>
+              </a:effectLst>
+              <a:latin typeface="Arial" panose="020B0604020202020204" pitchFamily="34" charset="0"/>
+              <a:cs typeface="Arial" panose="020B0604020202020204" pitchFamily="34" charset="0"/>
+              <a:hlinkClick r:id="rId3">
+                <a:extLst>
+                  <a:ext uri="{A12FA001-AC4F-418D-AE19-62706E023703}">
+                    <ahyp:hlinkClr xmlns:ahyp="http://schemas.microsoft.com/office/drawing/2018/hyperlinkcolor" val="tx"/>
+                  </a:ext>
+                </a:extLst>
+              </a:hlinkClick>
+            </a:endParaRPr>
           </a:p>
           <a:p>
             <a:pPr algn="ctr">
@@ -8377,7 +9682,7 @@
             <a:r>
               <a:rPr lang="es-ES" sz="3600" b="1" dirty="0">
                 <a:solidFill>
-                  <a:schemeClr val="bg1"/>
+                  <a:schemeClr val="bg2"/>
                 </a:solidFill>
                 <a:effectLst>
                   <a:outerShdw blurRad="38100" dist="38100" dir="2700000" algn="tl">
@@ -8386,9 +9691,32 @@
                     </a:srgbClr>
                   </a:outerShdw>
                 </a:effectLst>
+                <a:latin typeface="Arial" panose="020B0604020202020204" pitchFamily="34" charset="0"/>
+                <a:cs typeface="Arial" panose="020B0604020202020204" pitchFamily="34" charset="0"/>
+                <a:hlinkClick r:id="rId3">
+                  <a:extLst>
+                    <a:ext uri="{A12FA001-AC4F-418D-AE19-62706E023703}">
+                      <ahyp:hlinkClr xmlns:ahyp="http://schemas.microsoft.com/office/drawing/2018/hyperlinkcolor" val="tx"/>
+                    </a:ext>
+                  </a:extLst>
+                </a:hlinkClick>
               </a:rPr>
-              <a:t>Además, las alertas que se usen para interactuar con el usuario estarán personalizadas.</a:t>
+              <a:t>Alertas</a:t>
             </a:r>
+            <a:endParaRPr lang="es-ES" sz="3600" b="1" dirty="0">
+              <a:solidFill>
+                <a:schemeClr val="bg2"/>
+              </a:solidFill>
+              <a:effectLst>
+                <a:outerShdw blurRad="38100" dist="38100" dir="2700000" algn="tl">
+                  <a:srgbClr val="000000">
+                    <a:alpha val="43137"/>
+                  </a:srgbClr>
+                </a:outerShdw>
+              </a:effectLst>
+              <a:latin typeface="Arial" panose="020B0604020202020204" pitchFamily="34" charset="0"/>
+              <a:cs typeface="Arial" panose="020B0604020202020204" pitchFamily="34" charset="0"/>
+            </a:endParaRPr>
           </a:p>
           <a:p>
             <a:pPr algn="ctr">
@@ -8399,7 +9727,7 @@
             <a:r>
               <a:rPr lang="es-ES" sz="3600" b="1" dirty="0">
                 <a:solidFill>
-                  <a:schemeClr val="bg1"/>
+                  <a:schemeClr val="bg2"/>
                 </a:solidFill>
                 <a:effectLst>
                   <a:outerShdw blurRad="38100" dist="38100" dir="2700000" algn="tl">
@@ -8408,8 +9736,356 @@
                     </a:srgbClr>
                   </a:outerShdw>
                 </a:effectLst>
+                <a:latin typeface="Arial" panose="020B0604020202020204" pitchFamily="34" charset="0"/>
+                <a:cs typeface="Arial" panose="020B0604020202020204" pitchFamily="34" charset="0"/>
+                <a:hlinkClick r:id="rId4">
+                  <a:extLst>
+                    <a:ext uri="{A12FA001-AC4F-418D-AE19-62706E023703}">
+                      <ahyp:hlinkClr xmlns:ahyp="http://schemas.microsoft.com/office/drawing/2018/hyperlinkcolor" val="tx"/>
+                    </a:ext>
+                  </a:extLst>
+                </a:hlinkClick>
               </a:rPr>
-              <a:t>La aplicación tendrá su logo acorde al diseño desarrollado</a:t>
+              <a:t>Diseño</a:t>
+            </a:r>
+            <a:r>
+              <a:rPr lang="es-ES" sz="3600" b="1" dirty="0">
+                <a:solidFill>
+                  <a:schemeClr val="bg2"/>
+                </a:solidFill>
+                <a:effectLst>
+                  <a:outerShdw blurRad="38100" dist="38100" dir="2700000" algn="tl">
+                    <a:srgbClr val="000000">
+                      <a:alpha val="43137"/>
+                    </a:srgbClr>
+                  </a:outerShdw>
+                </a:effectLst>
+                <a:latin typeface="Arial" panose="020B0604020202020204" pitchFamily="34" charset="0"/>
+                <a:cs typeface="Arial" panose="020B0604020202020204" pitchFamily="34" charset="0"/>
+              </a:rPr>
+              <a:t> y </a:t>
+            </a:r>
+            <a:r>
+              <a:rPr lang="es-ES" sz="3600" b="1" dirty="0">
+                <a:solidFill>
+                  <a:schemeClr val="bg2"/>
+                </a:solidFill>
+                <a:effectLst>
+                  <a:outerShdw blurRad="38100" dist="38100" dir="2700000" algn="tl">
+                    <a:srgbClr val="000000">
+                      <a:alpha val="43137"/>
+                    </a:srgbClr>
+                  </a:outerShdw>
+                </a:effectLst>
+                <a:latin typeface="Arial" panose="020B0604020202020204" pitchFamily="34" charset="0"/>
+                <a:cs typeface="Arial" panose="020B0604020202020204" pitchFamily="34" charset="0"/>
+                <a:hlinkClick r:id="rId5">
+                  <a:extLst>
+                    <a:ext uri="{A12FA001-AC4F-418D-AE19-62706E023703}">
+                      <ahyp:hlinkClr xmlns:ahyp="http://schemas.microsoft.com/office/drawing/2018/hyperlinkcolor" val="tx"/>
+                    </a:ext>
+                  </a:extLst>
+                </a:hlinkClick>
+              </a:rPr>
+              <a:t>más diseño</a:t>
+            </a:r>
+            <a:endParaRPr lang="es-ES" sz="3600" b="1" dirty="0">
+              <a:solidFill>
+                <a:schemeClr val="bg2"/>
+              </a:solidFill>
+              <a:effectLst>
+                <a:outerShdw blurRad="38100" dist="38100" dir="2700000" algn="tl">
+                  <a:srgbClr val="000000">
+                    <a:alpha val="43137"/>
+                  </a:srgbClr>
+                </a:outerShdw>
+              </a:effectLst>
+              <a:latin typeface="Arial" panose="020B0604020202020204" pitchFamily="34" charset="0"/>
+              <a:cs typeface="Arial" panose="020B0604020202020204" pitchFamily="34" charset="0"/>
+            </a:endParaRPr>
+          </a:p>
+          <a:p>
+            <a:pPr algn="ctr">
+              <a:lnSpc>
+                <a:spcPct val="100000"/>
+              </a:lnSpc>
+            </a:pPr>
+            <a:r>
+              <a:rPr lang="es-ES" sz="3600" b="1" dirty="0">
+                <a:solidFill>
+                  <a:schemeClr val="bg2"/>
+                </a:solidFill>
+                <a:effectLst>
+                  <a:outerShdw blurRad="38100" dist="38100" dir="2700000" algn="tl">
+                    <a:srgbClr val="000000">
+                      <a:alpha val="43137"/>
+                    </a:srgbClr>
+                  </a:outerShdw>
+                </a:effectLst>
+                <a:latin typeface="Arial" panose="020B0604020202020204" pitchFamily="34" charset="0"/>
+                <a:cs typeface="Arial" panose="020B0604020202020204" pitchFamily="34" charset="0"/>
+                <a:hlinkClick r:id="rId6">
+                  <a:extLst>
+                    <a:ext uri="{A12FA001-AC4F-418D-AE19-62706E023703}">
+                      <ahyp:hlinkClr xmlns:ahyp="http://schemas.microsoft.com/office/drawing/2018/hyperlinkcolor" val="tx"/>
+                    </a:ext>
+                  </a:extLst>
+                </a:hlinkClick>
+              </a:rPr>
+              <a:t>Front</a:t>
+            </a:r>
+            <a:endParaRPr lang="es-ES" sz="3600" b="1" dirty="0">
+              <a:solidFill>
+                <a:schemeClr val="bg2"/>
+              </a:solidFill>
+              <a:effectLst>
+                <a:outerShdw blurRad="38100" dist="38100" dir="2700000" algn="tl">
+                  <a:srgbClr val="000000">
+                    <a:alpha val="43137"/>
+                  </a:srgbClr>
+                </a:outerShdw>
+              </a:effectLst>
+              <a:latin typeface="Arial" panose="020B0604020202020204" pitchFamily="34" charset="0"/>
+              <a:cs typeface="Arial" panose="020B0604020202020204" pitchFamily="34" charset="0"/>
+            </a:endParaRPr>
+          </a:p>
+          <a:p>
+            <a:pPr algn="ctr">
+              <a:lnSpc>
+                <a:spcPct val="100000"/>
+              </a:lnSpc>
+            </a:pPr>
+            <a:r>
+              <a:rPr lang="es-ES" sz="3600" b="1" dirty="0">
+                <a:solidFill>
+                  <a:schemeClr val="bg2"/>
+                </a:solidFill>
+                <a:effectLst>
+                  <a:outerShdw blurRad="38100" dist="38100" dir="2700000" algn="tl">
+                    <a:srgbClr val="000000">
+                      <a:alpha val="43137"/>
+                    </a:srgbClr>
+                  </a:outerShdw>
+                </a:effectLst>
+                <a:latin typeface="Arial" panose="020B0604020202020204" pitchFamily="34" charset="0"/>
+                <a:cs typeface="Arial" panose="020B0604020202020204" pitchFamily="34" charset="0"/>
+                <a:hlinkClick r:id="rId7">
+                  <a:extLst>
+                    <a:ext uri="{A12FA001-AC4F-418D-AE19-62706E023703}">
+                      <ahyp:hlinkClr xmlns:ahyp="http://schemas.microsoft.com/office/drawing/2018/hyperlinkcolor" val="tx"/>
+                    </a:ext>
+                  </a:extLst>
+                </a:hlinkClick>
+              </a:rPr>
+              <a:t>Back</a:t>
+            </a:r>
+            <a:endParaRPr lang="es-ES" sz="3600" b="1" dirty="0">
+              <a:solidFill>
+                <a:schemeClr val="bg2"/>
+              </a:solidFill>
+              <a:effectLst>
+                <a:outerShdw blurRad="38100" dist="38100" dir="2700000" algn="tl">
+                  <a:srgbClr val="000000">
+                    <a:alpha val="43137"/>
+                  </a:srgbClr>
+                </a:outerShdw>
+              </a:effectLst>
+              <a:latin typeface="Arial" panose="020B0604020202020204" pitchFamily="34" charset="0"/>
+              <a:cs typeface="Arial" panose="020B0604020202020204" pitchFamily="34" charset="0"/>
+            </a:endParaRPr>
+          </a:p>
+          <a:p>
+            <a:pPr algn="ctr">
+              <a:lnSpc>
+                <a:spcPct val="100000"/>
+              </a:lnSpc>
+            </a:pPr>
+            <a:r>
+              <a:rPr lang="es-ES" sz="3600" b="1" dirty="0">
+                <a:solidFill>
+                  <a:schemeClr val="bg2"/>
+                </a:solidFill>
+                <a:effectLst>
+                  <a:outerShdw blurRad="38100" dist="38100" dir="2700000" algn="tl">
+                    <a:srgbClr val="000000">
+                      <a:alpha val="43137"/>
+                    </a:srgbClr>
+                  </a:outerShdw>
+                </a:effectLst>
+                <a:latin typeface="Arial" panose="020B0604020202020204" pitchFamily="34" charset="0"/>
+                <a:cs typeface="Arial" panose="020B0604020202020204" pitchFamily="34" charset="0"/>
+                <a:hlinkClick r:id="rId8">
+                  <a:extLst>
+                    <a:ext uri="{A12FA001-AC4F-418D-AE19-62706E023703}">
+                      <ahyp:hlinkClr xmlns:ahyp="http://schemas.microsoft.com/office/drawing/2018/hyperlinkcolor" val="tx"/>
+                    </a:ext>
+                  </a:extLst>
+                </a:hlinkClick>
+              </a:rPr>
+              <a:t>Token</a:t>
+            </a:r>
+            <a:endParaRPr lang="es-ES" sz="3600" b="1" dirty="0">
+              <a:solidFill>
+                <a:schemeClr val="bg2"/>
+              </a:solidFill>
+              <a:effectLst>
+                <a:outerShdw blurRad="38100" dist="38100" dir="2700000" algn="tl">
+                  <a:srgbClr val="000000">
+                    <a:alpha val="43137"/>
+                  </a:srgbClr>
+                </a:outerShdw>
+              </a:effectLst>
+              <a:latin typeface="Arial" panose="020B0604020202020204" pitchFamily="34" charset="0"/>
+              <a:cs typeface="Arial" panose="020B0604020202020204" pitchFamily="34" charset="0"/>
+            </a:endParaRPr>
+          </a:p>
+          <a:p>
+            <a:pPr algn="ctr">
+              <a:lnSpc>
+                <a:spcPct val="100000"/>
+              </a:lnSpc>
+            </a:pPr>
+            <a:r>
+              <a:rPr lang="es-ES" sz="3600" b="1" dirty="0">
+                <a:solidFill>
+                  <a:schemeClr val="bg2"/>
+                </a:solidFill>
+                <a:effectLst>
+                  <a:outerShdw blurRad="38100" dist="38100" dir="2700000" algn="tl">
+                    <a:srgbClr val="000000">
+                      <a:alpha val="43137"/>
+                    </a:srgbClr>
+                  </a:outerShdw>
+                </a:effectLst>
+                <a:latin typeface="Arial" panose="020B0604020202020204" pitchFamily="34" charset="0"/>
+                <a:cs typeface="Arial" panose="020B0604020202020204" pitchFamily="34" charset="0"/>
+                <a:hlinkClick r:id="rId9">
+                  <a:extLst>
+                    <a:ext uri="{A12FA001-AC4F-418D-AE19-62706E023703}">
+                      <ahyp:hlinkClr xmlns:ahyp="http://schemas.microsoft.com/office/drawing/2018/hyperlinkcolor" val="tx"/>
+                    </a:ext>
+                  </a:extLst>
+                </a:hlinkClick>
+              </a:rPr>
+              <a:t>Base de datos</a:t>
+            </a:r>
+            <a:endParaRPr lang="es-ES" sz="3600" b="1" dirty="0">
+              <a:solidFill>
+                <a:schemeClr val="bg2"/>
+              </a:solidFill>
+              <a:effectLst>
+                <a:outerShdw blurRad="38100" dist="38100" dir="2700000" algn="tl">
+                  <a:srgbClr val="000000">
+                    <a:alpha val="43137"/>
+                  </a:srgbClr>
+                </a:outerShdw>
+              </a:effectLst>
+              <a:latin typeface="Arial" panose="020B0604020202020204" pitchFamily="34" charset="0"/>
+              <a:cs typeface="Arial" panose="020B0604020202020204" pitchFamily="34" charset="0"/>
+            </a:endParaRPr>
+          </a:p>
+          <a:p>
+            <a:pPr algn="ctr">
+              <a:lnSpc>
+                <a:spcPct val="100000"/>
+              </a:lnSpc>
+            </a:pPr>
+            <a:r>
+              <a:rPr lang="es-ES" sz="3600" b="1" dirty="0">
+                <a:solidFill>
+                  <a:schemeClr val="bg2"/>
+                </a:solidFill>
+                <a:effectLst>
+                  <a:outerShdw blurRad="38100" dist="38100" dir="2700000" algn="tl">
+                    <a:srgbClr val="000000">
+                      <a:alpha val="43137"/>
+                    </a:srgbClr>
+                  </a:outerShdw>
+                </a:effectLst>
+                <a:latin typeface="Arial" panose="020B0604020202020204" pitchFamily="34" charset="0"/>
+                <a:cs typeface="Arial" panose="020B0604020202020204" pitchFamily="34" charset="0"/>
+                <a:hlinkClick r:id="rId10">
+                  <a:extLst>
+                    <a:ext uri="{A12FA001-AC4F-418D-AE19-62706E023703}">
+                      <ahyp:hlinkClr xmlns:ahyp="http://schemas.microsoft.com/office/drawing/2018/hyperlinkcolor" val="tx"/>
+                    </a:ext>
+                  </a:extLst>
+                </a:hlinkClick>
+              </a:rPr>
+              <a:t>Visor base de datos</a:t>
+            </a:r>
+            <a:endParaRPr lang="es-ES" sz="3600" b="1" dirty="0">
+              <a:solidFill>
+                <a:schemeClr val="bg2"/>
+              </a:solidFill>
+              <a:effectLst>
+                <a:outerShdw blurRad="38100" dist="38100" dir="2700000" algn="tl">
+                  <a:srgbClr val="000000">
+                    <a:alpha val="43137"/>
+                  </a:srgbClr>
+                </a:outerShdw>
+              </a:effectLst>
+              <a:latin typeface="Arial" panose="020B0604020202020204" pitchFamily="34" charset="0"/>
+              <a:cs typeface="Arial" panose="020B0604020202020204" pitchFamily="34" charset="0"/>
+            </a:endParaRPr>
+          </a:p>
+          <a:p>
+            <a:pPr algn="ctr">
+              <a:lnSpc>
+                <a:spcPct val="100000"/>
+              </a:lnSpc>
+            </a:pPr>
+            <a:endParaRPr lang="es-ES" sz="3600" b="1" dirty="0">
+              <a:solidFill>
+                <a:schemeClr val="bg1"/>
+              </a:solidFill>
+              <a:effectLst>
+                <a:outerShdw blurRad="38100" dist="38100" dir="2700000" algn="tl">
+                  <a:srgbClr val="000000">
+                    <a:alpha val="43137"/>
+                  </a:srgbClr>
+                </a:outerShdw>
+              </a:effectLst>
+            </a:endParaRPr>
+          </a:p>
+        </p:txBody>
+      </p:sp>
+      <p:sp>
+        <p:nvSpPr>
+          <p:cNvPr id="6" name="Título 1">
+            <a:extLst>
+              <a:ext uri="{FF2B5EF4-FFF2-40B4-BE49-F238E27FC236}">
+                <a16:creationId xmlns:a16="http://schemas.microsoft.com/office/drawing/2014/main" id="{468B48F9-3033-3828-C126-2F0FBA8CE81E}"/>
+              </a:ext>
+            </a:extLst>
+          </p:cNvPr>
+          <p:cNvSpPr>
+            <a:spLocks noGrp="1"/>
+          </p:cNvSpPr>
+          <p:nvPr>
+            <p:ph type="ctrTitle"/>
+          </p:nvPr>
+        </p:nvSpPr>
+        <p:spPr>
+          <a:xfrm>
+            <a:off x="1216287" y="5761634"/>
+            <a:ext cx="9599625" cy="866328"/>
+          </a:xfrm>
+        </p:spPr>
+        <p:txBody>
+          <a:bodyPr>
+            <a:noAutofit/>
+          </a:bodyPr>
+          <a:lstStyle/>
+          <a:p>
+            <a:pPr algn="ctr"/>
+            <a:r>
+              <a:rPr lang="es-ES" sz="5400" dirty="0">
+                <a:solidFill>
+                  <a:schemeClr val="bg1"/>
+                </a:solidFill>
+              </a:rPr>
+              <a:t>Bibliografía </a:t>
             </a:r>
           </a:p>
         </p:txBody>
@@ -8417,7 +10093,7 @@
     </p:spTree>
     <p:extLst>
       <p:ext uri="{BB962C8B-B14F-4D97-AF65-F5344CB8AC3E}">
-        <p14:creationId xmlns:p14="http://schemas.microsoft.com/office/powerpoint/2010/main" val="3449393869"/>
+        <p14:creationId xmlns:p14="http://schemas.microsoft.com/office/powerpoint/2010/main" val="3913858677"/>
       </p:ext>
     </p:extLst>
   </p:cSld>
@@ -8637,15 +10313,6 @@
 </file>
 
 <file path=customXml/item2.xml><?xml version="1.0" encoding="utf-8"?>
-<?mso-contentType ?>
-<FormTemplates xmlns="http://schemas.microsoft.com/sharepoint/v3/contenttype/forms">
-  <Display>DocumentLibraryForm</Display>
-  <Edit>DocumentLibraryForm</Edit>
-  <New>DocumentLibraryForm</New>
-</FormTemplates>
-</file>
-
-<file path=customXml/item3.xml><?xml version="1.0" encoding="utf-8"?>
 <ct:contentTypeSchema xmlns:ct="http://schemas.microsoft.com/office/2006/metadata/contentType" xmlns:ma="http://schemas.microsoft.com/office/2006/metadata/properties/metaAttributes" ct:_="" ma:_="" ma:contentTypeName="Documento" ma:contentTypeID="0x0101001CF815299FD08446828E528E2628D888" ma:contentTypeVersion="18" ma:contentTypeDescription="Crear nuevo documento." ma:contentTypeScope="" ma:versionID="eda16f0b0df14eff352f61fdd29391dd">
   <xsd:schema xmlns:xsd="http://www.w3.org/2001/XMLSchema" xmlns:xs="http://www.w3.org/2001/XMLSchema" xmlns:p="http://schemas.microsoft.com/office/2006/metadata/properties" xmlns:ns3="f2ea13ae-bb87-41e3-80ee-445ef9952b1b" xmlns:ns4="7e6392ed-20ae-4cf8-a2eb-b9a38b6c7442" targetNamespace="http://schemas.microsoft.com/office/2006/metadata/properties" ma:root="true" ma:fieldsID="39a5156d44086f184d4900c1f32878c2" ns3:_="" ns4:_="">
     <xsd:import namespace="f2ea13ae-bb87-41e3-80ee-445ef9952b1b"/>
@@ -8898,6 +10565,15 @@
 </ct:contentTypeSchema>
 </file>
 
+<file path=customXml/item3.xml><?xml version="1.0" encoding="utf-8"?>
+<?mso-contentType ?>
+<FormTemplates xmlns="http://schemas.microsoft.com/sharepoint/v3/contenttype/forms">
+  <Display>DocumentLibraryForm</Display>
+  <Edit>DocumentLibraryForm</Edit>
+  <New>DocumentLibraryForm</New>
+</FormTemplates>
+</file>
+
 <file path=customXml/itemProps1.xml><?xml version="1.0" encoding="utf-8"?>
 <ds:datastoreItem xmlns:ds="http://schemas.openxmlformats.org/officeDocument/2006/customXml" ds:itemID="{84F78817-FC4B-4DE8-91A2-DA4F6B7B016A}">
   <ds:schemaRefs>
@@ -8916,14 +10592,6 @@
 </file>
 
 <file path=customXml/itemProps2.xml><?xml version="1.0" encoding="utf-8"?>
-<ds:datastoreItem xmlns:ds="http://schemas.openxmlformats.org/officeDocument/2006/customXml" ds:itemID="{BDCF1FC9-F5C2-44A8-9472-8472B5853B3F}">
-  <ds:schemaRefs>
-    <ds:schemaRef ds:uri="http://schemas.microsoft.com/sharepoint/v3/contenttype/forms"/>
-  </ds:schemaRefs>
-</ds:datastoreItem>
-</file>
-
-<file path=customXml/itemProps3.xml><?xml version="1.0" encoding="utf-8"?>
 <ds:datastoreItem xmlns:ds="http://schemas.openxmlformats.org/officeDocument/2006/customXml" ds:itemID="{4616929A-81C1-416A-98D6-A4FC31BDA4E2}">
   <ds:schemaRefs>
     <ds:schemaRef ds:uri="http://schemas.microsoft.com/office/2006/metadata/contentType"/>
@@ -8940,4 +10608,12 @@
     <ds:schemaRef ds:uri="http://schemas.microsoft.com/internal/obd"/>
   </ds:schemaRefs>
 </ds:datastoreItem>
+</file>
+
+<file path=customXml/itemProps3.xml><?xml version="1.0" encoding="utf-8"?>
+<ds:datastoreItem xmlns:ds="http://schemas.openxmlformats.org/officeDocument/2006/customXml" ds:itemID="{BDCF1FC9-F5C2-44A8-9472-8472B5853B3F}">
+  <ds:schemaRefs>
+    <ds:schemaRef ds:uri="http://schemas.microsoft.com/sharepoint/v3/contenttype/forms"/>
+  </ds:schemaRefs>
+</ds:datastoreItem>
 </file>
</xml_diff>